<commit_message>
Updated for new season
</commit_message>
<xml_diff>
--- a/Scripts/Backgrounds/PPs/Bakgrunn.pptx
+++ b/Scripts/Backgrounds/PPs/Bakgrunn.pptx
@@ -2,14 +2,15 @@
 <file path=ppt/presentation.xml><?xml version="1.0" encoding="utf-8"?>
 <p:presentation xmlns:a="http://schemas.openxmlformats.org/drawingml/2006/main" xmlns:r="http://schemas.openxmlformats.org/officeDocument/2006/relationships" xmlns:p="http://schemas.openxmlformats.org/presentationml/2006/main" saveSubsetFonts="1">
   <p:sldMasterIdLst>
-    <p:sldMasterId id="2147483708" r:id="rId1"/>
+    <p:sldMasterId id="2147483720" r:id="rId1"/>
   </p:sldMasterIdLst>
   <p:sldIdLst>
     <p:sldId id="256" r:id="rId2"/>
-    <p:sldId id="258" r:id="rId3"/>
-    <p:sldId id="257" r:id="rId4"/>
+    <p:sldId id="259" r:id="rId3"/>
+    <p:sldId id="258" r:id="rId4"/>
+    <p:sldId id="257" r:id="rId5"/>
   </p:sldIdLst>
-  <p:sldSz cx="8280400" cy="9906000"/>
+  <p:sldSz cx="8280400" cy="11430000"/>
   <p:notesSz cx="6858000" cy="9144000"/>
   <p:defaultTextStyle>
     <a:defPPr>
@@ -143,8 +144,8 @@
         </p:nvSpPr>
         <p:spPr>
           <a:xfrm>
-            <a:off x="621030" y="1621191"/>
-            <a:ext cx="7038340" cy="3448756"/>
+            <a:off x="621030" y="1870605"/>
+            <a:ext cx="7038340" cy="3979333"/>
           </a:xfrm>
         </p:spPr>
         <p:txBody>
@@ -175,8 +176,8 @@
         </p:nvSpPr>
         <p:spPr>
           <a:xfrm>
-            <a:off x="1035050" y="5202944"/>
-            <a:ext cx="6210300" cy="2391656"/>
+            <a:off x="1035050" y="6003397"/>
+            <a:ext cx="6210300" cy="2759603"/>
           </a:xfrm>
         </p:spPr>
         <p:txBody>
@@ -245,7 +246,7 @@
           <a:p>
             <a:fld id="{4E53BD70-5BC3-4253-8674-0503EFB1F2C0}" type="datetimeFigureOut">
               <a:rPr lang="nb-NO" smtClean="0"/>
-              <a:t>08.04.2023</a:t>
+              <a:t>04.09.2023</a:t>
             </a:fld>
             <a:endParaRPr lang="nb-NO"/>
           </a:p>
@@ -296,7 +297,7 @@
     </p:spTree>
     <p:extLst>
       <p:ext uri="{BB962C8B-B14F-4D97-AF65-F5344CB8AC3E}">
-        <p14:creationId xmlns:p14="http://schemas.microsoft.com/office/powerpoint/2010/main" val="1539061193"/>
+        <p14:creationId xmlns:p14="http://schemas.microsoft.com/office/powerpoint/2010/main" val="3481116602"/>
       </p:ext>
     </p:extLst>
   </p:cSld>
@@ -415,7 +416,7 @@
           <a:p>
             <a:fld id="{4E53BD70-5BC3-4253-8674-0503EFB1F2C0}" type="datetimeFigureOut">
               <a:rPr lang="nb-NO" smtClean="0"/>
-              <a:t>08.04.2023</a:t>
+              <a:t>04.09.2023</a:t>
             </a:fld>
             <a:endParaRPr lang="nb-NO"/>
           </a:p>
@@ -466,7 +467,7 @@
     </p:spTree>
     <p:extLst>
       <p:ext uri="{BB962C8B-B14F-4D97-AF65-F5344CB8AC3E}">
-        <p14:creationId xmlns:p14="http://schemas.microsoft.com/office/powerpoint/2010/main" val="295475317"/>
+        <p14:creationId xmlns:p14="http://schemas.microsoft.com/office/powerpoint/2010/main" val="2563023651"/>
       </p:ext>
     </p:extLst>
   </p:cSld>
@@ -505,8 +506,8 @@
         </p:nvSpPr>
         <p:spPr>
           <a:xfrm>
-            <a:off x="5925662" y="527403"/>
-            <a:ext cx="1785461" cy="8394877"/>
+            <a:off x="5925662" y="608542"/>
+            <a:ext cx="1785461" cy="9686397"/>
           </a:xfrm>
         </p:spPr>
         <p:txBody>
@@ -533,8 +534,8 @@
         </p:nvSpPr>
         <p:spPr>
           <a:xfrm>
-            <a:off x="569278" y="527403"/>
-            <a:ext cx="5252879" cy="8394877"/>
+            <a:off x="569278" y="608542"/>
+            <a:ext cx="5252879" cy="9686397"/>
           </a:xfrm>
         </p:spPr>
         <p:txBody>
@@ -595,7 +596,7 @@
           <a:p>
             <a:fld id="{4E53BD70-5BC3-4253-8674-0503EFB1F2C0}" type="datetimeFigureOut">
               <a:rPr lang="nb-NO" smtClean="0"/>
-              <a:t>08.04.2023</a:t>
+              <a:t>04.09.2023</a:t>
             </a:fld>
             <a:endParaRPr lang="nb-NO"/>
           </a:p>
@@ -646,7 +647,7 @@
     </p:spTree>
     <p:extLst>
       <p:ext uri="{BB962C8B-B14F-4D97-AF65-F5344CB8AC3E}">
-        <p14:creationId xmlns:p14="http://schemas.microsoft.com/office/powerpoint/2010/main" val="2664816326"/>
+        <p14:creationId xmlns:p14="http://schemas.microsoft.com/office/powerpoint/2010/main" val="2218592242"/>
       </p:ext>
     </p:extLst>
   </p:cSld>
@@ -765,7 +766,7 @@
           <a:p>
             <a:fld id="{4E53BD70-5BC3-4253-8674-0503EFB1F2C0}" type="datetimeFigureOut">
               <a:rPr lang="nb-NO" smtClean="0"/>
-              <a:t>08.04.2023</a:t>
+              <a:t>04.09.2023</a:t>
             </a:fld>
             <a:endParaRPr lang="nb-NO"/>
           </a:p>
@@ -816,7 +817,7 @@
     </p:spTree>
     <p:extLst>
       <p:ext uri="{BB962C8B-B14F-4D97-AF65-F5344CB8AC3E}">
-        <p14:creationId xmlns:p14="http://schemas.microsoft.com/office/powerpoint/2010/main" val="41293333"/>
+        <p14:creationId xmlns:p14="http://schemas.microsoft.com/office/powerpoint/2010/main" val="789596774"/>
       </p:ext>
     </p:extLst>
   </p:cSld>
@@ -855,8 +856,8 @@
         </p:nvSpPr>
         <p:spPr>
           <a:xfrm>
-            <a:off x="564965" y="2469624"/>
-            <a:ext cx="7141845" cy="4120620"/>
+            <a:off x="564965" y="2849566"/>
+            <a:ext cx="7141845" cy="4754562"/>
           </a:xfrm>
         </p:spPr>
         <p:txBody>
@@ -887,8 +888,8 @@
         </p:nvSpPr>
         <p:spPr>
           <a:xfrm>
-            <a:off x="564965" y="6629226"/>
-            <a:ext cx="7141845" cy="2166937"/>
+            <a:off x="564965" y="7649107"/>
+            <a:ext cx="7141845" cy="2500312"/>
           </a:xfrm>
         </p:spPr>
         <p:txBody>
@@ -1009,7 +1010,7 @@
           <a:p>
             <a:fld id="{4E53BD70-5BC3-4253-8674-0503EFB1F2C0}" type="datetimeFigureOut">
               <a:rPr lang="nb-NO" smtClean="0"/>
-              <a:t>08.04.2023</a:t>
+              <a:t>04.09.2023</a:t>
             </a:fld>
             <a:endParaRPr lang="nb-NO"/>
           </a:p>
@@ -1060,7 +1061,7 @@
     </p:spTree>
     <p:extLst>
       <p:ext uri="{BB962C8B-B14F-4D97-AF65-F5344CB8AC3E}">
-        <p14:creationId xmlns:p14="http://schemas.microsoft.com/office/powerpoint/2010/main" val="2219815707"/>
+        <p14:creationId xmlns:p14="http://schemas.microsoft.com/office/powerpoint/2010/main" val="3453939489"/>
       </p:ext>
     </p:extLst>
   </p:cSld>
@@ -1122,8 +1123,8 @@
         </p:nvSpPr>
         <p:spPr>
           <a:xfrm>
-            <a:off x="569278" y="2637014"/>
-            <a:ext cx="3519170" cy="6285266"/>
+            <a:off x="569278" y="3042708"/>
+            <a:ext cx="3519170" cy="7252230"/>
           </a:xfrm>
         </p:spPr>
         <p:txBody>
@@ -1179,8 +1180,8 @@
         </p:nvSpPr>
         <p:spPr>
           <a:xfrm>
-            <a:off x="4191953" y="2637014"/>
-            <a:ext cx="3519170" cy="6285266"/>
+            <a:off x="4191953" y="3042708"/>
+            <a:ext cx="3519170" cy="7252230"/>
           </a:xfrm>
         </p:spPr>
         <p:txBody>
@@ -1241,7 +1242,7 @@
           <a:p>
             <a:fld id="{4E53BD70-5BC3-4253-8674-0503EFB1F2C0}" type="datetimeFigureOut">
               <a:rPr lang="nb-NO" smtClean="0"/>
-              <a:t>08.04.2023</a:t>
+              <a:t>04.09.2023</a:t>
             </a:fld>
             <a:endParaRPr lang="nb-NO"/>
           </a:p>
@@ -1292,7 +1293,7 @@
     </p:spTree>
     <p:extLst>
       <p:ext uri="{BB962C8B-B14F-4D97-AF65-F5344CB8AC3E}">
-        <p14:creationId xmlns:p14="http://schemas.microsoft.com/office/powerpoint/2010/main" val="1435924139"/>
+        <p14:creationId xmlns:p14="http://schemas.microsoft.com/office/powerpoint/2010/main" val="5109156"/>
       </p:ext>
     </p:extLst>
   </p:cSld>
@@ -1331,8 +1332,8 @@
         </p:nvSpPr>
         <p:spPr>
           <a:xfrm>
-            <a:off x="570356" y="527405"/>
-            <a:ext cx="7141845" cy="1914702"/>
+            <a:off x="570356" y="608544"/>
+            <a:ext cx="7141845" cy="2209272"/>
           </a:xfrm>
         </p:spPr>
         <p:txBody>
@@ -1359,8 +1360,8 @@
         </p:nvSpPr>
         <p:spPr>
           <a:xfrm>
-            <a:off x="570357" y="2428347"/>
-            <a:ext cx="3502997" cy="1190095"/>
+            <a:off x="570357" y="2801938"/>
+            <a:ext cx="3502997" cy="1373187"/>
           </a:xfrm>
         </p:spPr>
         <p:txBody>
@@ -1424,8 +1425,8 @@
         </p:nvSpPr>
         <p:spPr>
           <a:xfrm>
-            <a:off x="570357" y="3618442"/>
-            <a:ext cx="3502997" cy="5322183"/>
+            <a:off x="570357" y="4175125"/>
+            <a:ext cx="3502997" cy="6140980"/>
           </a:xfrm>
         </p:spPr>
         <p:txBody>
@@ -1481,8 +1482,8 @@
         </p:nvSpPr>
         <p:spPr>
           <a:xfrm>
-            <a:off x="4191953" y="2428347"/>
-            <a:ext cx="3520249" cy="1190095"/>
+            <a:off x="4191953" y="2801938"/>
+            <a:ext cx="3520249" cy="1373187"/>
           </a:xfrm>
         </p:spPr>
         <p:txBody>
@@ -1546,8 +1547,8 @@
         </p:nvSpPr>
         <p:spPr>
           <a:xfrm>
-            <a:off x="4191953" y="3618442"/>
-            <a:ext cx="3520249" cy="5322183"/>
+            <a:off x="4191953" y="4175125"/>
+            <a:ext cx="3520249" cy="6140980"/>
           </a:xfrm>
         </p:spPr>
         <p:txBody>
@@ -1608,7 +1609,7 @@
           <a:p>
             <a:fld id="{4E53BD70-5BC3-4253-8674-0503EFB1F2C0}" type="datetimeFigureOut">
               <a:rPr lang="nb-NO" smtClean="0"/>
-              <a:t>08.04.2023</a:t>
+              <a:t>04.09.2023</a:t>
             </a:fld>
             <a:endParaRPr lang="nb-NO"/>
           </a:p>
@@ -1659,7 +1660,7 @@
     </p:spTree>
     <p:extLst>
       <p:ext uri="{BB962C8B-B14F-4D97-AF65-F5344CB8AC3E}">
-        <p14:creationId xmlns:p14="http://schemas.microsoft.com/office/powerpoint/2010/main" val="3104998292"/>
+        <p14:creationId xmlns:p14="http://schemas.microsoft.com/office/powerpoint/2010/main" val="765675944"/>
       </p:ext>
     </p:extLst>
   </p:cSld>
@@ -1726,7 +1727,7 @@
           <a:p>
             <a:fld id="{4E53BD70-5BC3-4253-8674-0503EFB1F2C0}" type="datetimeFigureOut">
               <a:rPr lang="nb-NO" smtClean="0"/>
-              <a:t>08.04.2023</a:t>
+              <a:t>04.09.2023</a:t>
             </a:fld>
             <a:endParaRPr lang="nb-NO"/>
           </a:p>
@@ -1777,7 +1778,7 @@
     </p:spTree>
     <p:extLst>
       <p:ext uri="{BB962C8B-B14F-4D97-AF65-F5344CB8AC3E}">
-        <p14:creationId xmlns:p14="http://schemas.microsoft.com/office/powerpoint/2010/main" val="3224176645"/>
+        <p14:creationId xmlns:p14="http://schemas.microsoft.com/office/powerpoint/2010/main" val="1154617330"/>
       </p:ext>
     </p:extLst>
   </p:cSld>
@@ -1821,7 +1822,7 @@
           <a:p>
             <a:fld id="{4E53BD70-5BC3-4253-8674-0503EFB1F2C0}" type="datetimeFigureOut">
               <a:rPr lang="nb-NO" smtClean="0"/>
-              <a:t>08.04.2023</a:t>
+              <a:t>04.09.2023</a:t>
             </a:fld>
             <a:endParaRPr lang="nb-NO"/>
           </a:p>
@@ -1872,7 +1873,7 @@
     </p:spTree>
     <p:extLst>
       <p:ext uri="{BB962C8B-B14F-4D97-AF65-F5344CB8AC3E}">
-        <p14:creationId xmlns:p14="http://schemas.microsoft.com/office/powerpoint/2010/main" val="4210134087"/>
+        <p14:creationId xmlns:p14="http://schemas.microsoft.com/office/powerpoint/2010/main" val="739144877"/>
       </p:ext>
     </p:extLst>
   </p:cSld>
@@ -1911,8 +1912,8 @@
         </p:nvSpPr>
         <p:spPr>
           <a:xfrm>
-            <a:off x="570356" y="660400"/>
-            <a:ext cx="2670645" cy="2311400"/>
+            <a:off x="570356" y="762000"/>
+            <a:ext cx="2670645" cy="2667000"/>
           </a:xfrm>
         </p:spPr>
         <p:txBody>
@@ -1943,8 +1944,8 @@
         </p:nvSpPr>
         <p:spPr>
           <a:xfrm>
-            <a:off x="3520248" y="1426283"/>
-            <a:ext cx="4191953" cy="7039681"/>
+            <a:off x="3520248" y="1645711"/>
+            <a:ext cx="4191953" cy="8122708"/>
           </a:xfrm>
         </p:spPr>
         <p:txBody>
@@ -2028,8 +2029,8 @@
         </p:nvSpPr>
         <p:spPr>
           <a:xfrm>
-            <a:off x="570356" y="2971800"/>
-            <a:ext cx="2670645" cy="5505627"/>
+            <a:off x="570356" y="3429000"/>
+            <a:ext cx="2670645" cy="6352647"/>
           </a:xfrm>
         </p:spPr>
         <p:txBody>
@@ -2098,7 +2099,7 @@
           <a:p>
             <a:fld id="{4E53BD70-5BC3-4253-8674-0503EFB1F2C0}" type="datetimeFigureOut">
               <a:rPr lang="nb-NO" smtClean="0"/>
-              <a:t>08.04.2023</a:t>
+              <a:t>04.09.2023</a:t>
             </a:fld>
             <a:endParaRPr lang="nb-NO"/>
           </a:p>
@@ -2149,7 +2150,7 @@
     </p:spTree>
     <p:extLst>
       <p:ext uri="{BB962C8B-B14F-4D97-AF65-F5344CB8AC3E}">
-        <p14:creationId xmlns:p14="http://schemas.microsoft.com/office/powerpoint/2010/main" val="136553022"/>
+        <p14:creationId xmlns:p14="http://schemas.microsoft.com/office/powerpoint/2010/main" val="1024272322"/>
       </p:ext>
     </p:extLst>
   </p:cSld>
@@ -2188,8 +2189,8 @@
         </p:nvSpPr>
         <p:spPr>
           <a:xfrm>
-            <a:off x="570356" y="660400"/>
-            <a:ext cx="2670645" cy="2311400"/>
+            <a:off x="570356" y="762000"/>
+            <a:ext cx="2670645" cy="2667000"/>
           </a:xfrm>
         </p:spPr>
         <p:txBody>
@@ -2220,8 +2221,8 @@
         </p:nvSpPr>
         <p:spPr>
           <a:xfrm>
-            <a:off x="3520248" y="1426283"/>
-            <a:ext cx="4191953" cy="7039681"/>
+            <a:off x="3520248" y="1645711"/>
+            <a:ext cx="4191953" cy="8122708"/>
           </a:xfrm>
         </p:spPr>
         <p:txBody>
@@ -2285,8 +2286,8 @@
         </p:nvSpPr>
         <p:spPr>
           <a:xfrm>
-            <a:off x="570356" y="2971800"/>
-            <a:ext cx="2670645" cy="5505627"/>
+            <a:off x="570356" y="3429000"/>
+            <a:ext cx="2670645" cy="6352647"/>
           </a:xfrm>
         </p:spPr>
         <p:txBody>
@@ -2355,7 +2356,7 @@
           <a:p>
             <a:fld id="{4E53BD70-5BC3-4253-8674-0503EFB1F2C0}" type="datetimeFigureOut">
               <a:rPr lang="nb-NO" smtClean="0"/>
-              <a:t>08.04.2023</a:t>
+              <a:t>04.09.2023</a:t>
             </a:fld>
             <a:endParaRPr lang="nb-NO"/>
           </a:p>
@@ -2406,7 +2407,7 @@
     </p:spTree>
     <p:extLst>
       <p:ext uri="{BB962C8B-B14F-4D97-AF65-F5344CB8AC3E}">
-        <p14:creationId xmlns:p14="http://schemas.microsoft.com/office/powerpoint/2010/main" val="2093101442"/>
+        <p14:creationId xmlns:p14="http://schemas.microsoft.com/office/powerpoint/2010/main" val="3980107038"/>
       </p:ext>
     </p:extLst>
   </p:cSld>
@@ -2450,8 +2451,8 @@
         </p:nvSpPr>
         <p:spPr>
           <a:xfrm>
-            <a:off x="569278" y="527405"/>
-            <a:ext cx="7141845" cy="1914702"/>
+            <a:off x="569278" y="608544"/>
+            <a:ext cx="7141845" cy="2209272"/>
           </a:xfrm>
           <a:prstGeom prst="rect">
             <a:avLst/>
@@ -2483,8 +2484,8 @@
         </p:nvSpPr>
         <p:spPr>
           <a:xfrm>
-            <a:off x="569278" y="2637014"/>
-            <a:ext cx="7141845" cy="6285266"/>
+            <a:off x="569278" y="3042708"/>
+            <a:ext cx="7141845" cy="7252230"/>
           </a:xfrm>
           <a:prstGeom prst="rect">
             <a:avLst/>
@@ -2545,8 +2546,8 @@
         </p:nvSpPr>
         <p:spPr>
           <a:xfrm>
-            <a:off x="569278" y="9181397"/>
-            <a:ext cx="1863090" cy="527403"/>
+            <a:off x="569278" y="10593919"/>
+            <a:ext cx="1863090" cy="608542"/>
           </a:xfrm>
           <a:prstGeom prst="rect">
             <a:avLst/>
@@ -2568,7 +2569,7 @@
           <a:p>
             <a:fld id="{4E53BD70-5BC3-4253-8674-0503EFB1F2C0}" type="datetimeFigureOut">
               <a:rPr lang="nb-NO" smtClean="0"/>
-              <a:t>08.04.2023</a:t>
+              <a:t>04.09.2023</a:t>
             </a:fld>
             <a:endParaRPr lang="nb-NO"/>
           </a:p>
@@ -2586,8 +2587,8 @@
         </p:nvSpPr>
         <p:spPr>
           <a:xfrm>
-            <a:off x="2742883" y="9181397"/>
-            <a:ext cx="2794635" cy="527403"/>
+            <a:off x="2742883" y="10593919"/>
+            <a:ext cx="2794635" cy="608542"/>
           </a:xfrm>
           <a:prstGeom prst="rect">
             <a:avLst/>
@@ -2623,8 +2624,8 @@
         </p:nvSpPr>
         <p:spPr>
           <a:xfrm>
-            <a:off x="5848033" y="9181397"/>
-            <a:ext cx="1863090" cy="527403"/>
+            <a:off x="5848033" y="10593919"/>
+            <a:ext cx="1863090" cy="608542"/>
           </a:xfrm>
           <a:prstGeom prst="rect">
             <a:avLst/>
@@ -2655,23 +2656,23 @@
     </p:spTree>
     <p:extLst>
       <p:ext uri="{BB962C8B-B14F-4D97-AF65-F5344CB8AC3E}">
-        <p14:creationId xmlns:p14="http://schemas.microsoft.com/office/powerpoint/2010/main" val="232685975"/>
+        <p14:creationId xmlns:p14="http://schemas.microsoft.com/office/powerpoint/2010/main" val="2920343757"/>
       </p:ext>
     </p:extLst>
   </p:cSld>
   <p:clrMap bg1="lt1" tx1="dk1" bg2="lt2" tx2="dk2" accent1="accent1" accent2="accent2" accent3="accent3" accent4="accent4" accent5="accent5" accent6="accent6" hlink="hlink" folHlink="folHlink"/>
   <p:sldLayoutIdLst>
-    <p:sldLayoutId id="2147483709" r:id="rId1"/>
-    <p:sldLayoutId id="2147483710" r:id="rId2"/>
-    <p:sldLayoutId id="2147483711" r:id="rId3"/>
-    <p:sldLayoutId id="2147483712" r:id="rId4"/>
-    <p:sldLayoutId id="2147483713" r:id="rId5"/>
-    <p:sldLayoutId id="2147483714" r:id="rId6"/>
-    <p:sldLayoutId id="2147483715" r:id="rId7"/>
-    <p:sldLayoutId id="2147483716" r:id="rId8"/>
-    <p:sldLayoutId id="2147483717" r:id="rId9"/>
-    <p:sldLayoutId id="2147483718" r:id="rId10"/>
-    <p:sldLayoutId id="2147483719" r:id="rId11"/>
+    <p:sldLayoutId id="2147483721" r:id="rId1"/>
+    <p:sldLayoutId id="2147483722" r:id="rId2"/>
+    <p:sldLayoutId id="2147483723" r:id="rId3"/>
+    <p:sldLayoutId id="2147483724" r:id="rId4"/>
+    <p:sldLayoutId id="2147483725" r:id="rId5"/>
+    <p:sldLayoutId id="2147483726" r:id="rId6"/>
+    <p:sldLayoutId id="2147483727" r:id="rId7"/>
+    <p:sldLayoutId id="2147483728" r:id="rId8"/>
+    <p:sldLayoutId id="2147483729" r:id="rId9"/>
+    <p:sldLayoutId id="2147483730" r:id="rId10"/>
+    <p:sldLayoutId id="2147483731" r:id="rId11"/>
   </p:sldLayoutIdLst>
   <p:txStyles>
     <p:titleStyle>
@@ -2994,7 +2995,7 @@
           </p:nvPr>
         </p:nvGraphicFramePr>
         <p:xfrm>
-          <a:off x="0" y="0"/>
+          <a:off x="0" y="762000"/>
           <a:ext cx="8280000" cy="9906000"/>
         </p:xfrm>
         <a:graphic>
@@ -5106,7 +5107,7 @@
         </p:nvSpPr>
         <p:spPr>
           <a:xfrm flipH="1">
-            <a:off x="1217865" y="0"/>
+            <a:off x="1217865" y="762000"/>
             <a:ext cx="7062134" cy="762000"/>
           </a:xfrm>
           <a:prstGeom prst="rtTriangle">
@@ -5158,8 +5159,8 @@
         </p:nvSpPr>
         <p:spPr>
           <a:xfrm flipH="1">
-            <a:off x="2306170" y="0"/>
-            <a:ext cx="5973829" cy="762000"/>
+            <a:off x="2306171" y="762000"/>
+            <a:ext cx="5973829" cy="1097994"/>
           </a:xfrm>
           <a:prstGeom prst="rtTriangle">
             <a:avLst/>
@@ -5199,7 +5200,7 @@
           </p:nvPr>
         </p:nvGraphicFramePr>
         <p:xfrm>
-          <a:off x="400" y="0"/>
+          <a:off x="400" y="762000"/>
           <a:ext cx="8280000" cy="762000"/>
         </p:xfrm>
         <a:graphic>
@@ -5476,7 +5477,7 @@
           </p:nvPr>
         </p:nvGraphicFramePr>
         <p:xfrm>
-          <a:off x="-82270" y="762000"/>
+          <a:off x="-82270" y="1524000"/>
           <a:ext cx="559641" cy="9144000"/>
         </p:xfrm>
         <a:graphic>
@@ -6069,7 +6070,7 @@
         </p:nvCxnSpPr>
         <p:spPr>
           <a:xfrm>
-            <a:off x="6724" y="3039036"/>
+            <a:off x="6724" y="3801036"/>
             <a:ext cx="8273676" cy="0"/>
           </a:xfrm>
           <a:prstGeom prst="line">
@@ -6112,7 +6113,7 @@
         </p:nvCxnSpPr>
         <p:spPr>
           <a:xfrm>
-            <a:off x="3162" y="5334000"/>
+            <a:off x="3162" y="6096000"/>
             <a:ext cx="8273676" cy="0"/>
           </a:xfrm>
           <a:prstGeom prst="line">
@@ -6155,7 +6156,7 @@
         </p:nvCxnSpPr>
         <p:spPr>
           <a:xfrm>
-            <a:off x="6724" y="7604312"/>
+            <a:off x="6724" y="8366312"/>
             <a:ext cx="8273676" cy="0"/>
           </a:xfrm>
           <a:prstGeom prst="line">
@@ -6227,14 +6228,14 @@
           <p:nvPr>
             <p:extLst>
               <p:ext uri="{D42A27DB-BD31-4B8C-83A1-F6EECF244321}">
-                <p14:modId xmlns:p14="http://schemas.microsoft.com/office/powerpoint/2010/main" val="1257147748"/>
+                <p14:modId xmlns:p14="http://schemas.microsoft.com/office/powerpoint/2010/main" val="3532417487"/>
               </p:ext>
             </p:extLst>
           </p:nvPr>
         </p:nvGraphicFramePr>
         <p:xfrm>
-          <a:off x="0" y="0"/>
-          <a:ext cx="8280401" cy="9906000"/>
+          <a:off x="-400" y="0"/>
+          <a:ext cx="8280000" cy="11430000"/>
         </p:xfrm>
         <a:graphic>
           <a:graphicData uri="http://schemas.openxmlformats.org/drawingml/2006/table">
@@ -6243,28 +6244,63 @@
                 <a:tableStyleId>{B301B821-A1FF-4177-AEE7-76D212191A09}</a:tableStyleId>
               </a:tblPr>
               <a:tblGrid>
-                <a:gridCol w="5630672">
+                <a:gridCol w="3672000">
                   <a:extLst>
                     <a:ext uri="{9D8B030D-6E8A-4147-A177-3AD203B41FA5}">
                       <a16:colId xmlns:a16="http://schemas.microsoft.com/office/drawing/2014/main" val="467636141"/>
                     </a:ext>
                   </a:extLst>
                 </a:gridCol>
-                <a:gridCol w="883243">
+                <a:gridCol w="576000">
+                  <a:extLst>
+                    <a:ext uri="{9D8B030D-6E8A-4147-A177-3AD203B41FA5}">
+                      <a16:colId xmlns:a16="http://schemas.microsoft.com/office/drawing/2014/main" val="438281190"/>
+                    </a:ext>
+                  </a:extLst>
+                </a:gridCol>
+                <a:gridCol w="576000">
+                  <a:extLst>
+                    <a:ext uri="{9D8B030D-6E8A-4147-A177-3AD203B41FA5}">
+                      <a16:colId xmlns:a16="http://schemas.microsoft.com/office/drawing/2014/main" val="1186753470"/>
+                    </a:ext>
+                  </a:extLst>
+                </a:gridCol>
+                <a:gridCol w="576000">
+                  <a:extLst>
+                    <a:ext uri="{9D8B030D-6E8A-4147-A177-3AD203B41FA5}">
+                      <a16:colId xmlns:a16="http://schemas.microsoft.com/office/drawing/2014/main" val="1857474315"/>
+                    </a:ext>
+                  </a:extLst>
+                </a:gridCol>
+                <a:gridCol w="576000">
+                  <a:extLst>
+                    <a:ext uri="{9D8B030D-6E8A-4147-A177-3AD203B41FA5}">
+                      <a16:colId xmlns:a16="http://schemas.microsoft.com/office/drawing/2014/main" val="2831329244"/>
+                    </a:ext>
+                  </a:extLst>
+                </a:gridCol>
+                <a:gridCol w="576000">
+                  <a:extLst>
+                    <a:ext uri="{9D8B030D-6E8A-4147-A177-3AD203B41FA5}">
+                      <a16:colId xmlns:a16="http://schemas.microsoft.com/office/drawing/2014/main" val="1241544523"/>
+                    </a:ext>
+                  </a:extLst>
+                </a:gridCol>
+                <a:gridCol w="576000">
                   <a:extLst>
                     <a:ext uri="{9D8B030D-6E8A-4147-A177-3AD203B41FA5}">
                       <a16:colId xmlns:a16="http://schemas.microsoft.com/office/drawing/2014/main" val="2735060893"/>
                     </a:ext>
                   </a:extLst>
                 </a:gridCol>
-                <a:gridCol w="883243">
+                <a:gridCol w="576000">
                   <a:extLst>
                     <a:ext uri="{9D8B030D-6E8A-4147-A177-3AD203B41FA5}">
                       <a16:colId xmlns:a16="http://schemas.microsoft.com/office/drawing/2014/main" val="3274911069"/>
                     </a:ext>
                   </a:extLst>
                 </a:gridCol>
-                <a:gridCol w="883243">
+                <a:gridCol w="576000">
                   <a:extLst>
                     <a:ext uri="{9D8B030D-6E8A-4147-A177-3AD203B41FA5}">
                       <a16:colId xmlns:a16="http://schemas.microsoft.com/office/drawing/2014/main" val="3195967420"/>
@@ -6284,7 +6320,7 @@
                           <a:latin typeface="Aharoni" panose="02010803020104030203" pitchFamily="2" charset="-79"/>
                           <a:cs typeface="Aharoni" panose="02010803020104030203" pitchFamily="2" charset="-79"/>
                         </a:rPr>
-                        <a:t>     Spiller</a:t>
+                        <a:t>     Lag</a:t>
                       </a:r>
                     </a:p>
                   </a:txBody>
@@ -6300,10 +6336,13 @@
                     <a:lstStyle/>
                     <a:p>
                       <a:pPr algn="ctr"/>
-                      <a:endParaRPr lang="nb-NO" sz="2400" dirty="0">
-                        <a:latin typeface="Aharoni" panose="02010803020104030203" pitchFamily="2" charset="-79"/>
-                        <a:cs typeface="Aharoni" panose="02010803020104030203" pitchFamily="2" charset="-79"/>
-                      </a:endParaRPr>
+                      <a:r>
+                        <a:rPr lang="nb-NO" sz="2400" dirty="0">
+                          <a:latin typeface="Aharoni" panose="02010803020104030203" pitchFamily="2" charset="-79"/>
+                          <a:cs typeface="Aharoni" panose="02010803020104030203" pitchFamily="2" charset="-79"/>
+                        </a:rPr>
+                        <a:t>K</a:t>
+                      </a:r>
                     </a:p>
                   </a:txBody>
                   <a:tcPr marL="15871" marR="15871" marT="7935" marB="7935" anchor="ctr">
@@ -6318,10 +6357,118 @@
                     <a:lstStyle/>
                     <a:p>
                       <a:pPr algn="ctr"/>
-                      <a:endParaRPr lang="nb-NO" sz="2400" dirty="0">
-                        <a:latin typeface="Aharoni" panose="02010803020104030203" pitchFamily="2" charset="-79"/>
-                        <a:cs typeface="Aharoni" panose="02010803020104030203" pitchFamily="2" charset="-79"/>
-                      </a:endParaRPr>
+                      <a:r>
+                        <a:rPr lang="nb-NO" sz="2400" dirty="0">
+                          <a:latin typeface="Aharoni" panose="02010803020104030203" pitchFamily="2" charset="-79"/>
+                          <a:cs typeface="Aharoni" panose="02010803020104030203" pitchFamily="2" charset="-79"/>
+                        </a:rPr>
+                        <a:t>V</a:t>
+                      </a:r>
+                    </a:p>
+                  </a:txBody>
+                  <a:tcPr marL="15871" marR="15871" marT="7935" marB="7935" anchor="ctr">
+                    <a:solidFill>
+                      <a:srgbClr val="FC2A35"/>
+                    </a:solidFill>
+                  </a:tcPr>
+                </a:tc>
+                <a:tc>
+                  <a:txBody>
+                    <a:bodyPr/>
+                    <a:lstStyle/>
+                    <a:p>
+                      <a:pPr algn="ctr"/>
+                      <a:r>
+                        <a:rPr lang="nb-NO" sz="2400" dirty="0">
+                          <a:latin typeface="Aharoni" panose="02010803020104030203" pitchFamily="2" charset="-79"/>
+                          <a:cs typeface="Aharoni" panose="02010803020104030203" pitchFamily="2" charset="-79"/>
+                        </a:rPr>
+                        <a:t>U</a:t>
+                      </a:r>
+                    </a:p>
+                  </a:txBody>
+                  <a:tcPr marL="15871" marR="15871" marT="7935" marB="7935" anchor="ctr">
+                    <a:solidFill>
+                      <a:srgbClr val="FC2A35"/>
+                    </a:solidFill>
+                  </a:tcPr>
+                </a:tc>
+                <a:tc>
+                  <a:txBody>
+                    <a:bodyPr/>
+                    <a:lstStyle/>
+                    <a:p>
+                      <a:pPr algn="ctr"/>
+                      <a:r>
+                        <a:rPr lang="nb-NO" sz="2400" dirty="0">
+                          <a:latin typeface="Aharoni" panose="02010803020104030203" pitchFamily="2" charset="-79"/>
+                          <a:cs typeface="Aharoni" panose="02010803020104030203" pitchFamily="2" charset="-79"/>
+                        </a:rPr>
+                        <a:t>T</a:t>
+                      </a:r>
+                    </a:p>
+                  </a:txBody>
+                  <a:tcPr marL="15871" marR="15871" marT="7935" marB="7935" anchor="ctr">
+                    <a:solidFill>
+                      <a:srgbClr val="FC2A35"/>
+                    </a:solidFill>
+                  </a:tcPr>
+                </a:tc>
+                <a:tc>
+                  <a:txBody>
+                    <a:bodyPr/>
+                    <a:lstStyle/>
+                    <a:p>
+                      <a:pPr algn="ctr"/>
+                      <a:r>
+                        <a:rPr lang="nb-NO" sz="2400" dirty="0">
+                          <a:latin typeface="Aharoni" panose="02010803020104030203" pitchFamily="2" charset="-79"/>
+                          <a:cs typeface="Aharoni" panose="02010803020104030203" pitchFamily="2" charset="-79"/>
+                        </a:rPr>
+                        <a:t>+</a:t>
+                      </a:r>
+                    </a:p>
+                  </a:txBody>
+                  <a:tcPr marL="15871" marR="15871" marT="7935" marB="7935" anchor="ctr">
+                    <a:solidFill>
+                      <a:srgbClr val="FC2A35"/>
+                    </a:solidFill>
+                  </a:tcPr>
+                </a:tc>
+                <a:tc>
+                  <a:txBody>
+                    <a:bodyPr/>
+                    <a:lstStyle/>
+                    <a:p>
+                      <a:pPr algn="ctr"/>
+                      <a:r>
+                        <a:rPr lang="nb-NO" sz="2400" dirty="0">
+                          <a:latin typeface="Aharoni" panose="02010803020104030203" pitchFamily="2" charset="-79"/>
+                          <a:cs typeface="Aharoni" panose="02010803020104030203" pitchFamily="2" charset="-79"/>
+                        </a:rPr>
+                        <a:t>-</a:t>
+                      </a:r>
+                    </a:p>
+                  </a:txBody>
+                  <a:tcPr marL="15871" marR="15871" marT="7935" marB="7935" anchor="ctr">
+                    <a:solidFill>
+                      <a:srgbClr val="FC2A35"/>
+                    </a:solidFill>
+                  </a:tcPr>
+                </a:tc>
+                <a:tc>
+                  <a:txBody>
+                    <a:bodyPr/>
+                    <a:lstStyle/>
+                    <a:p>
+                      <a:pPr algn="ctr"/>
+                      <a:r>
+                        <a:rPr lang="nb-NO" sz="2400" dirty="0">
+                          <a:latin typeface="Aharoni" panose="02010803020104030203" pitchFamily="2" charset="-79"/>
+                          <a:cs typeface="Aharoni" panose="02010803020104030203" pitchFamily="2" charset="-79"/>
+                        </a:rPr>
+                        <a:t>+/-</a:t>
+                      </a:r>
                     </a:p>
                   </a:txBody>
                   <a:tcPr marL="15871" marR="15871" marT="7935" marB="7935" anchor="ctr">
@@ -6411,6 +6558,71 @@
                   </a:txBody>
                   <a:tcPr marL="15871" marR="15871" marT="7935" marB="7935"/>
                 </a:tc>
+                <a:tc>
+                  <a:txBody>
+                    <a:bodyPr/>
+                    <a:lstStyle/>
+                    <a:p>
+                      <a:endParaRPr lang="nb-NO" sz="3200" dirty="0">
+                        <a:latin typeface="Aharoni" panose="02010803020104030203" pitchFamily="2" charset="-79"/>
+                        <a:cs typeface="Aharoni" panose="02010803020104030203" pitchFamily="2" charset="-79"/>
+                      </a:endParaRPr>
+                    </a:p>
+                  </a:txBody>
+                  <a:tcPr marL="15871" marR="15871" marT="7935" marB="7935"/>
+                </a:tc>
+                <a:tc>
+                  <a:txBody>
+                    <a:bodyPr/>
+                    <a:lstStyle/>
+                    <a:p>
+                      <a:endParaRPr lang="nb-NO" sz="3200" dirty="0">
+                        <a:latin typeface="Aharoni" panose="02010803020104030203" pitchFamily="2" charset="-79"/>
+                        <a:cs typeface="Aharoni" panose="02010803020104030203" pitchFamily="2" charset="-79"/>
+                      </a:endParaRPr>
+                    </a:p>
+                  </a:txBody>
+                  <a:tcPr marL="15871" marR="15871" marT="7935" marB="7935"/>
+                </a:tc>
+                <a:tc>
+                  <a:txBody>
+                    <a:bodyPr/>
+                    <a:lstStyle/>
+                    <a:p>
+                      <a:endParaRPr lang="nb-NO" sz="3200" dirty="0">
+                        <a:latin typeface="Aharoni" panose="02010803020104030203" pitchFamily="2" charset="-79"/>
+                        <a:cs typeface="Aharoni" panose="02010803020104030203" pitchFamily="2" charset="-79"/>
+                      </a:endParaRPr>
+                    </a:p>
+                  </a:txBody>
+                  <a:tcPr marL="15871" marR="15871" marT="7935" marB="7935"/>
+                </a:tc>
+                <a:tc>
+                  <a:txBody>
+                    <a:bodyPr/>
+                    <a:lstStyle/>
+                    <a:p>
+                      <a:endParaRPr lang="nb-NO" sz="3200" dirty="0">
+                        <a:latin typeface="Aharoni" panose="02010803020104030203" pitchFamily="2" charset="-79"/>
+                        <a:cs typeface="Aharoni" panose="02010803020104030203" pitchFamily="2" charset="-79"/>
+                      </a:endParaRPr>
+                    </a:p>
+                  </a:txBody>
+                  <a:tcPr marL="15871" marR="15871" marT="7935" marB="7935"/>
+                </a:tc>
+                <a:tc>
+                  <a:txBody>
+                    <a:bodyPr/>
+                    <a:lstStyle/>
+                    <a:p>
+                      <a:endParaRPr lang="nb-NO" sz="3200" dirty="0">
+                        <a:latin typeface="Aharoni" panose="02010803020104030203" pitchFamily="2" charset="-79"/>
+                        <a:cs typeface="Aharoni" panose="02010803020104030203" pitchFamily="2" charset="-79"/>
+                      </a:endParaRPr>
+                    </a:p>
+                  </a:txBody>
+                  <a:tcPr marL="15871" marR="15871" marT="7935" marB="7935"/>
+                </a:tc>
                 <a:extLst>
                   <a:ext uri="{0D108BD9-81ED-4DB2-BD59-A6C34878D82A}">
                     <a16:rowId xmlns:a16="http://schemas.microsoft.com/office/drawing/2014/main" val="970016319"/>
@@ -6495,6 +6707,101 @@
                     </a:solidFill>
                   </a:tcPr>
                 </a:tc>
+                <a:tc>
+                  <a:txBody>
+                    <a:bodyPr/>
+                    <a:lstStyle/>
+                    <a:p>
+                      <a:endParaRPr lang="nb-NO" sz="3200" dirty="0">
+                        <a:latin typeface="Aharoni" panose="02010803020104030203" pitchFamily="2" charset="-79"/>
+                        <a:cs typeface="Aharoni" panose="02010803020104030203" pitchFamily="2" charset="-79"/>
+                      </a:endParaRPr>
+                    </a:p>
+                  </a:txBody>
+                  <a:tcPr marL="15871" marR="15871" marT="7935" marB="7935">
+                    <a:solidFill>
+                      <a:srgbClr val="FC2A35">
+                        <a:alpha val="50196"/>
+                      </a:srgbClr>
+                    </a:solidFill>
+                  </a:tcPr>
+                </a:tc>
+                <a:tc>
+                  <a:txBody>
+                    <a:bodyPr/>
+                    <a:lstStyle/>
+                    <a:p>
+                      <a:endParaRPr lang="nb-NO" sz="3200" dirty="0">
+                        <a:latin typeface="Aharoni" panose="02010803020104030203" pitchFamily="2" charset="-79"/>
+                        <a:cs typeface="Aharoni" panose="02010803020104030203" pitchFamily="2" charset="-79"/>
+                      </a:endParaRPr>
+                    </a:p>
+                  </a:txBody>
+                  <a:tcPr marL="15871" marR="15871" marT="7935" marB="7935">
+                    <a:solidFill>
+                      <a:srgbClr val="FC2A35">
+                        <a:alpha val="50196"/>
+                      </a:srgbClr>
+                    </a:solidFill>
+                  </a:tcPr>
+                </a:tc>
+                <a:tc>
+                  <a:txBody>
+                    <a:bodyPr/>
+                    <a:lstStyle/>
+                    <a:p>
+                      <a:endParaRPr lang="nb-NO" sz="3200" dirty="0">
+                        <a:latin typeface="Aharoni" panose="02010803020104030203" pitchFamily="2" charset="-79"/>
+                        <a:cs typeface="Aharoni" panose="02010803020104030203" pitchFamily="2" charset="-79"/>
+                      </a:endParaRPr>
+                    </a:p>
+                  </a:txBody>
+                  <a:tcPr marL="15871" marR="15871" marT="7935" marB="7935">
+                    <a:solidFill>
+                      <a:srgbClr val="FC2A35">
+                        <a:alpha val="50196"/>
+                      </a:srgbClr>
+                    </a:solidFill>
+                  </a:tcPr>
+                </a:tc>
+                <a:tc>
+                  <a:txBody>
+                    <a:bodyPr/>
+                    <a:lstStyle/>
+                    <a:p>
+                      <a:endParaRPr lang="nb-NO" sz="3200" dirty="0">
+                        <a:latin typeface="Aharoni" panose="02010803020104030203" pitchFamily="2" charset="-79"/>
+                        <a:cs typeface="Aharoni" panose="02010803020104030203" pitchFamily="2" charset="-79"/>
+                      </a:endParaRPr>
+                    </a:p>
+                  </a:txBody>
+                  <a:tcPr marL="15871" marR="15871" marT="7935" marB="7935">
+                    <a:solidFill>
+                      <a:srgbClr val="FC2A35">
+                        <a:alpha val="50196"/>
+                      </a:srgbClr>
+                    </a:solidFill>
+                  </a:tcPr>
+                </a:tc>
+                <a:tc>
+                  <a:txBody>
+                    <a:bodyPr/>
+                    <a:lstStyle/>
+                    <a:p>
+                      <a:endParaRPr lang="nb-NO" sz="3200" dirty="0">
+                        <a:latin typeface="Aharoni" panose="02010803020104030203" pitchFamily="2" charset="-79"/>
+                        <a:cs typeface="Aharoni" panose="02010803020104030203" pitchFamily="2" charset="-79"/>
+                      </a:endParaRPr>
+                    </a:p>
+                  </a:txBody>
+                  <a:tcPr marL="15871" marR="15871" marT="7935" marB="7935">
+                    <a:solidFill>
+                      <a:srgbClr val="FC2A35">
+                        <a:alpha val="50196"/>
+                      </a:srgbClr>
+                    </a:solidFill>
+                  </a:tcPr>
+                </a:tc>
                 <a:extLst>
                   <a:ext uri="{0D108BD9-81ED-4DB2-BD59-A6C34878D82A}">
                     <a16:rowId xmlns:a16="http://schemas.microsoft.com/office/drawing/2014/main" val="1768278853"/>
@@ -6521,6 +6828,71 @@
                     <a:bodyPr/>
                     <a:lstStyle/>
                     <a:p>
+                      <a:endParaRPr lang="nb-NO" sz="3200">
+                        <a:latin typeface="Aharoni" panose="02010803020104030203" pitchFamily="2" charset="-79"/>
+                        <a:cs typeface="Aharoni" panose="02010803020104030203" pitchFamily="2" charset="-79"/>
+                      </a:endParaRPr>
+                    </a:p>
+                  </a:txBody>
+                  <a:tcPr marL="15871" marR="15871" marT="7935" marB="7935"/>
+                </a:tc>
+                <a:tc>
+                  <a:txBody>
+                    <a:bodyPr/>
+                    <a:lstStyle/>
+                    <a:p>
+                      <a:endParaRPr lang="nb-NO" sz="3200" dirty="0">
+                        <a:latin typeface="Aharoni" panose="02010803020104030203" pitchFamily="2" charset="-79"/>
+                        <a:cs typeface="Aharoni" panose="02010803020104030203" pitchFamily="2" charset="-79"/>
+                      </a:endParaRPr>
+                    </a:p>
+                  </a:txBody>
+                  <a:tcPr marL="15871" marR="15871" marT="7935" marB="7935"/>
+                </a:tc>
+                <a:tc>
+                  <a:txBody>
+                    <a:bodyPr/>
+                    <a:lstStyle/>
+                    <a:p>
+                      <a:endParaRPr lang="nb-NO" sz="3200" dirty="0">
+                        <a:latin typeface="Aharoni" panose="02010803020104030203" pitchFamily="2" charset="-79"/>
+                        <a:cs typeface="Aharoni" panose="02010803020104030203" pitchFamily="2" charset="-79"/>
+                      </a:endParaRPr>
+                    </a:p>
+                  </a:txBody>
+                  <a:tcPr marL="15871" marR="15871" marT="7935" marB="7935"/>
+                </a:tc>
+                <a:tc>
+                  <a:txBody>
+                    <a:bodyPr/>
+                    <a:lstStyle/>
+                    <a:p>
+                      <a:endParaRPr lang="nb-NO" sz="3200">
+                        <a:latin typeface="Aharoni" panose="02010803020104030203" pitchFamily="2" charset="-79"/>
+                        <a:cs typeface="Aharoni" panose="02010803020104030203" pitchFamily="2" charset="-79"/>
+                      </a:endParaRPr>
+                    </a:p>
+                  </a:txBody>
+                  <a:tcPr marL="15871" marR="15871" marT="7935" marB="7935"/>
+                </a:tc>
+                <a:tc>
+                  <a:txBody>
+                    <a:bodyPr/>
+                    <a:lstStyle/>
+                    <a:p>
+                      <a:endParaRPr lang="nb-NO" sz="3200" dirty="0">
+                        <a:latin typeface="Aharoni" panose="02010803020104030203" pitchFamily="2" charset="-79"/>
+                        <a:cs typeface="Aharoni" panose="02010803020104030203" pitchFamily="2" charset="-79"/>
+                      </a:endParaRPr>
+                    </a:p>
+                  </a:txBody>
+                  <a:tcPr marL="15871" marR="15871" marT="7935" marB="7935"/>
+                </a:tc>
+                <a:tc>
+                  <a:txBody>
+                    <a:bodyPr/>
+                    <a:lstStyle/>
+                    <a:p>
                       <a:endParaRPr lang="nb-NO" sz="3200" dirty="0">
                         <a:latin typeface="Aharoni" panose="02010803020104030203" pitchFamily="2" charset="-79"/>
                         <a:cs typeface="Aharoni" panose="02010803020104030203" pitchFamily="2" charset="-79"/>
@@ -6639,6 +7011,101 @@
                     </a:solidFill>
                   </a:tcPr>
                 </a:tc>
+                <a:tc>
+                  <a:txBody>
+                    <a:bodyPr/>
+                    <a:lstStyle/>
+                    <a:p>
+                      <a:endParaRPr lang="nb-NO" sz="3200" dirty="0">
+                        <a:latin typeface="Aharoni" panose="02010803020104030203" pitchFamily="2" charset="-79"/>
+                        <a:cs typeface="Aharoni" panose="02010803020104030203" pitchFamily="2" charset="-79"/>
+                      </a:endParaRPr>
+                    </a:p>
+                  </a:txBody>
+                  <a:tcPr marL="15871" marR="15871" marT="7935" marB="7935">
+                    <a:solidFill>
+                      <a:srgbClr val="FC2A35">
+                        <a:alpha val="50196"/>
+                      </a:srgbClr>
+                    </a:solidFill>
+                  </a:tcPr>
+                </a:tc>
+                <a:tc>
+                  <a:txBody>
+                    <a:bodyPr/>
+                    <a:lstStyle/>
+                    <a:p>
+                      <a:endParaRPr lang="nb-NO" sz="3200" dirty="0">
+                        <a:latin typeface="Aharoni" panose="02010803020104030203" pitchFamily="2" charset="-79"/>
+                        <a:cs typeface="Aharoni" panose="02010803020104030203" pitchFamily="2" charset="-79"/>
+                      </a:endParaRPr>
+                    </a:p>
+                  </a:txBody>
+                  <a:tcPr marL="15871" marR="15871" marT="7935" marB="7935">
+                    <a:solidFill>
+                      <a:srgbClr val="FC2A35">
+                        <a:alpha val="50196"/>
+                      </a:srgbClr>
+                    </a:solidFill>
+                  </a:tcPr>
+                </a:tc>
+                <a:tc>
+                  <a:txBody>
+                    <a:bodyPr/>
+                    <a:lstStyle/>
+                    <a:p>
+                      <a:endParaRPr lang="nb-NO" sz="3200" dirty="0">
+                        <a:latin typeface="Aharoni" panose="02010803020104030203" pitchFamily="2" charset="-79"/>
+                        <a:cs typeface="Aharoni" panose="02010803020104030203" pitchFamily="2" charset="-79"/>
+                      </a:endParaRPr>
+                    </a:p>
+                  </a:txBody>
+                  <a:tcPr marL="15871" marR="15871" marT="7935" marB="7935">
+                    <a:solidFill>
+                      <a:srgbClr val="FC2A35">
+                        <a:alpha val="50196"/>
+                      </a:srgbClr>
+                    </a:solidFill>
+                  </a:tcPr>
+                </a:tc>
+                <a:tc>
+                  <a:txBody>
+                    <a:bodyPr/>
+                    <a:lstStyle/>
+                    <a:p>
+                      <a:endParaRPr lang="nb-NO" sz="3200" dirty="0">
+                        <a:latin typeface="Aharoni" panose="02010803020104030203" pitchFamily="2" charset="-79"/>
+                        <a:cs typeface="Aharoni" panose="02010803020104030203" pitchFamily="2" charset="-79"/>
+                      </a:endParaRPr>
+                    </a:p>
+                  </a:txBody>
+                  <a:tcPr marL="15871" marR="15871" marT="7935" marB="7935">
+                    <a:solidFill>
+                      <a:srgbClr val="FC2A35">
+                        <a:alpha val="50196"/>
+                      </a:srgbClr>
+                    </a:solidFill>
+                  </a:tcPr>
+                </a:tc>
+                <a:tc>
+                  <a:txBody>
+                    <a:bodyPr/>
+                    <a:lstStyle/>
+                    <a:p>
+                      <a:endParaRPr lang="nb-NO" sz="3200" dirty="0">
+                        <a:latin typeface="Aharoni" panose="02010803020104030203" pitchFamily="2" charset="-79"/>
+                        <a:cs typeface="Aharoni" panose="02010803020104030203" pitchFamily="2" charset="-79"/>
+                      </a:endParaRPr>
+                    </a:p>
+                  </a:txBody>
+                  <a:tcPr marL="15871" marR="15871" marT="7935" marB="7935">
+                    <a:solidFill>
+                      <a:srgbClr val="FC2A35">
+                        <a:alpha val="50196"/>
+                      </a:srgbClr>
+                    </a:solidFill>
+                  </a:tcPr>
+                </a:tc>
                 <a:extLst>
                   <a:ext uri="{0D108BD9-81ED-4DB2-BD59-A6C34878D82A}">
                     <a16:rowId xmlns:a16="http://schemas.microsoft.com/office/drawing/2014/main" val="562444116"/>
@@ -6665,6 +7132,71 @@
                     <a:bodyPr/>
                     <a:lstStyle/>
                     <a:p>
+                      <a:endParaRPr lang="nb-NO" sz="3200" dirty="0">
+                        <a:latin typeface="Aharoni" panose="02010803020104030203" pitchFamily="2" charset="-79"/>
+                        <a:cs typeface="Aharoni" panose="02010803020104030203" pitchFamily="2" charset="-79"/>
+                      </a:endParaRPr>
+                    </a:p>
+                  </a:txBody>
+                  <a:tcPr marL="15871" marR="15871" marT="7935" marB="7935"/>
+                </a:tc>
+                <a:tc>
+                  <a:txBody>
+                    <a:bodyPr/>
+                    <a:lstStyle/>
+                    <a:p>
+                      <a:endParaRPr lang="nb-NO" sz="3200">
+                        <a:latin typeface="Aharoni" panose="02010803020104030203" pitchFamily="2" charset="-79"/>
+                        <a:cs typeface="Aharoni" panose="02010803020104030203" pitchFamily="2" charset="-79"/>
+                      </a:endParaRPr>
+                    </a:p>
+                  </a:txBody>
+                  <a:tcPr marL="15871" marR="15871" marT="7935" marB="7935"/>
+                </a:tc>
+                <a:tc>
+                  <a:txBody>
+                    <a:bodyPr/>
+                    <a:lstStyle/>
+                    <a:p>
+                      <a:endParaRPr lang="nb-NO" sz="3200">
+                        <a:latin typeface="Aharoni" panose="02010803020104030203" pitchFamily="2" charset="-79"/>
+                        <a:cs typeface="Aharoni" panose="02010803020104030203" pitchFamily="2" charset="-79"/>
+                      </a:endParaRPr>
+                    </a:p>
+                  </a:txBody>
+                  <a:tcPr marL="15871" marR="15871" marT="7935" marB="7935"/>
+                </a:tc>
+                <a:tc>
+                  <a:txBody>
+                    <a:bodyPr/>
+                    <a:lstStyle/>
+                    <a:p>
+                      <a:endParaRPr lang="nb-NO" sz="3200">
+                        <a:latin typeface="Aharoni" panose="02010803020104030203" pitchFamily="2" charset="-79"/>
+                        <a:cs typeface="Aharoni" panose="02010803020104030203" pitchFamily="2" charset="-79"/>
+                      </a:endParaRPr>
+                    </a:p>
+                  </a:txBody>
+                  <a:tcPr marL="15871" marR="15871" marT="7935" marB="7935"/>
+                </a:tc>
+                <a:tc>
+                  <a:txBody>
+                    <a:bodyPr/>
+                    <a:lstStyle/>
+                    <a:p>
+                      <a:endParaRPr lang="nb-NO" sz="3200">
+                        <a:latin typeface="Aharoni" panose="02010803020104030203" pitchFamily="2" charset="-79"/>
+                        <a:cs typeface="Aharoni" panose="02010803020104030203" pitchFamily="2" charset="-79"/>
+                      </a:endParaRPr>
+                    </a:p>
+                  </a:txBody>
+                  <a:tcPr marL="15871" marR="15871" marT="7935" marB="7935"/>
+                </a:tc>
+                <a:tc>
+                  <a:txBody>
+                    <a:bodyPr/>
+                    <a:lstStyle/>
+                    <a:p>
                       <a:endParaRPr lang="nb-NO" sz="3200">
                         <a:latin typeface="Aharoni" panose="02010803020104030203" pitchFamily="2" charset="-79"/>
                         <a:cs typeface="Aharoni" panose="02010803020104030203" pitchFamily="2" charset="-79"/>
@@ -6783,6 +7315,101 @@
                     </a:solidFill>
                   </a:tcPr>
                 </a:tc>
+                <a:tc>
+                  <a:txBody>
+                    <a:bodyPr/>
+                    <a:lstStyle/>
+                    <a:p>
+                      <a:endParaRPr lang="nb-NO" sz="3200" dirty="0">
+                        <a:latin typeface="Aharoni" panose="02010803020104030203" pitchFamily="2" charset="-79"/>
+                        <a:cs typeface="Aharoni" panose="02010803020104030203" pitchFamily="2" charset="-79"/>
+                      </a:endParaRPr>
+                    </a:p>
+                  </a:txBody>
+                  <a:tcPr marL="15871" marR="15871" marT="7935" marB="7935">
+                    <a:solidFill>
+                      <a:srgbClr val="FC2A35">
+                        <a:alpha val="50196"/>
+                      </a:srgbClr>
+                    </a:solidFill>
+                  </a:tcPr>
+                </a:tc>
+                <a:tc>
+                  <a:txBody>
+                    <a:bodyPr/>
+                    <a:lstStyle/>
+                    <a:p>
+                      <a:endParaRPr lang="nb-NO" sz="3200" dirty="0">
+                        <a:latin typeface="Aharoni" panose="02010803020104030203" pitchFamily="2" charset="-79"/>
+                        <a:cs typeface="Aharoni" panose="02010803020104030203" pitchFamily="2" charset="-79"/>
+                      </a:endParaRPr>
+                    </a:p>
+                  </a:txBody>
+                  <a:tcPr marL="15871" marR="15871" marT="7935" marB="7935">
+                    <a:solidFill>
+                      <a:srgbClr val="FC2A35">
+                        <a:alpha val="50196"/>
+                      </a:srgbClr>
+                    </a:solidFill>
+                  </a:tcPr>
+                </a:tc>
+                <a:tc>
+                  <a:txBody>
+                    <a:bodyPr/>
+                    <a:lstStyle/>
+                    <a:p>
+                      <a:endParaRPr lang="nb-NO" sz="3200" dirty="0">
+                        <a:latin typeface="Aharoni" panose="02010803020104030203" pitchFamily="2" charset="-79"/>
+                        <a:cs typeface="Aharoni" panose="02010803020104030203" pitchFamily="2" charset="-79"/>
+                      </a:endParaRPr>
+                    </a:p>
+                  </a:txBody>
+                  <a:tcPr marL="15871" marR="15871" marT="7935" marB="7935">
+                    <a:solidFill>
+                      <a:srgbClr val="FC2A35">
+                        <a:alpha val="50196"/>
+                      </a:srgbClr>
+                    </a:solidFill>
+                  </a:tcPr>
+                </a:tc>
+                <a:tc>
+                  <a:txBody>
+                    <a:bodyPr/>
+                    <a:lstStyle/>
+                    <a:p>
+                      <a:endParaRPr lang="nb-NO" sz="3200" dirty="0">
+                        <a:latin typeface="Aharoni" panose="02010803020104030203" pitchFamily="2" charset="-79"/>
+                        <a:cs typeface="Aharoni" panose="02010803020104030203" pitchFamily="2" charset="-79"/>
+                      </a:endParaRPr>
+                    </a:p>
+                  </a:txBody>
+                  <a:tcPr marL="15871" marR="15871" marT="7935" marB="7935">
+                    <a:solidFill>
+                      <a:srgbClr val="FC2A35">
+                        <a:alpha val="50196"/>
+                      </a:srgbClr>
+                    </a:solidFill>
+                  </a:tcPr>
+                </a:tc>
+                <a:tc>
+                  <a:txBody>
+                    <a:bodyPr/>
+                    <a:lstStyle/>
+                    <a:p>
+                      <a:endParaRPr lang="nb-NO" sz="3200" dirty="0">
+                        <a:latin typeface="Aharoni" panose="02010803020104030203" pitchFamily="2" charset="-79"/>
+                        <a:cs typeface="Aharoni" panose="02010803020104030203" pitchFamily="2" charset="-79"/>
+                      </a:endParaRPr>
+                    </a:p>
+                  </a:txBody>
+                  <a:tcPr marL="15871" marR="15871" marT="7935" marB="7935">
+                    <a:solidFill>
+                      <a:srgbClr val="FC2A35">
+                        <a:alpha val="50196"/>
+                      </a:srgbClr>
+                    </a:solidFill>
+                  </a:tcPr>
+                </a:tc>
                 <a:extLst>
                   <a:ext uri="{0D108BD9-81ED-4DB2-BD59-A6C34878D82A}">
                     <a16:rowId xmlns:a16="http://schemas.microsoft.com/office/drawing/2014/main" val="523711046"/>
@@ -6809,6 +7436,71 @@
                     <a:bodyPr/>
                     <a:lstStyle/>
                     <a:p>
+                      <a:endParaRPr lang="nb-NO" sz="3200">
+                        <a:latin typeface="Aharoni" panose="02010803020104030203" pitchFamily="2" charset="-79"/>
+                        <a:cs typeface="Aharoni" panose="02010803020104030203" pitchFamily="2" charset="-79"/>
+                      </a:endParaRPr>
+                    </a:p>
+                  </a:txBody>
+                  <a:tcPr marL="15871" marR="15871" marT="7935" marB="7935"/>
+                </a:tc>
+                <a:tc>
+                  <a:txBody>
+                    <a:bodyPr/>
+                    <a:lstStyle/>
+                    <a:p>
+                      <a:endParaRPr lang="nb-NO" sz="3200">
+                        <a:latin typeface="Aharoni" panose="02010803020104030203" pitchFamily="2" charset="-79"/>
+                        <a:cs typeface="Aharoni" panose="02010803020104030203" pitchFamily="2" charset="-79"/>
+                      </a:endParaRPr>
+                    </a:p>
+                  </a:txBody>
+                  <a:tcPr marL="15871" marR="15871" marT="7935" marB="7935"/>
+                </a:tc>
+                <a:tc>
+                  <a:txBody>
+                    <a:bodyPr/>
+                    <a:lstStyle/>
+                    <a:p>
+                      <a:endParaRPr lang="nb-NO" sz="3200">
+                        <a:latin typeface="Aharoni" panose="02010803020104030203" pitchFamily="2" charset="-79"/>
+                        <a:cs typeface="Aharoni" panose="02010803020104030203" pitchFamily="2" charset="-79"/>
+                      </a:endParaRPr>
+                    </a:p>
+                  </a:txBody>
+                  <a:tcPr marL="15871" marR="15871" marT="7935" marB="7935"/>
+                </a:tc>
+                <a:tc>
+                  <a:txBody>
+                    <a:bodyPr/>
+                    <a:lstStyle/>
+                    <a:p>
+                      <a:endParaRPr lang="nb-NO" sz="3200" dirty="0">
+                        <a:latin typeface="Aharoni" panose="02010803020104030203" pitchFamily="2" charset="-79"/>
+                        <a:cs typeface="Aharoni" panose="02010803020104030203" pitchFamily="2" charset="-79"/>
+                      </a:endParaRPr>
+                    </a:p>
+                  </a:txBody>
+                  <a:tcPr marL="15871" marR="15871" marT="7935" marB="7935"/>
+                </a:tc>
+                <a:tc>
+                  <a:txBody>
+                    <a:bodyPr/>
+                    <a:lstStyle/>
+                    <a:p>
+                      <a:endParaRPr lang="nb-NO" sz="3200" dirty="0">
+                        <a:latin typeface="Aharoni" panose="02010803020104030203" pitchFamily="2" charset="-79"/>
+                        <a:cs typeface="Aharoni" panose="02010803020104030203" pitchFamily="2" charset="-79"/>
+                      </a:endParaRPr>
+                    </a:p>
+                  </a:txBody>
+                  <a:tcPr marL="15871" marR="15871" marT="7935" marB="7935"/>
+                </a:tc>
+                <a:tc>
+                  <a:txBody>
+                    <a:bodyPr/>
+                    <a:lstStyle/>
+                    <a:p>
                       <a:endParaRPr lang="nb-NO" sz="3200" dirty="0">
                         <a:latin typeface="Aharoni" panose="02010803020104030203" pitchFamily="2" charset="-79"/>
                         <a:cs typeface="Aharoni" panose="02010803020104030203" pitchFamily="2" charset="-79"/>
@@ -6894,6 +7586,101 @@
                     <a:bodyPr/>
                     <a:lstStyle/>
                     <a:p>
+                      <a:endParaRPr lang="nb-NO" sz="3200">
+                        <a:latin typeface="Aharoni" panose="02010803020104030203" pitchFamily="2" charset="-79"/>
+                        <a:cs typeface="Aharoni" panose="02010803020104030203" pitchFamily="2" charset="-79"/>
+                      </a:endParaRPr>
+                    </a:p>
+                  </a:txBody>
+                  <a:tcPr marL="15871" marR="15871" marT="7935" marB="7935">
+                    <a:solidFill>
+                      <a:srgbClr val="FC2A35">
+                        <a:alpha val="50196"/>
+                      </a:srgbClr>
+                    </a:solidFill>
+                  </a:tcPr>
+                </a:tc>
+                <a:tc>
+                  <a:txBody>
+                    <a:bodyPr/>
+                    <a:lstStyle/>
+                    <a:p>
+                      <a:endParaRPr lang="nb-NO" sz="3200" dirty="0">
+                        <a:latin typeface="Aharoni" panose="02010803020104030203" pitchFamily="2" charset="-79"/>
+                        <a:cs typeface="Aharoni" panose="02010803020104030203" pitchFamily="2" charset="-79"/>
+                      </a:endParaRPr>
+                    </a:p>
+                  </a:txBody>
+                  <a:tcPr marL="15871" marR="15871" marT="7935" marB="7935">
+                    <a:solidFill>
+                      <a:srgbClr val="FC2A35">
+                        <a:alpha val="50196"/>
+                      </a:srgbClr>
+                    </a:solidFill>
+                  </a:tcPr>
+                </a:tc>
+                <a:tc>
+                  <a:txBody>
+                    <a:bodyPr/>
+                    <a:lstStyle/>
+                    <a:p>
+                      <a:endParaRPr lang="nb-NO" sz="3200" dirty="0">
+                        <a:latin typeface="Aharoni" panose="02010803020104030203" pitchFamily="2" charset="-79"/>
+                        <a:cs typeface="Aharoni" panose="02010803020104030203" pitchFamily="2" charset="-79"/>
+                      </a:endParaRPr>
+                    </a:p>
+                  </a:txBody>
+                  <a:tcPr marL="15871" marR="15871" marT="7935" marB="7935">
+                    <a:solidFill>
+                      <a:srgbClr val="FC2A35">
+                        <a:alpha val="50196"/>
+                      </a:srgbClr>
+                    </a:solidFill>
+                  </a:tcPr>
+                </a:tc>
+                <a:tc>
+                  <a:txBody>
+                    <a:bodyPr/>
+                    <a:lstStyle/>
+                    <a:p>
+                      <a:endParaRPr lang="nb-NO" sz="3200" dirty="0">
+                        <a:latin typeface="Aharoni" panose="02010803020104030203" pitchFamily="2" charset="-79"/>
+                        <a:cs typeface="Aharoni" panose="02010803020104030203" pitchFamily="2" charset="-79"/>
+                      </a:endParaRPr>
+                    </a:p>
+                  </a:txBody>
+                  <a:tcPr marL="15871" marR="15871" marT="7935" marB="7935">
+                    <a:solidFill>
+                      <a:srgbClr val="FC2A35">
+                        <a:alpha val="50196"/>
+                      </a:srgbClr>
+                    </a:solidFill>
+                  </a:tcPr>
+                </a:tc>
+                <a:tc>
+                  <a:txBody>
+                    <a:bodyPr/>
+                    <a:lstStyle/>
+                    <a:p>
+                      <a:endParaRPr lang="nb-NO" sz="3200" dirty="0">
+                        <a:latin typeface="Aharoni" panose="02010803020104030203" pitchFamily="2" charset="-79"/>
+                        <a:cs typeface="Aharoni" panose="02010803020104030203" pitchFamily="2" charset="-79"/>
+                      </a:endParaRPr>
+                    </a:p>
+                  </a:txBody>
+                  <a:tcPr marL="15871" marR="15871" marT="7935" marB="7935">
+                    <a:solidFill>
+                      <a:srgbClr val="FC2A35">
+                        <a:alpha val="50196"/>
+                      </a:srgbClr>
+                    </a:solidFill>
+                  </a:tcPr>
+                </a:tc>
+                <a:tc>
+                  <a:txBody>
+                    <a:bodyPr/>
+                    <a:lstStyle/>
+                    <a:p>
                       <a:endParaRPr lang="nb-NO" sz="3200" dirty="0">
                         <a:latin typeface="Aharoni" panose="02010803020104030203" pitchFamily="2" charset="-79"/>
                         <a:cs typeface="Aharoni" panose="02010803020104030203" pitchFamily="2" charset="-79"/>
@@ -6953,6 +7740,71 @@
                     <a:bodyPr/>
                     <a:lstStyle/>
                     <a:p>
+                      <a:endParaRPr lang="nb-NO" sz="3200" dirty="0">
+                        <a:latin typeface="Aharoni" panose="02010803020104030203" pitchFamily="2" charset="-79"/>
+                        <a:cs typeface="Aharoni" panose="02010803020104030203" pitchFamily="2" charset="-79"/>
+                      </a:endParaRPr>
+                    </a:p>
+                  </a:txBody>
+                  <a:tcPr marL="15871" marR="15871" marT="7935" marB="7935"/>
+                </a:tc>
+                <a:tc>
+                  <a:txBody>
+                    <a:bodyPr/>
+                    <a:lstStyle/>
+                    <a:p>
+                      <a:endParaRPr lang="nb-NO" sz="3200">
+                        <a:latin typeface="Aharoni" panose="02010803020104030203" pitchFamily="2" charset="-79"/>
+                        <a:cs typeface="Aharoni" panose="02010803020104030203" pitchFamily="2" charset="-79"/>
+                      </a:endParaRPr>
+                    </a:p>
+                  </a:txBody>
+                  <a:tcPr marL="15871" marR="15871" marT="7935" marB="7935"/>
+                </a:tc>
+                <a:tc>
+                  <a:txBody>
+                    <a:bodyPr/>
+                    <a:lstStyle/>
+                    <a:p>
+                      <a:endParaRPr lang="nb-NO" sz="3200">
+                        <a:latin typeface="Aharoni" panose="02010803020104030203" pitchFamily="2" charset="-79"/>
+                        <a:cs typeface="Aharoni" panose="02010803020104030203" pitchFamily="2" charset="-79"/>
+                      </a:endParaRPr>
+                    </a:p>
+                  </a:txBody>
+                  <a:tcPr marL="15871" marR="15871" marT="7935" marB="7935"/>
+                </a:tc>
+                <a:tc>
+                  <a:txBody>
+                    <a:bodyPr/>
+                    <a:lstStyle/>
+                    <a:p>
+                      <a:endParaRPr lang="nb-NO" sz="3200">
+                        <a:latin typeface="Aharoni" panose="02010803020104030203" pitchFamily="2" charset="-79"/>
+                        <a:cs typeface="Aharoni" panose="02010803020104030203" pitchFamily="2" charset="-79"/>
+                      </a:endParaRPr>
+                    </a:p>
+                  </a:txBody>
+                  <a:tcPr marL="15871" marR="15871" marT="7935" marB="7935"/>
+                </a:tc>
+                <a:tc>
+                  <a:txBody>
+                    <a:bodyPr/>
+                    <a:lstStyle/>
+                    <a:p>
+                      <a:endParaRPr lang="nb-NO" sz="3200">
+                        <a:latin typeface="Aharoni" panose="02010803020104030203" pitchFamily="2" charset="-79"/>
+                        <a:cs typeface="Aharoni" panose="02010803020104030203" pitchFamily="2" charset="-79"/>
+                      </a:endParaRPr>
+                    </a:p>
+                  </a:txBody>
+                  <a:tcPr marL="15871" marR="15871" marT="7935" marB="7935"/>
+                </a:tc>
+                <a:tc>
+                  <a:txBody>
+                    <a:bodyPr/>
+                    <a:lstStyle/>
+                    <a:p>
                       <a:endParaRPr lang="nb-NO" sz="3200">
                         <a:latin typeface="Aharoni" panose="02010803020104030203" pitchFamily="2" charset="-79"/>
                         <a:cs typeface="Aharoni" panose="02010803020104030203" pitchFamily="2" charset="-79"/>
@@ -7071,6 +7923,101 @@
                     </a:solidFill>
                   </a:tcPr>
                 </a:tc>
+                <a:tc>
+                  <a:txBody>
+                    <a:bodyPr/>
+                    <a:lstStyle/>
+                    <a:p>
+                      <a:endParaRPr lang="nb-NO" sz="3200" dirty="0">
+                        <a:latin typeface="Aharoni" panose="02010803020104030203" pitchFamily="2" charset="-79"/>
+                        <a:cs typeface="Aharoni" panose="02010803020104030203" pitchFamily="2" charset="-79"/>
+                      </a:endParaRPr>
+                    </a:p>
+                  </a:txBody>
+                  <a:tcPr marL="15871" marR="15871" marT="7935" marB="7935">
+                    <a:solidFill>
+                      <a:srgbClr val="FC2A35">
+                        <a:alpha val="50196"/>
+                      </a:srgbClr>
+                    </a:solidFill>
+                  </a:tcPr>
+                </a:tc>
+                <a:tc>
+                  <a:txBody>
+                    <a:bodyPr/>
+                    <a:lstStyle/>
+                    <a:p>
+                      <a:endParaRPr lang="nb-NO" sz="3200" dirty="0">
+                        <a:latin typeface="Aharoni" panose="02010803020104030203" pitchFamily="2" charset="-79"/>
+                        <a:cs typeface="Aharoni" panose="02010803020104030203" pitchFamily="2" charset="-79"/>
+                      </a:endParaRPr>
+                    </a:p>
+                  </a:txBody>
+                  <a:tcPr marL="15871" marR="15871" marT="7935" marB="7935">
+                    <a:solidFill>
+                      <a:srgbClr val="FC2A35">
+                        <a:alpha val="50196"/>
+                      </a:srgbClr>
+                    </a:solidFill>
+                  </a:tcPr>
+                </a:tc>
+                <a:tc>
+                  <a:txBody>
+                    <a:bodyPr/>
+                    <a:lstStyle/>
+                    <a:p>
+                      <a:endParaRPr lang="nb-NO" sz="3200" dirty="0">
+                        <a:latin typeface="Aharoni" panose="02010803020104030203" pitchFamily="2" charset="-79"/>
+                        <a:cs typeface="Aharoni" panose="02010803020104030203" pitchFamily="2" charset="-79"/>
+                      </a:endParaRPr>
+                    </a:p>
+                  </a:txBody>
+                  <a:tcPr marL="15871" marR="15871" marT="7935" marB="7935">
+                    <a:solidFill>
+                      <a:srgbClr val="FC2A35">
+                        <a:alpha val="50196"/>
+                      </a:srgbClr>
+                    </a:solidFill>
+                  </a:tcPr>
+                </a:tc>
+                <a:tc>
+                  <a:txBody>
+                    <a:bodyPr/>
+                    <a:lstStyle/>
+                    <a:p>
+                      <a:endParaRPr lang="nb-NO" sz="3200" dirty="0">
+                        <a:latin typeface="Aharoni" panose="02010803020104030203" pitchFamily="2" charset="-79"/>
+                        <a:cs typeface="Aharoni" panose="02010803020104030203" pitchFamily="2" charset="-79"/>
+                      </a:endParaRPr>
+                    </a:p>
+                  </a:txBody>
+                  <a:tcPr marL="15871" marR="15871" marT="7935" marB="7935">
+                    <a:solidFill>
+                      <a:srgbClr val="FC2A35">
+                        <a:alpha val="50196"/>
+                      </a:srgbClr>
+                    </a:solidFill>
+                  </a:tcPr>
+                </a:tc>
+                <a:tc>
+                  <a:txBody>
+                    <a:bodyPr/>
+                    <a:lstStyle/>
+                    <a:p>
+                      <a:endParaRPr lang="nb-NO" sz="3200" dirty="0">
+                        <a:latin typeface="Aharoni" panose="02010803020104030203" pitchFamily="2" charset="-79"/>
+                        <a:cs typeface="Aharoni" panose="02010803020104030203" pitchFamily="2" charset="-79"/>
+                      </a:endParaRPr>
+                    </a:p>
+                  </a:txBody>
+                  <a:tcPr marL="15871" marR="15871" marT="7935" marB="7935">
+                    <a:solidFill>
+                      <a:srgbClr val="FC2A35">
+                        <a:alpha val="50196"/>
+                      </a:srgbClr>
+                    </a:solidFill>
+                  </a:tcPr>
+                </a:tc>
                 <a:extLst>
                   <a:ext uri="{0D108BD9-81ED-4DB2-BD59-A6C34878D82A}">
                     <a16:rowId xmlns:a16="http://schemas.microsoft.com/office/drawing/2014/main" val="183245562"/>
@@ -7110,6 +8057,71 @@
                     <a:bodyPr/>
                     <a:lstStyle/>
                     <a:p>
+                      <a:endParaRPr lang="nb-NO" sz="3200" dirty="0">
+                        <a:latin typeface="Aharoni" panose="02010803020104030203" pitchFamily="2" charset="-79"/>
+                        <a:cs typeface="Aharoni" panose="02010803020104030203" pitchFamily="2" charset="-79"/>
+                      </a:endParaRPr>
+                    </a:p>
+                  </a:txBody>
+                  <a:tcPr marL="15871" marR="15871" marT="7935" marB="7935"/>
+                </a:tc>
+                <a:tc>
+                  <a:txBody>
+                    <a:bodyPr/>
+                    <a:lstStyle/>
+                    <a:p>
+                      <a:endParaRPr lang="nb-NO" sz="3200">
+                        <a:latin typeface="Aharoni" panose="02010803020104030203" pitchFamily="2" charset="-79"/>
+                        <a:cs typeface="Aharoni" panose="02010803020104030203" pitchFamily="2" charset="-79"/>
+                      </a:endParaRPr>
+                    </a:p>
+                  </a:txBody>
+                  <a:tcPr marL="15871" marR="15871" marT="7935" marB="7935"/>
+                </a:tc>
+                <a:tc>
+                  <a:txBody>
+                    <a:bodyPr/>
+                    <a:lstStyle/>
+                    <a:p>
+                      <a:endParaRPr lang="nb-NO" sz="3200">
+                        <a:latin typeface="Aharoni" panose="02010803020104030203" pitchFamily="2" charset="-79"/>
+                        <a:cs typeface="Aharoni" panose="02010803020104030203" pitchFamily="2" charset="-79"/>
+                      </a:endParaRPr>
+                    </a:p>
+                  </a:txBody>
+                  <a:tcPr marL="15871" marR="15871" marT="7935" marB="7935"/>
+                </a:tc>
+                <a:tc>
+                  <a:txBody>
+                    <a:bodyPr/>
+                    <a:lstStyle/>
+                    <a:p>
+                      <a:endParaRPr lang="nb-NO" sz="3200">
+                        <a:latin typeface="Aharoni" panose="02010803020104030203" pitchFamily="2" charset="-79"/>
+                        <a:cs typeface="Aharoni" panose="02010803020104030203" pitchFamily="2" charset="-79"/>
+                      </a:endParaRPr>
+                    </a:p>
+                  </a:txBody>
+                  <a:tcPr marL="15871" marR="15871" marT="7935" marB="7935"/>
+                </a:tc>
+                <a:tc>
+                  <a:txBody>
+                    <a:bodyPr/>
+                    <a:lstStyle/>
+                    <a:p>
+                      <a:endParaRPr lang="nb-NO" sz="3200">
+                        <a:latin typeface="Aharoni" panose="02010803020104030203" pitchFamily="2" charset="-79"/>
+                        <a:cs typeface="Aharoni" panose="02010803020104030203" pitchFamily="2" charset="-79"/>
+                      </a:endParaRPr>
+                    </a:p>
+                  </a:txBody>
+                  <a:tcPr marL="15871" marR="15871" marT="7935" marB="7935"/>
+                </a:tc>
+                <a:tc>
+                  <a:txBody>
+                    <a:bodyPr/>
+                    <a:lstStyle/>
+                    <a:p>
                       <a:endParaRPr lang="nb-NO" sz="3200">
                         <a:latin typeface="Aharoni" panose="02010803020104030203" pitchFamily="2" charset="-79"/>
                         <a:cs typeface="Aharoni" panose="02010803020104030203" pitchFamily="2" charset="-79"/>
@@ -7215,9 +8227,444 @@
                     </a:solidFill>
                   </a:tcPr>
                 </a:tc>
+                <a:tc>
+                  <a:txBody>
+                    <a:bodyPr/>
+                    <a:lstStyle/>
+                    <a:p>
+                      <a:endParaRPr lang="nb-NO" sz="3200" dirty="0">
+                        <a:latin typeface="Aharoni" panose="02010803020104030203" pitchFamily="2" charset="-79"/>
+                        <a:cs typeface="Aharoni" panose="02010803020104030203" pitchFamily="2" charset="-79"/>
+                      </a:endParaRPr>
+                    </a:p>
+                  </a:txBody>
+                  <a:tcPr marL="15871" marR="15871" marT="7935" marB="7935">
+                    <a:solidFill>
+                      <a:srgbClr val="FC2A35">
+                        <a:alpha val="50196"/>
+                      </a:srgbClr>
+                    </a:solidFill>
+                  </a:tcPr>
+                </a:tc>
+                <a:tc>
+                  <a:txBody>
+                    <a:bodyPr/>
+                    <a:lstStyle/>
+                    <a:p>
+                      <a:endParaRPr lang="nb-NO" sz="3200" dirty="0">
+                        <a:latin typeface="Aharoni" panose="02010803020104030203" pitchFamily="2" charset="-79"/>
+                        <a:cs typeface="Aharoni" panose="02010803020104030203" pitchFamily="2" charset="-79"/>
+                      </a:endParaRPr>
+                    </a:p>
+                  </a:txBody>
+                  <a:tcPr marL="15871" marR="15871" marT="7935" marB="7935">
+                    <a:solidFill>
+                      <a:srgbClr val="FC2A35">
+                        <a:alpha val="50196"/>
+                      </a:srgbClr>
+                    </a:solidFill>
+                  </a:tcPr>
+                </a:tc>
+                <a:tc>
+                  <a:txBody>
+                    <a:bodyPr/>
+                    <a:lstStyle/>
+                    <a:p>
+                      <a:endParaRPr lang="nb-NO" sz="3200" dirty="0">
+                        <a:latin typeface="Aharoni" panose="02010803020104030203" pitchFamily="2" charset="-79"/>
+                        <a:cs typeface="Aharoni" panose="02010803020104030203" pitchFamily="2" charset="-79"/>
+                      </a:endParaRPr>
+                    </a:p>
+                  </a:txBody>
+                  <a:tcPr marL="15871" marR="15871" marT="7935" marB="7935">
+                    <a:solidFill>
+                      <a:srgbClr val="FC2A35">
+                        <a:alpha val="50196"/>
+                      </a:srgbClr>
+                    </a:solidFill>
+                  </a:tcPr>
+                </a:tc>
+                <a:tc>
+                  <a:txBody>
+                    <a:bodyPr/>
+                    <a:lstStyle/>
+                    <a:p>
+                      <a:endParaRPr lang="nb-NO" sz="3200" dirty="0">
+                        <a:latin typeface="Aharoni" panose="02010803020104030203" pitchFamily="2" charset="-79"/>
+                        <a:cs typeface="Aharoni" panose="02010803020104030203" pitchFamily="2" charset="-79"/>
+                      </a:endParaRPr>
+                    </a:p>
+                  </a:txBody>
+                  <a:tcPr marL="15871" marR="15871" marT="7935" marB="7935">
+                    <a:solidFill>
+                      <a:srgbClr val="FC2A35">
+                        <a:alpha val="50196"/>
+                      </a:srgbClr>
+                    </a:solidFill>
+                  </a:tcPr>
+                </a:tc>
+                <a:tc>
+                  <a:txBody>
+                    <a:bodyPr/>
+                    <a:lstStyle/>
+                    <a:p>
+                      <a:endParaRPr lang="nb-NO" sz="3200" dirty="0">
+                        <a:latin typeface="Aharoni" panose="02010803020104030203" pitchFamily="2" charset="-79"/>
+                        <a:cs typeface="Aharoni" panose="02010803020104030203" pitchFamily="2" charset="-79"/>
+                      </a:endParaRPr>
+                    </a:p>
+                  </a:txBody>
+                  <a:tcPr marL="15871" marR="15871" marT="7935" marB="7935">
+                    <a:solidFill>
+                      <a:srgbClr val="FC2A35">
+                        <a:alpha val="50196"/>
+                      </a:srgbClr>
+                    </a:solidFill>
+                  </a:tcPr>
+                </a:tc>
                 <a:extLst>
                   <a:ext uri="{0D108BD9-81ED-4DB2-BD59-A6C34878D82A}">
                     <a16:rowId xmlns:a16="http://schemas.microsoft.com/office/drawing/2014/main" val="3830881121"/>
+                  </a:ext>
+                </a:extLst>
+              </a:tr>
+              <a:tr h="762000">
+                <a:tc>
+                  <a:txBody>
+                    <a:bodyPr/>
+                    <a:lstStyle/>
+                    <a:p>
+                      <a:pPr algn="l"/>
+                      <a:endParaRPr lang="nb-NO" sz="3200" dirty="0">
+                        <a:latin typeface="Aharoni" panose="02010803020104030203" pitchFamily="2" charset="-79"/>
+                        <a:cs typeface="Aharoni" panose="02010803020104030203" pitchFamily="2" charset="-79"/>
+                      </a:endParaRPr>
+                    </a:p>
+                  </a:txBody>
+                  <a:tcPr marL="15871" marR="15871" marT="7935" marB="7935" anchor="ctr">
+                    <a:solidFill>
+                      <a:srgbClr val="E9EBF5"/>
+                    </a:solidFill>
+                  </a:tcPr>
+                </a:tc>
+                <a:tc>
+                  <a:txBody>
+                    <a:bodyPr/>
+                    <a:lstStyle/>
+                    <a:p>
+                      <a:endParaRPr lang="nb-NO" sz="3200" dirty="0">
+                        <a:latin typeface="Aharoni" panose="02010803020104030203" pitchFamily="2" charset="-79"/>
+                        <a:cs typeface="Aharoni" panose="02010803020104030203" pitchFamily="2" charset="-79"/>
+                      </a:endParaRPr>
+                    </a:p>
+                  </a:txBody>
+                  <a:tcPr marL="15871" marR="15871" marT="7935" marB="7935">
+                    <a:solidFill>
+                      <a:srgbClr val="E9EBF5"/>
+                    </a:solidFill>
+                  </a:tcPr>
+                </a:tc>
+                <a:tc>
+                  <a:txBody>
+                    <a:bodyPr/>
+                    <a:lstStyle/>
+                    <a:p>
+                      <a:endParaRPr lang="nb-NO" sz="3200" dirty="0">
+                        <a:latin typeface="Aharoni" panose="02010803020104030203" pitchFamily="2" charset="-79"/>
+                        <a:cs typeface="Aharoni" panose="02010803020104030203" pitchFamily="2" charset="-79"/>
+                      </a:endParaRPr>
+                    </a:p>
+                  </a:txBody>
+                  <a:tcPr marL="15871" marR="15871" marT="7935" marB="7935">
+                    <a:solidFill>
+                      <a:srgbClr val="E9EBF5"/>
+                    </a:solidFill>
+                  </a:tcPr>
+                </a:tc>
+                <a:tc>
+                  <a:txBody>
+                    <a:bodyPr/>
+                    <a:lstStyle/>
+                    <a:p>
+                      <a:endParaRPr lang="nb-NO" sz="3200" dirty="0">
+                        <a:latin typeface="Aharoni" panose="02010803020104030203" pitchFamily="2" charset="-79"/>
+                        <a:cs typeface="Aharoni" panose="02010803020104030203" pitchFamily="2" charset="-79"/>
+                      </a:endParaRPr>
+                    </a:p>
+                  </a:txBody>
+                  <a:tcPr marL="15871" marR="15871" marT="7935" marB="7935">
+                    <a:solidFill>
+                      <a:srgbClr val="E9EBF5"/>
+                    </a:solidFill>
+                  </a:tcPr>
+                </a:tc>
+                <a:tc>
+                  <a:txBody>
+                    <a:bodyPr/>
+                    <a:lstStyle/>
+                    <a:p>
+                      <a:endParaRPr lang="nb-NO" sz="3200" dirty="0">
+                        <a:latin typeface="Aharoni" panose="02010803020104030203" pitchFamily="2" charset="-79"/>
+                        <a:cs typeface="Aharoni" panose="02010803020104030203" pitchFamily="2" charset="-79"/>
+                      </a:endParaRPr>
+                    </a:p>
+                  </a:txBody>
+                  <a:tcPr marL="15871" marR="15871" marT="7935" marB="7935">
+                    <a:solidFill>
+                      <a:srgbClr val="E9EBF5"/>
+                    </a:solidFill>
+                  </a:tcPr>
+                </a:tc>
+                <a:tc>
+                  <a:txBody>
+                    <a:bodyPr/>
+                    <a:lstStyle/>
+                    <a:p>
+                      <a:endParaRPr lang="nb-NO" sz="3200" dirty="0">
+                        <a:latin typeface="Aharoni" panose="02010803020104030203" pitchFamily="2" charset="-79"/>
+                        <a:cs typeface="Aharoni" panose="02010803020104030203" pitchFamily="2" charset="-79"/>
+                      </a:endParaRPr>
+                    </a:p>
+                  </a:txBody>
+                  <a:tcPr marL="15871" marR="15871" marT="7935" marB="7935">
+                    <a:solidFill>
+                      <a:srgbClr val="E9EBF5"/>
+                    </a:solidFill>
+                  </a:tcPr>
+                </a:tc>
+                <a:tc>
+                  <a:txBody>
+                    <a:bodyPr/>
+                    <a:lstStyle/>
+                    <a:p>
+                      <a:endParaRPr lang="nb-NO" sz="3200" dirty="0">
+                        <a:latin typeface="Aharoni" panose="02010803020104030203" pitchFamily="2" charset="-79"/>
+                        <a:cs typeface="Aharoni" panose="02010803020104030203" pitchFamily="2" charset="-79"/>
+                      </a:endParaRPr>
+                    </a:p>
+                  </a:txBody>
+                  <a:tcPr marL="15871" marR="15871" marT="7935" marB="7935">
+                    <a:solidFill>
+                      <a:srgbClr val="E9EBF5"/>
+                    </a:solidFill>
+                  </a:tcPr>
+                </a:tc>
+                <a:tc>
+                  <a:txBody>
+                    <a:bodyPr/>
+                    <a:lstStyle/>
+                    <a:p>
+                      <a:endParaRPr lang="nb-NO" sz="3200" dirty="0">
+                        <a:latin typeface="Aharoni" panose="02010803020104030203" pitchFamily="2" charset="-79"/>
+                        <a:cs typeface="Aharoni" panose="02010803020104030203" pitchFamily="2" charset="-79"/>
+                      </a:endParaRPr>
+                    </a:p>
+                  </a:txBody>
+                  <a:tcPr marL="15871" marR="15871" marT="7935" marB="7935">
+                    <a:solidFill>
+                      <a:srgbClr val="E9EBF5"/>
+                    </a:solidFill>
+                  </a:tcPr>
+                </a:tc>
+                <a:tc>
+                  <a:txBody>
+                    <a:bodyPr/>
+                    <a:lstStyle/>
+                    <a:p>
+                      <a:endParaRPr lang="nb-NO" sz="3200" dirty="0">
+                        <a:latin typeface="Aharoni" panose="02010803020104030203" pitchFamily="2" charset="-79"/>
+                        <a:cs typeface="Aharoni" panose="02010803020104030203" pitchFamily="2" charset="-79"/>
+                      </a:endParaRPr>
+                    </a:p>
+                  </a:txBody>
+                  <a:tcPr marL="15871" marR="15871" marT="7935" marB="7935">
+                    <a:solidFill>
+                      <a:srgbClr val="E9EBF5"/>
+                    </a:solidFill>
+                  </a:tcPr>
+                </a:tc>
+                <a:extLst>
+                  <a:ext uri="{0D108BD9-81ED-4DB2-BD59-A6C34878D82A}">
+                    <a16:rowId xmlns:a16="http://schemas.microsoft.com/office/drawing/2014/main" val="1222165033"/>
+                  </a:ext>
+                </a:extLst>
+              </a:tr>
+              <a:tr h="762000">
+                <a:tc>
+                  <a:txBody>
+                    <a:bodyPr/>
+                    <a:lstStyle/>
+                    <a:p>
+                      <a:pPr algn="l"/>
+                      <a:endParaRPr lang="nb-NO" sz="3200" dirty="0">
+                        <a:latin typeface="Aharoni" panose="02010803020104030203" pitchFamily="2" charset="-79"/>
+                        <a:cs typeface="Aharoni" panose="02010803020104030203" pitchFamily="2" charset="-79"/>
+                      </a:endParaRPr>
+                    </a:p>
+                  </a:txBody>
+                  <a:tcPr marL="15871" marR="15871" marT="7935" marB="7935" anchor="ctr">
+                    <a:solidFill>
+                      <a:srgbClr val="FC2A35">
+                        <a:alpha val="50196"/>
+                      </a:srgbClr>
+                    </a:solidFill>
+                  </a:tcPr>
+                </a:tc>
+                <a:tc>
+                  <a:txBody>
+                    <a:bodyPr/>
+                    <a:lstStyle/>
+                    <a:p>
+                      <a:endParaRPr lang="nb-NO" sz="3200" dirty="0">
+                        <a:latin typeface="Aharoni" panose="02010803020104030203" pitchFamily="2" charset="-79"/>
+                        <a:cs typeface="Aharoni" panose="02010803020104030203" pitchFamily="2" charset="-79"/>
+                      </a:endParaRPr>
+                    </a:p>
+                  </a:txBody>
+                  <a:tcPr marL="15871" marR="15871" marT="7935" marB="7935">
+                    <a:solidFill>
+                      <a:srgbClr val="FC2A35">
+                        <a:alpha val="50196"/>
+                      </a:srgbClr>
+                    </a:solidFill>
+                  </a:tcPr>
+                </a:tc>
+                <a:tc>
+                  <a:txBody>
+                    <a:bodyPr/>
+                    <a:lstStyle/>
+                    <a:p>
+                      <a:endParaRPr lang="nb-NO" sz="3200" dirty="0">
+                        <a:latin typeface="Aharoni" panose="02010803020104030203" pitchFamily="2" charset="-79"/>
+                        <a:cs typeface="Aharoni" panose="02010803020104030203" pitchFamily="2" charset="-79"/>
+                      </a:endParaRPr>
+                    </a:p>
+                  </a:txBody>
+                  <a:tcPr marL="15871" marR="15871" marT="7935" marB="7935">
+                    <a:solidFill>
+                      <a:srgbClr val="FC2A35">
+                        <a:alpha val="50196"/>
+                      </a:srgbClr>
+                    </a:solidFill>
+                  </a:tcPr>
+                </a:tc>
+                <a:tc>
+                  <a:txBody>
+                    <a:bodyPr/>
+                    <a:lstStyle/>
+                    <a:p>
+                      <a:endParaRPr lang="nb-NO" sz="3200" dirty="0">
+                        <a:latin typeface="Aharoni" panose="02010803020104030203" pitchFamily="2" charset="-79"/>
+                        <a:cs typeface="Aharoni" panose="02010803020104030203" pitchFamily="2" charset="-79"/>
+                      </a:endParaRPr>
+                    </a:p>
+                  </a:txBody>
+                  <a:tcPr marL="15871" marR="15871" marT="7935" marB="7935">
+                    <a:solidFill>
+                      <a:srgbClr val="FC2A35">
+                        <a:alpha val="50196"/>
+                      </a:srgbClr>
+                    </a:solidFill>
+                  </a:tcPr>
+                </a:tc>
+                <a:tc>
+                  <a:txBody>
+                    <a:bodyPr/>
+                    <a:lstStyle/>
+                    <a:p>
+                      <a:endParaRPr lang="nb-NO" sz="3200" dirty="0">
+                        <a:latin typeface="Aharoni" panose="02010803020104030203" pitchFamily="2" charset="-79"/>
+                        <a:cs typeface="Aharoni" panose="02010803020104030203" pitchFamily="2" charset="-79"/>
+                      </a:endParaRPr>
+                    </a:p>
+                  </a:txBody>
+                  <a:tcPr marL="15871" marR="15871" marT="7935" marB="7935">
+                    <a:solidFill>
+                      <a:srgbClr val="FC2A35">
+                        <a:alpha val="50196"/>
+                      </a:srgbClr>
+                    </a:solidFill>
+                  </a:tcPr>
+                </a:tc>
+                <a:tc>
+                  <a:txBody>
+                    <a:bodyPr/>
+                    <a:lstStyle/>
+                    <a:p>
+                      <a:endParaRPr lang="nb-NO" sz="3200" dirty="0">
+                        <a:latin typeface="Aharoni" panose="02010803020104030203" pitchFamily="2" charset="-79"/>
+                        <a:cs typeface="Aharoni" panose="02010803020104030203" pitchFamily="2" charset="-79"/>
+                      </a:endParaRPr>
+                    </a:p>
+                  </a:txBody>
+                  <a:tcPr marL="15871" marR="15871" marT="7935" marB="7935">
+                    <a:solidFill>
+                      <a:srgbClr val="FC2A35">
+                        <a:alpha val="50196"/>
+                      </a:srgbClr>
+                    </a:solidFill>
+                  </a:tcPr>
+                </a:tc>
+                <a:tc>
+                  <a:txBody>
+                    <a:bodyPr/>
+                    <a:lstStyle/>
+                    <a:p>
+                      <a:endParaRPr lang="nb-NO" sz="3200" dirty="0">
+                        <a:latin typeface="Aharoni" panose="02010803020104030203" pitchFamily="2" charset="-79"/>
+                        <a:cs typeface="Aharoni" panose="02010803020104030203" pitchFamily="2" charset="-79"/>
+                      </a:endParaRPr>
+                    </a:p>
+                  </a:txBody>
+                  <a:tcPr marL="15871" marR="15871" marT="7935" marB="7935">
+                    <a:solidFill>
+                      <a:srgbClr val="FC2A35">
+                        <a:alpha val="50196"/>
+                      </a:srgbClr>
+                    </a:solidFill>
+                  </a:tcPr>
+                </a:tc>
+                <a:tc>
+                  <a:txBody>
+                    <a:bodyPr/>
+                    <a:lstStyle/>
+                    <a:p>
+                      <a:endParaRPr lang="nb-NO" sz="3200" dirty="0">
+                        <a:latin typeface="Aharoni" panose="02010803020104030203" pitchFamily="2" charset="-79"/>
+                        <a:cs typeface="Aharoni" panose="02010803020104030203" pitchFamily="2" charset="-79"/>
+                      </a:endParaRPr>
+                    </a:p>
+                  </a:txBody>
+                  <a:tcPr marL="15871" marR="15871" marT="7935" marB="7935">
+                    <a:solidFill>
+                      <a:srgbClr val="FC2A35">
+                        <a:alpha val="50196"/>
+                      </a:srgbClr>
+                    </a:solidFill>
+                  </a:tcPr>
+                </a:tc>
+                <a:tc>
+                  <a:txBody>
+                    <a:bodyPr/>
+                    <a:lstStyle/>
+                    <a:p>
+                      <a:endParaRPr lang="nb-NO" sz="3200" dirty="0">
+                        <a:latin typeface="Aharoni" panose="02010803020104030203" pitchFamily="2" charset="-79"/>
+                        <a:cs typeface="Aharoni" panose="02010803020104030203" pitchFamily="2" charset="-79"/>
+                      </a:endParaRPr>
+                    </a:p>
+                  </a:txBody>
+                  <a:tcPr marL="15871" marR="15871" marT="7935" marB="7935">
+                    <a:solidFill>
+                      <a:srgbClr val="FC2A35">
+                        <a:alpha val="50196"/>
+                      </a:srgbClr>
+                    </a:solidFill>
+                  </a:tcPr>
+                </a:tc>
+                <a:extLst>
+                  <a:ext uri="{0D108BD9-81ED-4DB2-BD59-A6C34878D82A}">
+                    <a16:rowId xmlns:a16="http://schemas.microsoft.com/office/drawing/2014/main" val="4236895207"/>
                   </a:ext>
                 </a:extLst>
               </a:tr>
@@ -7239,7 +8686,7 @@
         </p:nvSpPr>
         <p:spPr>
           <a:xfrm flipH="1">
-            <a:off x="1217865" y="0"/>
+            <a:off x="1217465" y="0"/>
             <a:ext cx="7062134" cy="762000"/>
           </a:xfrm>
           <a:prstGeom prst="rtTriangle">
@@ -7291,8 +8738,8 @@
         </p:nvSpPr>
         <p:spPr>
           <a:xfrm flipH="1">
-            <a:off x="2306170" y="0"/>
-            <a:ext cx="5973829" cy="762000"/>
+            <a:off x="2343149" y="0"/>
+            <a:ext cx="5936450" cy="768724"/>
           </a:xfrm>
           <a:prstGeom prst="rtTriangle">
             <a:avLst/>
@@ -7326,14 +8773,14 @@
           <p:nvPr>
             <p:extLst>
               <p:ext uri="{D42A27DB-BD31-4B8C-83A1-F6EECF244321}">
-                <p14:modId xmlns:p14="http://schemas.microsoft.com/office/powerpoint/2010/main" val="1663777481"/>
+                <p14:modId xmlns:p14="http://schemas.microsoft.com/office/powerpoint/2010/main" val="1975872242"/>
               </p:ext>
             </p:extLst>
           </p:nvPr>
         </p:nvGraphicFramePr>
         <p:xfrm>
-          <a:off x="2" y="28352"/>
-          <a:ext cx="8130362" cy="762000"/>
+          <a:off x="0" y="0"/>
+          <a:ext cx="8280000" cy="762000"/>
         </p:xfrm>
         <a:graphic>
           <a:graphicData uri="http://schemas.openxmlformats.org/drawingml/2006/table">
@@ -7342,28 +8789,63 @@
                 <a:tableStyleId>{B301B821-A1FF-4177-AEE7-76D212191A09}</a:tableStyleId>
               </a:tblPr>
               <a:tblGrid>
-                <a:gridCol w="3742658">
+                <a:gridCol w="3672000">
                   <a:extLst>
                     <a:ext uri="{9D8B030D-6E8A-4147-A177-3AD203B41FA5}">
                       <a16:colId xmlns:a16="http://schemas.microsoft.com/office/drawing/2014/main" val="1933295454"/>
                     </a:ext>
                   </a:extLst>
                 </a:gridCol>
-                <a:gridCol w="2401670">
+                <a:gridCol w="576000">
+                  <a:extLst>
+                    <a:ext uri="{9D8B030D-6E8A-4147-A177-3AD203B41FA5}">
+                      <a16:colId xmlns:a16="http://schemas.microsoft.com/office/drawing/2014/main" val="1310849455"/>
+                    </a:ext>
+                  </a:extLst>
+                </a:gridCol>
+                <a:gridCol w="576000">
+                  <a:extLst>
+                    <a:ext uri="{9D8B030D-6E8A-4147-A177-3AD203B41FA5}">
+                      <a16:colId xmlns:a16="http://schemas.microsoft.com/office/drawing/2014/main" val="671682023"/>
+                    </a:ext>
+                  </a:extLst>
+                </a:gridCol>
+                <a:gridCol w="576000">
+                  <a:extLst>
+                    <a:ext uri="{9D8B030D-6E8A-4147-A177-3AD203B41FA5}">
+                      <a16:colId xmlns:a16="http://schemas.microsoft.com/office/drawing/2014/main" val="1416324310"/>
+                    </a:ext>
+                  </a:extLst>
+                </a:gridCol>
+                <a:gridCol w="576000">
+                  <a:extLst>
+                    <a:ext uri="{9D8B030D-6E8A-4147-A177-3AD203B41FA5}">
+                      <a16:colId xmlns:a16="http://schemas.microsoft.com/office/drawing/2014/main" val="1535000908"/>
+                    </a:ext>
+                  </a:extLst>
+                </a:gridCol>
+                <a:gridCol w="576000">
+                  <a:extLst>
+                    <a:ext uri="{9D8B030D-6E8A-4147-A177-3AD203B41FA5}">
+                      <a16:colId xmlns:a16="http://schemas.microsoft.com/office/drawing/2014/main" val="452799726"/>
+                    </a:ext>
+                  </a:extLst>
+                </a:gridCol>
+                <a:gridCol w="576000">
                   <a:extLst>
                     <a:ext uri="{9D8B030D-6E8A-4147-A177-3AD203B41FA5}">
                       <a16:colId xmlns:a16="http://schemas.microsoft.com/office/drawing/2014/main" val="2917907625"/>
                     </a:ext>
                   </a:extLst>
                 </a:gridCol>
-                <a:gridCol w="1433140">
+                <a:gridCol w="576000">
                   <a:extLst>
                     <a:ext uri="{9D8B030D-6E8A-4147-A177-3AD203B41FA5}">
                       <a16:colId xmlns:a16="http://schemas.microsoft.com/office/drawing/2014/main" val="1914049901"/>
                     </a:ext>
                   </a:extLst>
                 </a:gridCol>
-                <a:gridCol w="552894">
+                <a:gridCol w="576000">
                   <a:extLst>
                     <a:ext uri="{9D8B030D-6E8A-4147-A177-3AD203B41FA5}">
                       <a16:colId xmlns:a16="http://schemas.microsoft.com/office/drawing/2014/main" val="93958210"/>
@@ -7383,31 +8865,11 @@
                           <a:latin typeface="Aharoni" panose="02010803020104030203" pitchFamily="2" charset="-79"/>
                           <a:cs typeface="Aharoni" panose="02010803020104030203" pitchFamily="2" charset="-79"/>
                         </a:rPr>
-                        <a:t>     Spiller</a:t>
+                        <a:t>     Lag</a:t>
                       </a:r>
                     </a:p>
                   </a:txBody>
                   <a:tcPr marL="15871" marR="15871" marT="7935" marB="7935" anchor="ctr">
-                    <a:lnL w="12700" cmpd="sng">
-                      <a:noFill/>
-                    </a:lnL>
-                    <a:lnR>
-                      <a:noFill/>
-                    </a:lnR>
-                    <a:lnT w="12700" cmpd="sng">
-                      <a:noFill/>
-                    </a:lnT>
-                    <a:lnB w="12700" cmpd="sng">
-                      <a:noFill/>
-                    </a:lnB>
-                    <a:lnTlToBr w="12700" cmpd="sng">
-                      <a:noFill/>
-                      <a:prstDash val="solid"/>
-                    </a:lnTlToBr>
-                    <a:lnBlToTr w="12700" cmpd="sng">
-                      <a:noFill/>
-                      <a:prstDash val="solid"/>
-                    </a:lnBlToTr>
                     <a:noFill/>
                   </a:tcPr>
                 </a:tc>
@@ -7416,37 +8878,17 @@
                     <a:bodyPr/>
                     <a:lstStyle/>
                     <a:p>
-                      <a:pPr algn="l"/>
+                      <a:pPr algn="ctr"/>
                       <a:r>
                         <a:rPr lang="nb-NO" sz="2400" dirty="0">
                           <a:latin typeface="Aharoni" panose="02010803020104030203" pitchFamily="2" charset="-79"/>
                           <a:cs typeface="Aharoni" panose="02010803020104030203" pitchFamily="2" charset="-79"/>
                         </a:rPr>
-                        <a:t>Lag</a:t>
+                        <a:t>K</a:t>
                       </a:r>
                     </a:p>
                   </a:txBody>
                   <a:tcPr marL="15871" marR="15871" marT="7935" marB="7935" anchor="ctr">
-                    <a:lnL>
-                      <a:noFill/>
-                    </a:lnL>
-                    <a:lnR>
-                      <a:noFill/>
-                    </a:lnR>
-                    <a:lnT w="12700" cmpd="sng">
-                      <a:noFill/>
-                    </a:lnT>
-                    <a:lnB w="12700" cmpd="sng">
-                      <a:noFill/>
-                    </a:lnB>
-                    <a:lnTlToBr w="12700" cmpd="sng">
-                      <a:noFill/>
-                      <a:prstDash val="solid"/>
-                    </a:lnTlToBr>
-                    <a:lnBlToTr w="12700" cmpd="sng">
-                      <a:noFill/>
-                      <a:prstDash val="solid"/>
-                    </a:lnBlToTr>
                     <a:noFill/>
                   </a:tcPr>
                 </a:tc>
@@ -7455,37 +8897,17 @@
                     <a:bodyPr/>
                     <a:lstStyle/>
                     <a:p>
-                      <a:pPr algn="r"/>
+                      <a:pPr algn="ctr"/>
                       <a:r>
                         <a:rPr lang="nb-NO" sz="2400" dirty="0">
                           <a:latin typeface="Aharoni" panose="02010803020104030203" pitchFamily="2" charset="-79"/>
                           <a:cs typeface="Aharoni" panose="02010803020104030203" pitchFamily="2" charset="-79"/>
                         </a:rPr>
-                        <a:t>Avd.</a:t>
+                        <a:t>V</a:t>
                       </a:r>
                     </a:p>
                   </a:txBody>
                   <a:tcPr marL="15871" marR="15871" marT="7935" marB="7935" anchor="ctr">
-                    <a:lnL>
-                      <a:noFill/>
-                    </a:lnL>
-                    <a:lnR>
-                      <a:noFill/>
-                    </a:lnR>
-                    <a:lnT w="12700" cmpd="sng">
-                      <a:noFill/>
-                    </a:lnT>
-                    <a:lnB w="12700" cmpd="sng">
-                      <a:noFill/>
-                    </a:lnB>
-                    <a:lnTlToBr w="12700" cmpd="sng">
-                      <a:noFill/>
-                      <a:prstDash val="solid"/>
-                    </a:lnTlToBr>
-                    <a:lnBlToTr w="12700" cmpd="sng">
-                      <a:noFill/>
-                      <a:prstDash val="solid"/>
-                    </a:lnBlToTr>
                     <a:noFill/>
                   </a:tcPr>
                 </a:tc>
@@ -7494,37 +8916,112 @@
                     <a:bodyPr/>
                     <a:lstStyle/>
                     <a:p>
-                      <a:pPr algn="r"/>
+                      <a:pPr algn="ctr"/>
                       <a:r>
-                        <a:rPr lang="nb-NO" sz="3600" dirty="0">
+                        <a:rPr lang="nb-NO" sz="2400" dirty="0">
                           <a:latin typeface="Aharoni" panose="02010803020104030203" pitchFamily="2" charset="-79"/>
                           <a:cs typeface="Aharoni" panose="02010803020104030203" pitchFamily="2" charset="-79"/>
                         </a:rPr>
-                        <a:t>#</a:t>
+                        <a:t>U</a:t>
                       </a:r>
                     </a:p>
                   </a:txBody>
                   <a:tcPr marL="15871" marR="15871" marT="7935" marB="7935" anchor="ctr">
-                    <a:lnL>
-                      <a:noFill/>
-                    </a:lnL>
-                    <a:lnR w="12700" cmpd="sng">
-                      <a:noFill/>
-                    </a:lnR>
-                    <a:lnT w="12700" cmpd="sng">
-                      <a:noFill/>
-                    </a:lnT>
-                    <a:lnB w="12700" cmpd="sng">
-                      <a:noFill/>
-                    </a:lnB>
-                    <a:lnTlToBr w="12700" cmpd="sng">
-                      <a:noFill/>
-                      <a:prstDash val="solid"/>
-                    </a:lnTlToBr>
-                    <a:lnBlToTr w="12700" cmpd="sng">
-                      <a:noFill/>
-                      <a:prstDash val="solid"/>
-                    </a:lnBlToTr>
+                    <a:noFill/>
+                  </a:tcPr>
+                </a:tc>
+                <a:tc>
+                  <a:txBody>
+                    <a:bodyPr/>
+                    <a:lstStyle/>
+                    <a:p>
+                      <a:pPr algn="ctr"/>
+                      <a:r>
+                        <a:rPr lang="nb-NO" sz="2400" dirty="0">
+                          <a:latin typeface="Aharoni" panose="02010803020104030203" pitchFamily="2" charset="-79"/>
+                          <a:cs typeface="Aharoni" panose="02010803020104030203" pitchFamily="2" charset="-79"/>
+                        </a:rPr>
+                        <a:t>T</a:t>
+                      </a:r>
+                    </a:p>
+                  </a:txBody>
+                  <a:tcPr marL="15871" marR="15871" marT="7935" marB="7935" anchor="ctr">
+                    <a:noFill/>
+                  </a:tcPr>
+                </a:tc>
+                <a:tc>
+                  <a:txBody>
+                    <a:bodyPr/>
+                    <a:lstStyle/>
+                    <a:p>
+                      <a:pPr algn="ctr"/>
+                      <a:r>
+                        <a:rPr lang="nb-NO" sz="2400" dirty="0">
+                          <a:latin typeface="Aharoni" panose="02010803020104030203" pitchFamily="2" charset="-79"/>
+                          <a:cs typeface="Aharoni" panose="02010803020104030203" pitchFamily="2" charset="-79"/>
+                        </a:rPr>
+                        <a:t>+</a:t>
+                      </a:r>
+                    </a:p>
+                  </a:txBody>
+                  <a:tcPr marL="15871" marR="15871" marT="7935" marB="7935" anchor="ctr">
+                    <a:noFill/>
+                  </a:tcPr>
+                </a:tc>
+                <a:tc>
+                  <a:txBody>
+                    <a:bodyPr/>
+                    <a:lstStyle/>
+                    <a:p>
+                      <a:pPr algn="ctr"/>
+                      <a:r>
+                        <a:rPr lang="nb-NO" sz="2400" dirty="0">
+                          <a:latin typeface="Aharoni" panose="02010803020104030203" pitchFamily="2" charset="-79"/>
+                          <a:cs typeface="Aharoni" panose="02010803020104030203" pitchFamily="2" charset="-79"/>
+                        </a:rPr>
+                        <a:t>-</a:t>
+                      </a:r>
+                    </a:p>
+                  </a:txBody>
+                  <a:tcPr marL="15871" marR="15871" marT="7935" marB="7935" anchor="ctr">
+                    <a:noFill/>
+                  </a:tcPr>
+                </a:tc>
+                <a:tc>
+                  <a:txBody>
+                    <a:bodyPr/>
+                    <a:lstStyle/>
+                    <a:p>
+                      <a:pPr algn="ctr"/>
+                      <a:r>
+                        <a:rPr lang="nb-NO" sz="2400" dirty="0">
+                          <a:latin typeface="Aharoni" panose="02010803020104030203" pitchFamily="2" charset="-79"/>
+                          <a:cs typeface="Aharoni" panose="02010803020104030203" pitchFamily="2" charset="-79"/>
+                        </a:rPr>
+                        <a:t>+/-</a:t>
+                      </a:r>
+                    </a:p>
+                  </a:txBody>
+                  <a:tcPr marL="15871" marR="15871" marT="7935" marB="7935" anchor="ctr">
+                    <a:noFill/>
+                  </a:tcPr>
+                </a:tc>
+                <a:tc>
+                  <a:txBody>
+                    <a:bodyPr/>
+                    <a:lstStyle/>
+                    <a:p>
+                      <a:pPr algn="ctr"/>
+                      <a:r>
+                        <a:rPr lang="nb-NO" sz="2400" dirty="0">
+                          <a:latin typeface="Aharoni" panose="02010803020104030203" pitchFamily="2" charset="-79"/>
+                          <a:cs typeface="Aharoni" panose="02010803020104030203" pitchFamily="2" charset="-79"/>
+                        </a:rPr>
+                        <a:t>P</a:t>
+                      </a:r>
+                    </a:p>
+                  </a:txBody>
+                  <a:tcPr marL="15871" marR="15871" marT="7935" marB="7935" anchor="ctr">
                     <a:noFill/>
                   </a:tcPr>
                 </a:tc>
@@ -7550,11 +9047,17 @@
           <p:cNvGraphicFramePr>
             <a:graphicFrameLocks noGrp="1"/>
           </p:cNvGraphicFramePr>
-          <p:nvPr/>
+          <p:nvPr>
+            <p:extLst>
+              <p:ext uri="{D42A27DB-BD31-4B8C-83A1-F6EECF244321}">
+                <p14:modId xmlns:p14="http://schemas.microsoft.com/office/powerpoint/2010/main" val="2817321518"/>
+              </p:ext>
+            </p:extLst>
+          </p:nvPr>
         </p:nvGraphicFramePr>
         <p:xfrm>
-          <a:off x="-82270" y="762000"/>
-          <a:ext cx="559641" cy="9144000"/>
+          <a:off x="-82670" y="762000"/>
+          <a:ext cx="559641" cy="10668000"/>
         </p:xfrm>
         <a:graphic>
           <a:graphicData uri="http://schemas.openxmlformats.org/drawingml/2006/table">
@@ -8126,14 +9629,278 @@
                   </a:ext>
                 </a:extLst>
               </a:tr>
+              <a:tr h="762000">
+                <a:tc>
+                  <a:txBody>
+                    <a:bodyPr/>
+                    <a:lstStyle/>
+                    <a:p>
+                      <a:pPr algn="r"/>
+                      <a:r>
+                        <a:rPr lang="nb-NO" sz="3200" dirty="0">
+                          <a:latin typeface="Aharoni" panose="02010803020104030203" pitchFamily="2" charset="-79"/>
+                          <a:cs typeface="Aharoni" panose="02010803020104030203" pitchFamily="2" charset="-79"/>
+                        </a:rPr>
+                        <a:t>13.</a:t>
+                      </a:r>
+                    </a:p>
+                  </a:txBody>
+                  <a:tcPr marL="15871" marR="15871" marT="7935" marB="7935" anchor="ctr">
+                    <a:lnL w="12700" cmpd="sng">
+                      <a:noFill/>
+                    </a:lnL>
+                    <a:lnR w="12700" cmpd="sng">
+                      <a:noFill/>
+                    </a:lnR>
+                    <a:lnT w="12700" cmpd="sng">
+                      <a:noFill/>
+                    </a:lnT>
+                    <a:lnB w="12700" cmpd="sng">
+                      <a:noFill/>
+                    </a:lnB>
+                    <a:lnTlToBr w="12700" cmpd="sng">
+                      <a:noFill/>
+                      <a:prstDash val="solid"/>
+                    </a:lnTlToBr>
+                    <a:lnBlToTr w="12700" cmpd="sng">
+                      <a:noFill/>
+                      <a:prstDash val="solid"/>
+                    </a:lnBlToTr>
+                    <a:noFill/>
+                  </a:tcPr>
+                </a:tc>
+                <a:extLst>
+                  <a:ext uri="{0D108BD9-81ED-4DB2-BD59-A6C34878D82A}">
+                    <a16:rowId xmlns:a16="http://schemas.microsoft.com/office/drawing/2014/main" val="1701121716"/>
+                  </a:ext>
+                </a:extLst>
+              </a:tr>
+              <a:tr h="762000">
+                <a:tc>
+                  <a:txBody>
+                    <a:bodyPr/>
+                    <a:lstStyle/>
+                    <a:p>
+                      <a:pPr algn="r"/>
+                      <a:r>
+                        <a:rPr lang="nb-NO" sz="3200" dirty="0">
+                          <a:latin typeface="Aharoni" panose="02010803020104030203" pitchFamily="2" charset="-79"/>
+                          <a:cs typeface="Aharoni" panose="02010803020104030203" pitchFamily="2" charset="-79"/>
+                        </a:rPr>
+                        <a:t>14.</a:t>
+                      </a:r>
+                    </a:p>
+                  </a:txBody>
+                  <a:tcPr marL="15871" marR="15871" marT="7935" marB="7935" anchor="ctr">
+                    <a:lnL w="12700" cmpd="sng">
+                      <a:noFill/>
+                    </a:lnL>
+                    <a:lnR w="12700" cmpd="sng">
+                      <a:noFill/>
+                    </a:lnR>
+                    <a:lnT w="12700" cmpd="sng">
+                      <a:noFill/>
+                    </a:lnT>
+                    <a:lnB w="12700" cmpd="sng">
+                      <a:noFill/>
+                    </a:lnB>
+                    <a:lnTlToBr w="12700" cmpd="sng">
+                      <a:noFill/>
+                      <a:prstDash val="solid"/>
+                    </a:lnTlToBr>
+                    <a:lnBlToTr w="12700" cmpd="sng">
+                      <a:noFill/>
+                      <a:prstDash val="solid"/>
+                    </a:lnBlToTr>
+                    <a:noFill/>
+                  </a:tcPr>
+                </a:tc>
+                <a:extLst>
+                  <a:ext uri="{0D108BD9-81ED-4DB2-BD59-A6C34878D82A}">
+                    <a16:rowId xmlns:a16="http://schemas.microsoft.com/office/drawing/2014/main" val="3243994592"/>
+                  </a:ext>
+                </a:extLst>
+              </a:tr>
             </a:tbl>
           </a:graphicData>
         </a:graphic>
       </p:graphicFrame>
+      <p:cxnSp>
+        <p:nvCxnSpPr>
+          <p:cNvPr id="22" name="Rett linje 21">
+            <a:extLst>
+              <a:ext uri="{FF2B5EF4-FFF2-40B4-BE49-F238E27FC236}">
+                <a16:creationId xmlns:a16="http://schemas.microsoft.com/office/drawing/2014/main" id="{B53129F8-7D0E-0E45-59E5-4C689099E104}"/>
+              </a:ext>
+            </a:extLst>
+          </p:cNvPr>
+          <p:cNvCxnSpPr>
+            <a:cxnSpLocks/>
+          </p:cNvCxnSpPr>
+          <p:nvPr/>
+        </p:nvCxnSpPr>
+        <p:spPr>
+          <a:xfrm>
+            <a:off x="6324" y="3039036"/>
+            <a:ext cx="8273676" cy="0"/>
+          </a:xfrm>
+          <a:prstGeom prst="line">
+            <a:avLst/>
+          </a:prstGeom>
+          <a:ln w="38100">
+            <a:solidFill>
+              <a:schemeClr val="accent6"/>
+            </a:solidFill>
+          </a:ln>
+        </p:spPr>
+        <p:style>
+          <a:lnRef idx="1">
+            <a:schemeClr val="accent1"/>
+          </a:lnRef>
+          <a:fillRef idx="0">
+            <a:schemeClr val="accent1"/>
+          </a:fillRef>
+          <a:effectRef idx="0">
+            <a:schemeClr val="accent1"/>
+          </a:effectRef>
+          <a:fontRef idx="minor">
+            <a:schemeClr val="tx1"/>
+          </a:fontRef>
+        </p:style>
+      </p:cxnSp>
+      <p:cxnSp>
+        <p:nvCxnSpPr>
+          <p:cNvPr id="25" name="Rett linje 24">
+            <a:extLst>
+              <a:ext uri="{FF2B5EF4-FFF2-40B4-BE49-F238E27FC236}">
+                <a16:creationId xmlns:a16="http://schemas.microsoft.com/office/drawing/2014/main" id="{44E055DD-9A32-9C6F-EF83-8020AF5E6E9D}"/>
+              </a:ext>
+            </a:extLst>
+          </p:cNvPr>
+          <p:cNvCxnSpPr>
+            <a:cxnSpLocks/>
+          </p:cNvCxnSpPr>
+          <p:nvPr/>
+        </p:nvCxnSpPr>
+        <p:spPr>
+          <a:xfrm>
+            <a:off x="2762" y="5334000"/>
+            <a:ext cx="8273676" cy="0"/>
+          </a:xfrm>
+          <a:prstGeom prst="line">
+            <a:avLst/>
+          </a:prstGeom>
+          <a:ln w="38100">
+            <a:solidFill>
+              <a:srgbClr val="FFFF00"/>
+            </a:solidFill>
+          </a:ln>
+        </p:spPr>
+        <p:style>
+          <a:lnRef idx="1">
+            <a:schemeClr val="accent1"/>
+          </a:lnRef>
+          <a:fillRef idx="0">
+            <a:schemeClr val="accent1"/>
+          </a:fillRef>
+          <a:effectRef idx="0">
+            <a:schemeClr val="accent1"/>
+          </a:effectRef>
+          <a:fontRef idx="minor">
+            <a:schemeClr val="tx1"/>
+          </a:fontRef>
+        </p:style>
+      </p:cxnSp>
+      <p:cxnSp>
+        <p:nvCxnSpPr>
+          <p:cNvPr id="26" name="Rett linje 25">
+            <a:extLst>
+              <a:ext uri="{FF2B5EF4-FFF2-40B4-BE49-F238E27FC236}">
+                <a16:creationId xmlns:a16="http://schemas.microsoft.com/office/drawing/2014/main" id="{A0498694-4EE9-1B73-C709-5A3E1B459783}"/>
+              </a:ext>
+            </a:extLst>
+          </p:cNvPr>
+          <p:cNvCxnSpPr>
+            <a:cxnSpLocks/>
+          </p:cNvCxnSpPr>
+          <p:nvPr/>
+        </p:nvCxnSpPr>
+        <p:spPr>
+          <a:xfrm>
+            <a:off x="-400" y="9906640"/>
+            <a:ext cx="8273676" cy="0"/>
+          </a:xfrm>
+          <a:prstGeom prst="line">
+            <a:avLst/>
+          </a:prstGeom>
+          <a:ln w="38100">
+            <a:solidFill>
+              <a:srgbClr val="FC2A35"/>
+            </a:solidFill>
+          </a:ln>
+        </p:spPr>
+        <p:style>
+          <a:lnRef idx="1">
+            <a:schemeClr val="accent1"/>
+          </a:lnRef>
+          <a:fillRef idx="0">
+            <a:schemeClr val="accent1"/>
+          </a:fillRef>
+          <a:effectRef idx="0">
+            <a:schemeClr val="accent1"/>
+          </a:effectRef>
+          <a:fontRef idx="minor">
+            <a:schemeClr val="tx1"/>
+          </a:fontRef>
+        </p:style>
+      </p:cxnSp>
+      <p:cxnSp>
+        <p:nvCxnSpPr>
+          <p:cNvPr id="7" name="Rett linje 6">
+            <a:extLst>
+              <a:ext uri="{FF2B5EF4-FFF2-40B4-BE49-F238E27FC236}">
+                <a16:creationId xmlns:a16="http://schemas.microsoft.com/office/drawing/2014/main" id="{BD2EDAAD-EDF7-996F-E2BB-135DC2FEF3A7}"/>
+              </a:ext>
+            </a:extLst>
+          </p:cNvPr>
+          <p:cNvCxnSpPr>
+            <a:cxnSpLocks/>
+          </p:cNvCxnSpPr>
+          <p:nvPr/>
+        </p:nvCxnSpPr>
+        <p:spPr>
+          <a:xfrm>
+            <a:off x="-400" y="7609754"/>
+            <a:ext cx="8273676" cy="0"/>
+          </a:xfrm>
+          <a:prstGeom prst="line">
+            <a:avLst/>
+          </a:prstGeom>
+          <a:ln w="38100">
+            <a:solidFill>
+              <a:srgbClr val="F77411"/>
+            </a:solidFill>
+          </a:ln>
+        </p:spPr>
+        <p:style>
+          <a:lnRef idx="1">
+            <a:schemeClr val="accent1"/>
+          </a:lnRef>
+          <a:fillRef idx="0">
+            <a:schemeClr val="accent1"/>
+          </a:fillRef>
+          <a:effectRef idx="0">
+            <a:schemeClr val="accent1"/>
+          </a:effectRef>
+          <a:fontRef idx="minor">
+            <a:schemeClr val="tx1"/>
+          </a:fontRef>
+        </p:style>
+      </p:cxnSp>
     </p:spTree>
     <p:extLst>
       <p:ext uri="{BB962C8B-B14F-4D97-AF65-F5344CB8AC3E}">
-        <p14:creationId xmlns:p14="http://schemas.microsoft.com/office/powerpoint/2010/main" val="366954692"/>
+        <p14:creationId xmlns:p14="http://schemas.microsoft.com/office/powerpoint/2010/main" val="4100837682"/>
       </p:ext>
     </p:extLst>
   </p:cSld>
@@ -8175,13 +9942,1961 @@
           <p:nvPr>
             <p:extLst>
               <p:ext uri="{D42A27DB-BD31-4B8C-83A1-F6EECF244321}">
+                <p14:modId xmlns:p14="http://schemas.microsoft.com/office/powerpoint/2010/main" val="1257147748"/>
+              </p:ext>
+            </p:extLst>
+          </p:nvPr>
+        </p:nvGraphicFramePr>
+        <p:xfrm>
+          <a:off x="1" y="762000"/>
+          <a:ext cx="8280401" cy="9906000"/>
+        </p:xfrm>
+        <a:graphic>
+          <a:graphicData uri="http://schemas.openxmlformats.org/drawingml/2006/table">
+            <a:tbl>
+              <a:tblPr firstRow="1" bandRow="1">
+                <a:tableStyleId>{B301B821-A1FF-4177-AEE7-76D212191A09}</a:tableStyleId>
+              </a:tblPr>
+              <a:tblGrid>
+                <a:gridCol w="5630672">
+                  <a:extLst>
+                    <a:ext uri="{9D8B030D-6E8A-4147-A177-3AD203B41FA5}">
+                      <a16:colId xmlns:a16="http://schemas.microsoft.com/office/drawing/2014/main" val="467636141"/>
+                    </a:ext>
+                  </a:extLst>
+                </a:gridCol>
+                <a:gridCol w="883243">
+                  <a:extLst>
+                    <a:ext uri="{9D8B030D-6E8A-4147-A177-3AD203B41FA5}">
+                      <a16:colId xmlns:a16="http://schemas.microsoft.com/office/drawing/2014/main" val="2735060893"/>
+                    </a:ext>
+                  </a:extLst>
+                </a:gridCol>
+                <a:gridCol w="883243">
+                  <a:extLst>
+                    <a:ext uri="{9D8B030D-6E8A-4147-A177-3AD203B41FA5}">
+                      <a16:colId xmlns:a16="http://schemas.microsoft.com/office/drawing/2014/main" val="3274911069"/>
+                    </a:ext>
+                  </a:extLst>
+                </a:gridCol>
+                <a:gridCol w="883243">
+                  <a:extLst>
+                    <a:ext uri="{9D8B030D-6E8A-4147-A177-3AD203B41FA5}">
+                      <a16:colId xmlns:a16="http://schemas.microsoft.com/office/drawing/2014/main" val="3195967420"/>
+                    </a:ext>
+                  </a:extLst>
+                </a:gridCol>
+              </a:tblGrid>
+              <a:tr h="762000">
+                <a:tc>
+                  <a:txBody>
+                    <a:bodyPr/>
+                    <a:lstStyle/>
+                    <a:p>
+                      <a:pPr algn="l"/>
+                      <a:r>
+                        <a:rPr lang="nb-NO" sz="3200" dirty="0">
+                          <a:latin typeface="Aharoni" panose="02010803020104030203" pitchFamily="2" charset="-79"/>
+                          <a:cs typeface="Aharoni" panose="02010803020104030203" pitchFamily="2" charset="-79"/>
+                        </a:rPr>
+                        <a:t>     Spiller</a:t>
+                      </a:r>
+                    </a:p>
+                  </a:txBody>
+                  <a:tcPr marL="15871" marR="15871" marT="7935" marB="7935" anchor="ctr">
+                    <a:solidFill>
+                      <a:srgbClr val="FC2A35"/>
+                    </a:solidFill>
+                  </a:tcPr>
+                </a:tc>
+                <a:tc>
+                  <a:txBody>
+                    <a:bodyPr/>
+                    <a:lstStyle/>
+                    <a:p>
+                      <a:pPr algn="ctr"/>
+                      <a:endParaRPr lang="nb-NO" sz="2400" dirty="0">
+                        <a:latin typeface="Aharoni" panose="02010803020104030203" pitchFamily="2" charset="-79"/>
+                        <a:cs typeface="Aharoni" panose="02010803020104030203" pitchFamily="2" charset="-79"/>
+                      </a:endParaRPr>
+                    </a:p>
+                  </a:txBody>
+                  <a:tcPr marL="15871" marR="15871" marT="7935" marB="7935" anchor="ctr">
+                    <a:solidFill>
+                      <a:srgbClr val="FC2A35"/>
+                    </a:solidFill>
+                  </a:tcPr>
+                </a:tc>
+                <a:tc>
+                  <a:txBody>
+                    <a:bodyPr/>
+                    <a:lstStyle/>
+                    <a:p>
+                      <a:pPr algn="ctr"/>
+                      <a:endParaRPr lang="nb-NO" sz="2400" dirty="0">
+                        <a:latin typeface="Aharoni" panose="02010803020104030203" pitchFamily="2" charset="-79"/>
+                        <a:cs typeface="Aharoni" panose="02010803020104030203" pitchFamily="2" charset="-79"/>
+                      </a:endParaRPr>
+                    </a:p>
+                  </a:txBody>
+                  <a:tcPr marL="15871" marR="15871" marT="7935" marB="7935" anchor="ctr">
+                    <a:solidFill>
+                      <a:srgbClr val="FC2A35"/>
+                    </a:solidFill>
+                  </a:tcPr>
+                </a:tc>
+                <a:tc>
+                  <a:txBody>
+                    <a:bodyPr/>
+                    <a:lstStyle/>
+                    <a:p>
+                      <a:pPr algn="ctr"/>
+                      <a:r>
+                        <a:rPr lang="nb-NO" sz="2400" dirty="0">
+                          <a:latin typeface="Aharoni" panose="02010803020104030203" pitchFamily="2" charset="-79"/>
+                          <a:cs typeface="Aharoni" panose="02010803020104030203" pitchFamily="2" charset="-79"/>
+                        </a:rPr>
+                        <a:t>P</a:t>
+                      </a:r>
+                    </a:p>
+                  </a:txBody>
+                  <a:tcPr marL="15871" marR="15871" marT="7935" marB="7935" anchor="ctr">
+                    <a:solidFill>
+                      <a:srgbClr val="FC2A35"/>
+                    </a:solidFill>
+                  </a:tcPr>
+                </a:tc>
+                <a:extLst>
+                  <a:ext uri="{0D108BD9-81ED-4DB2-BD59-A6C34878D82A}">
+                    <a16:rowId xmlns:a16="http://schemas.microsoft.com/office/drawing/2014/main" val="2485443826"/>
+                  </a:ext>
+                </a:extLst>
+              </a:tr>
+              <a:tr h="762000">
+                <a:tc>
+                  <a:txBody>
+                    <a:bodyPr/>
+                    <a:lstStyle/>
+                    <a:p>
+                      <a:pPr algn="l"/>
+                      <a:endParaRPr lang="nb-NO" sz="3200" dirty="0">
+                        <a:latin typeface="Aharoni" panose="02010803020104030203" pitchFamily="2" charset="-79"/>
+                        <a:cs typeface="Aharoni" panose="02010803020104030203" pitchFamily="2" charset="-79"/>
+                      </a:endParaRPr>
+                    </a:p>
+                  </a:txBody>
+                  <a:tcPr marL="15871" marR="15871" marT="7935" marB="7935" anchor="ctr"/>
+                </a:tc>
+                <a:tc>
+                  <a:txBody>
+                    <a:bodyPr/>
+                    <a:lstStyle/>
+                    <a:p>
+                      <a:endParaRPr lang="nb-NO" sz="3200" dirty="0">
+                        <a:latin typeface="Aharoni" panose="02010803020104030203" pitchFamily="2" charset="-79"/>
+                        <a:cs typeface="Aharoni" panose="02010803020104030203" pitchFamily="2" charset="-79"/>
+                      </a:endParaRPr>
+                    </a:p>
+                  </a:txBody>
+                  <a:tcPr marL="15871" marR="15871" marT="7935" marB="7935"/>
+                </a:tc>
+                <a:tc>
+                  <a:txBody>
+                    <a:bodyPr/>
+                    <a:lstStyle/>
+                    <a:p>
+                      <a:endParaRPr lang="nb-NO" sz="3200" dirty="0">
+                        <a:latin typeface="Aharoni" panose="02010803020104030203" pitchFamily="2" charset="-79"/>
+                        <a:cs typeface="Aharoni" panose="02010803020104030203" pitchFamily="2" charset="-79"/>
+                      </a:endParaRPr>
+                    </a:p>
+                  </a:txBody>
+                  <a:tcPr marL="15871" marR="15871" marT="7935" marB="7935"/>
+                </a:tc>
+                <a:tc>
+                  <a:txBody>
+                    <a:bodyPr/>
+                    <a:lstStyle/>
+                    <a:p>
+                      <a:endParaRPr lang="nb-NO" sz="3200" dirty="0">
+                        <a:latin typeface="Aharoni" panose="02010803020104030203" pitchFamily="2" charset="-79"/>
+                        <a:cs typeface="Aharoni" panose="02010803020104030203" pitchFamily="2" charset="-79"/>
+                      </a:endParaRPr>
+                    </a:p>
+                  </a:txBody>
+                  <a:tcPr marL="15871" marR="15871" marT="7935" marB="7935"/>
+                </a:tc>
+                <a:extLst>
+                  <a:ext uri="{0D108BD9-81ED-4DB2-BD59-A6C34878D82A}">
+                    <a16:rowId xmlns:a16="http://schemas.microsoft.com/office/drawing/2014/main" val="970016319"/>
+                  </a:ext>
+                </a:extLst>
+              </a:tr>
+              <a:tr h="762000">
+                <a:tc>
+                  <a:txBody>
+                    <a:bodyPr/>
+                    <a:lstStyle/>
+                    <a:p>
+                      <a:pPr algn="l"/>
+                      <a:endParaRPr lang="nb-NO" sz="3200" dirty="0">
+                        <a:latin typeface="Aharoni" panose="02010803020104030203" pitchFamily="2" charset="-79"/>
+                        <a:cs typeface="Aharoni" panose="02010803020104030203" pitchFamily="2" charset="-79"/>
+                      </a:endParaRPr>
+                    </a:p>
+                  </a:txBody>
+                  <a:tcPr marL="15871" marR="15871" marT="7935" marB="7935" anchor="ctr">
+                    <a:solidFill>
+                      <a:srgbClr val="FC2A35">
+                        <a:alpha val="50196"/>
+                      </a:srgbClr>
+                    </a:solidFill>
+                  </a:tcPr>
+                </a:tc>
+                <a:tc>
+                  <a:txBody>
+                    <a:bodyPr/>
+                    <a:lstStyle/>
+                    <a:p>
+                      <a:endParaRPr lang="nb-NO" sz="3200" dirty="0">
+                        <a:latin typeface="Aharoni" panose="02010803020104030203" pitchFamily="2" charset="-79"/>
+                        <a:cs typeface="Aharoni" panose="02010803020104030203" pitchFamily="2" charset="-79"/>
+                      </a:endParaRPr>
+                    </a:p>
+                  </a:txBody>
+                  <a:tcPr marL="15871" marR="15871" marT="7935" marB="7935">
+                    <a:solidFill>
+                      <a:srgbClr val="FC2A35">
+                        <a:alpha val="50196"/>
+                      </a:srgbClr>
+                    </a:solidFill>
+                  </a:tcPr>
+                </a:tc>
+                <a:tc>
+                  <a:txBody>
+                    <a:bodyPr/>
+                    <a:lstStyle/>
+                    <a:p>
+                      <a:endParaRPr lang="nb-NO" sz="3200" dirty="0">
+                        <a:latin typeface="Aharoni" panose="02010803020104030203" pitchFamily="2" charset="-79"/>
+                        <a:cs typeface="Aharoni" panose="02010803020104030203" pitchFamily="2" charset="-79"/>
+                      </a:endParaRPr>
+                    </a:p>
+                  </a:txBody>
+                  <a:tcPr marL="15871" marR="15871" marT="7935" marB="7935">
+                    <a:solidFill>
+                      <a:srgbClr val="FC2A35">
+                        <a:alpha val="50196"/>
+                      </a:srgbClr>
+                    </a:solidFill>
+                  </a:tcPr>
+                </a:tc>
+                <a:tc>
+                  <a:txBody>
+                    <a:bodyPr/>
+                    <a:lstStyle/>
+                    <a:p>
+                      <a:endParaRPr lang="nb-NO" sz="3200" dirty="0">
+                        <a:latin typeface="Aharoni" panose="02010803020104030203" pitchFamily="2" charset="-79"/>
+                        <a:cs typeface="Aharoni" panose="02010803020104030203" pitchFamily="2" charset="-79"/>
+                      </a:endParaRPr>
+                    </a:p>
+                  </a:txBody>
+                  <a:tcPr marL="15871" marR="15871" marT="7935" marB="7935">
+                    <a:solidFill>
+                      <a:srgbClr val="FC2A35">
+                        <a:alpha val="50196"/>
+                      </a:srgbClr>
+                    </a:solidFill>
+                  </a:tcPr>
+                </a:tc>
+                <a:extLst>
+                  <a:ext uri="{0D108BD9-81ED-4DB2-BD59-A6C34878D82A}">
+                    <a16:rowId xmlns:a16="http://schemas.microsoft.com/office/drawing/2014/main" val="1768278853"/>
+                  </a:ext>
+                </a:extLst>
+              </a:tr>
+              <a:tr h="762000">
+                <a:tc>
+                  <a:txBody>
+                    <a:bodyPr/>
+                    <a:lstStyle/>
+                    <a:p>
+                      <a:pPr algn="l"/>
+                      <a:endParaRPr lang="nb-NO" sz="3200" dirty="0">
+                        <a:latin typeface="Aharoni" panose="02010803020104030203" pitchFamily="2" charset="-79"/>
+                        <a:cs typeface="Aharoni" panose="02010803020104030203" pitchFamily="2" charset="-79"/>
+                      </a:endParaRPr>
+                    </a:p>
+                  </a:txBody>
+                  <a:tcPr marL="15871" marR="15871" marT="7935" marB="7935" anchor="ctr"/>
+                </a:tc>
+                <a:tc>
+                  <a:txBody>
+                    <a:bodyPr/>
+                    <a:lstStyle/>
+                    <a:p>
+                      <a:endParaRPr lang="nb-NO" sz="3200" dirty="0">
+                        <a:latin typeface="Aharoni" panose="02010803020104030203" pitchFamily="2" charset="-79"/>
+                        <a:cs typeface="Aharoni" panose="02010803020104030203" pitchFamily="2" charset="-79"/>
+                      </a:endParaRPr>
+                    </a:p>
+                  </a:txBody>
+                  <a:tcPr marL="15871" marR="15871" marT="7935" marB="7935"/>
+                </a:tc>
+                <a:tc>
+                  <a:txBody>
+                    <a:bodyPr/>
+                    <a:lstStyle/>
+                    <a:p>
+                      <a:endParaRPr lang="nb-NO" sz="3200" dirty="0">
+                        <a:latin typeface="Aharoni" panose="02010803020104030203" pitchFamily="2" charset="-79"/>
+                        <a:cs typeface="Aharoni" panose="02010803020104030203" pitchFamily="2" charset="-79"/>
+                      </a:endParaRPr>
+                    </a:p>
+                  </a:txBody>
+                  <a:tcPr marL="15871" marR="15871" marT="7935" marB="7935"/>
+                </a:tc>
+                <a:tc>
+                  <a:txBody>
+                    <a:bodyPr/>
+                    <a:lstStyle/>
+                    <a:p>
+                      <a:endParaRPr lang="nb-NO" sz="3200">
+                        <a:latin typeface="Aharoni" panose="02010803020104030203" pitchFamily="2" charset="-79"/>
+                        <a:cs typeface="Aharoni" panose="02010803020104030203" pitchFamily="2" charset="-79"/>
+                      </a:endParaRPr>
+                    </a:p>
+                  </a:txBody>
+                  <a:tcPr marL="15871" marR="15871" marT="7935" marB="7935"/>
+                </a:tc>
+                <a:extLst>
+                  <a:ext uri="{0D108BD9-81ED-4DB2-BD59-A6C34878D82A}">
+                    <a16:rowId xmlns:a16="http://schemas.microsoft.com/office/drawing/2014/main" val="2430461858"/>
+                  </a:ext>
+                </a:extLst>
+              </a:tr>
+              <a:tr h="762000">
+                <a:tc>
+                  <a:txBody>
+                    <a:bodyPr/>
+                    <a:lstStyle/>
+                    <a:p>
+                      <a:pPr algn="l"/>
+                      <a:endParaRPr lang="nb-NO" sz="3200" dirty="0">
+                        <a:latin typeface="Aharoni" panose="02010803020104030203" pitchFamily="2" charset="-79"/>
+                        <a:cs typeface="Aharoni" panose="02010803020104030203" pitchFamily="2" charset="-79"/>
+                      </a:endParaRPr>
+                    </a:p>
+                  </a:txBody>
+                  <a:tcPr marL="15871" marR="15871" marT="7935" marB="7935" anchor="ctr">
+                    <a:solidFill>
+                      <a:srgbClr val="FC2A35">
+                        <a:alpha val="50196"/>
+                      </a:srgbClr>
+                    </a:solidFill>
+                  </a:tcPr>
+                </a:tc>
+                <a:tc>
+                  <a:txBody>
+                    <a:bodyPr/>
+                    <a:lstStyle/>
+                    <a:p>
+                      <a:endParaRPr lang="nb-NO" sz="3200" dirty="0">
+                        <a:latin typeface="Aharoni" panose="02010803020104030203" pitchFamily="2" charset="-79"/>
+                        <a:cs typeface="Aharoni" panose="02010803020104030203" pitchFamily="2" charset="-79"/>
+                      </a:endParaRPr>
+                    </a:p>
+                  </a:txBody>
+                  <a:tcPr marL="15871" marR="15871" marT="7935" marB="7935">
+                    <a:solidFill>
+                      <a:srgbClr val="FC2A35">
+                        <a:alpha val="50196"/>
+                      </a:srgbClr>
+                    </a:solidFill>
+                  </a:tcPr>
+                </a:tc>
+                <a:tc>
+                  <a:txBody>
+                    <a:bodyPr/>
+                    <a:lstStyle/>
+                    <a:p>
+                      <a:endParaRPr lang="nb-NO" sz="3200" dirty="0">
+                        <a:latin typeface="Aharoni" panose="02010803020104030203" pitchFamily="2" charset="-79"/>
+                        <a:cs typeface="Aharoni" panose="02010803020104030203" pitchFamily="2" charset="-79"/>
+                      </a:endParaRPr>
+                    </a:p>
+                  </a:txBody>
+                  <a:tcPr marL="15871" marR="15871" marT="7935" marB="7935">
+                    <a:solidFill>
+                      <a:srgbClr val="FC2A35">
+                        <a:alpha val="50196"/>
+                      </a:srgbClr>
+                    </a:solidFill>
+                  </a:tcPr>
+                </a:tc>
+                <a:tc>
+                  <a:txBody>
+                    <a:bodyPr/>
+                    <a:lstStyle/>
+                    <a:p>
+                      <a:endParaRPr lang="nb-NO" sz="3200" dirty="0">
+                        <a:latin typeface="Aharoni" panose="02010803020104030203" pitchFamily="2" charset="-79"/>
+                        <a:cs typeface="Aharoni" panose="02010803020104030203" pitchFamily="2" charset="-79"/>
+                      </a:endParaRPr>
+                    </a:p>
+                  </a:txBody>
+                  <a:tcPr marL="15871" marR="15871" marT="7935" marB="7935">
+                    <a:solidFill>
+                      <a:srgbClr val="FC2A35">
+                        <a:alpha val="50196"/>
+                      </a:srgbClr>
+                    </a:solidFill>
+                  </a:tcPr>
+                </a:tc>
+                <a:extLst>
+                  <a:ext uri="{0D108BD9-81ED-4DB2-BD59-A6C34878D82A}">
+                    <a16:rowId xmlns:a16="http://schemas.microsoft.com/office/drawing/2014/main" val="562444116"/>
+                  </a:ext>
+                </a:extLst>
+              </a:tr>
+              <a:tr h="762000">
+                <a:tc>
+                  <a:txBody>
+                    <a:bodyPr/>
+                    <a:lstStyle/>
+                    <a:p>
+                      <a:pPr algn="l"/>
+                      <a:endParaRPr lang="nb-NO" sz="3200" dirty="0">
+                        <a:latin typeface="Aharoni" panose="02010803020104030203" pitchFamily="2" charset="-79"/>
+                        <a:cs typeface="Aharoni" panose="02010803020104030203" pitchFamily="2" charset="-79"/>
+                      </a:endParaRPr>
+                    </a:p>
+                  </a:txBody>
+                  <a:tcPr marL="15871" marR="15871" marT="7935" marB="7935" anchor="ctr"/>
+                </a:tc>
+                <a:tc>
+                  <a:txBody>
+                    <a:bodyPr/>
+                    <a:lstStyle/>
+                    <a:p>
+                      <a:endParaRPr lang="nb-NO" sz="3200">
+                        <a:latin typeface="Aharoni" panose="02010803020104030203" pitchFamily="2" charset="-79"/>
+                        <a:cs typeface="Aharoni" panose="02010803020104030203" pitchFamily="2" charset="-79"/>
+                      </a:endParaRPr>
+                    </a:p>
+                  </a:txBody>
+                  <a:tcPr marL="15871" marR="15871" marT="7935" marB="7935"/>
+                </a:tc>
+                <a:tc>
+                  <a:txBody>
+                    <a:bodyPr/>
+                    <a:lstStyle/>
+                    <a:p>
+                      <a:endParaRPr lang="nb-NO" sz="3200">
+                        <a:latin typeface="Aharoni" panose="02010803020104030203" pitchFamily="2" charset="-79"/>
+                        <a:cs typeface="Aharoni" panose="02010803020104030203" pitchFamily="2" charset="-79"/>
+                      </a:endParaRPr>
+                    </a:p>
+                  </a:txBody>
+                  <a:tcPr marL="15871" marR="15871" marT="7935" marB="7935"/>
+                </a:tc>
+                <a:tc>
+                  <a:txBody>
+                    <a:bodyPr/>
+                    <a:lstStyle/>
+                    <a:p>
+                      <a:endParaRPr lang="nb-NO" sz="3200">
+                        <a:latin typeface="Aharoni" panose="02010803020104030203" pitchFamily="2" charset="-79"/>
+                        <a:cs typeface="Aharoni" panose="02010803020104030203" pitchFamily="2" charset="-79"/>
+                      </a:endParaRPr>
+                    </a:p>
+                  </a:txBody>
+                  <a:tcPr marL="15871" marR="15871" marT="7935" marB="7935"/>
+                </a:tc>
+                <a:extLst>
+                  <a:ext uri="{0D108BD9-81ED-4DB2-BD59-A6C34878D82A}">
+                    <a16:rowId xmlns:a16="http://schemas.microsoft.com/office/drawing/2014/main" val="3408060152"/>
+                  </a:ext>
+                </a:extLst>
+              </a:tr>
+              <a:tr h="762000">
+                <a:tc>
+                  <a:txBody>
+                    <a:bodyPr/>
+                    <a:lstStyle/>
+                    <a:p>
+                      <a:pPr algn="l"/>
+                      <a:endParaRPr lang="nb-NO" sz="3200" dirty="0">
+                        <a:latin typeface="Aharoni" panose="02010803020104030203" pitchFamily="2" charset="-79"/>
+                        <a:cs typeface="Aharoni" panose="02010803020104030203" pitchFamily="2" charset="-79"/>
+                      </a:endParaRPr>
+                    </a:p>
+                  </a:txBody>
+                  <a:tcPr marL="15871" marR="15871" marT="7935" marB="7935" anchor="ctr">
+                    <a:solidFill>
+                      <a:srgbClr val="FC2A35">
+                        <a:alpha val="50196"/>
+                      </a:srgbClr>
+                    </a:solidFill>
+                  </a:tcPr>
+                </a:tc>
+                <a:tc>
+                  <a:txBody>
+                    <a:bodyPr/>
+                    <a:lstStyle/>
+                    <a:p>
+                      <a:endParaRPr lang="nb-NO" sz="3200" dirty="0">
+                        <a:latin typeface="Aharoni" panose="02010803020104030203" pitchFamily="2" charset="-79"/>
+                        <a:cs typeface="Aharoni" panose="02010803020104030203" pitchFamily="2" charset="-79"/>
+                      </a:endParaRPr>
+                    </a:p>
+                  </a:txBody>
+                  <a:tcPr marL="15871" marR="15871" marT="7935" marB="7935">
+                    <a:solidFill>
+                      <a:srgbClr val="FC2A35">
+                        <a:alpha val="50196"/>
+                      </a:srgbClr>
+                    </a:solidFill>
+                  </a:tcPr>
+                </a:tc>
+                <a:tc>
+                  <a:txBody>
+                    <a:bodyPr/>
+                    <a:lstStyle/>
+                    <a:p>
+                      <a:endParaRPr lang="nb-NO" sz="3200" dirty="0">
+                        <a:latin typeface="Aharoni" panose="02010803020104030203" pitchFamily="2" charset="-79"/>
+                        <a:cs typeface="Aharoni" panose="02010803020104030203" pitchFamily="2" charset="-79"/>
+                      </a:endParaRPr>
+                    </a:p>
+                  </a:txBody>
+                  <a:tcPr marL="15871" marR="15871" marT="7935" marB="7935">
+                    <a:solidFill>
+                      <a:srgbClr val="FC2A35">
+                        <a:alpha val="50196"/>
+                      </a:srgbClr>
+                    </a:solidFill>
+                  </a:tcPr>
+                </a:tc>
+                <a:tc>
+                  <a:txBody>
+                    <a:bodyPr/>
+                    <a:lstStyle/>
+                    <a:p>
+                      <a:endParaRPr lang="nb-NO" sz="3200" dirty="0">
+                        <a:latin typeface="Aharoni" panose="02010803020104030203" pitchFamily="2" charset="-79"/>
+                        <a:cs typeface="Aharoni" panose="02010803020104030203" pitchFamily="2" charset="-79"/>
+                      </a:endParaRPr>
+                    </a:p>
+                  </a:txBody>
+                  <a:tcPr marL="15871" marR="15871" marT="7935" marB="7935">
+                    <a:solidFill>
+                      <a:srgbClr val="FC2A35">
+                        <a:alpha val="50196"/>
+                      </a:srgbClr>
+                    </a:solidFill>
+                  </a:tcPr>
+                </a:tc>
+                <a:extLst>
+                  <a:ext uri="{0D108BD9-81ED-4DB2-BD59-A6C34878D82A}">
+                    <a16:rowId xmlns:a16="http://schemas.microsoft.com/office/drawing/2014/main" val="523711046"/>
+                  </a:ext>
+                </a:extLst>
+              </a:tr>
+              <a:tr h="762000">
+                <a:tc>
+                  <a:txBody>
+                    <a:bodyPr/>
+                    <a:lstStyle/>
+                    <a:p>
+                      <a:pPr algn="l"/>
+                      <a:endParaRPr lang="nb-NO" sz="3200" dirty="0">
+                        <a:latin typeface="Aharoni" panose="02010803020104030203" pitchFamily="2" charset="-79"/>
+                        <a:cs typeface="Aharoni" panose="02010803020104030203" pitchFamily="2" charset="-79"/>
+                      </a:endParaRPr>
+                    </a:p>
+                  </a:txBody>
+                  <a:tcPr marL="15871" marR="15871" marT="7935" marB="7935" anchor="ctr"/>
+                </a:tc>
+                <a:tc>
+                  <a:txBody>
+                    <a:bodyPr/>
+                    <a:lstStyle/>
+                    <a:p>
+                      <a:endParaRPr lang="nb-NO" sz="3200" dirty="0">
+                        <a:latin typeface="Aharoni" panose="02010803020104030203" pitchFamily="2" charset="-79"/>
+                        <a:cs typeface="Aharoni" panose="02010803020104030203" pitchFamily="2" charset="-79"/>
+                      </a:endParaRPr>
+                    </a:p>
+                  </a:txBody>
+                  <a:tcPr marL="15871" marR="15871" marT="7935" marB="7935"/>
+                </a:tc>
+                <a:tc>
+                  <a:txBody>
+                    <a:bodyPr/>
+                    <a:lstStyle/>
+                    <a:p>
+                      <a:endParaRPr lang="nb-NO" sz="3200">
+                        <a:latin typeface="Aharoni" panose="02010803020104030203" pitchFamily="2" charset="-79"/>
+                        <a:cs typeface="Aharoni" panose="02010803020104030203" pitchFamily="2" charset="-79"/>
+                      </a:endParaRPr>
+                    </a:p>
+                  </a:txBody>
+                  <a:tcPr marL="15871" marR="15871" marT="7935" marB="7935"/>
+                </a:tc>
+                <a:tc>
+                  <a:txBody>
+                    <a:bodyPr/>
+                    <a:lstStyle/>
+                    <a:p>
+                      <a:endParaRPr lang="nb-NO" sz="3200">
+                        <a:latin typeface="Aharoni" panose="02010803020104030203" pitchFamily="2" charset="-79"/>
+                        <a:cs typeface="Aharoni" panose="02010803020104030203" pitchFamily="2" charset="-79"/>
+                      </a:endParaRPr>
+                    </a:p>
+                  </a:txBody>
+                  <a:tcPr marL="15871" marR="15871" marT="7935" marB="7935"/>
+                </a:tc>
+                <a:extLst>
+                  <a:ext uri="{0D108BD9-81ED-4DB2-BD59-A6C34878D82A}">
+                    <a16:rowId xmlns:a16="http://schemas.microsoft.com/office/drawing/2014/main" val="2081121560"/>
+                  </a:ext>
+                </a:extLst>
+              </a:tr>
+              <a:tr h="762000">
+                <a:tc>
+                  <a:txBody>
+                    <a:bodyPr/>
+                    <a:lstStyle/>
+                    <a:p>
+                      <a:pPr algn="l"/>
+                      <a:endParaRPr lang="nb-NO" sz="3200" dirty="0">
+                        <a:latin typeface="Aharoni" panose="02010803020104030203" pitchFamily="2" charset="-79"/>
+                        <a:cs typeface="Aharoni" panose="02010803020104030203" pitchFamily="2" charset="-79"/>
+                      </a:endParaRPr>
+                    </a:p>
+                  </a:txBody>
+                  <a:tcPr marL="15871" marR="15871" marT="7935" marB="7935" anchor="ctr">
+                    <a:solidFill>
+                      <a:srgbClr val="FC2A35">
+                        <a:alpha val="50196"/>
+                      </a:srgbClr>
+                    </a:solidFill>
+                  </a:tcPr>
+                </a:tc>
+                <a:tc>
+                  <a:txBody>
+                    <a:bodyPr/>
+                    <a:lstStyle/>
+                    <a:p>
+                      <a:endParaRPr lang="nb-NO" sz="3200" dirty="0">
+                        <a:latin typeface="Aharoni" panose="02010803020104030203" pitchFamily="2" charset="-79"/>
+                        <a:cs typeface="Aharoni" panose="02010803020104030203" pitchFamily="2" charset="-79"/>
+                      </a:endParaRPr>
+                    </a:p>
+                  </a:txBody>
+                  <a:tcPr marL="15871" marR="15871" marT="7935" marB="7935">
+                    <a:solidFill>
+                      <a:srgbClr val="FC2A35">
+                        <a:alpha val="50196"/>
+                      </a:srgbClr>
+                    </a:solidFill>
+                  </a:tcPr>
+                </a:tc>
+                <a:tc>
+                  <a:txBody>
+                    <a:bodyPr/>
+                    <a:lstStyle/>
+                    <a:p>
+                      <a:endParaRPr lang="nb-NO" sz="3200" dirty="0">
+                        <a:latin typeface="Aharoni" panose="02010803020104030203" pitchFamily="2" charset="-79"/>
+                        <a:cs typeface="Aharoni" panose="02010803020104030203" pitchFamily="2" charset="-79"/>
+                      </a:endParaRPr>
+                    </a:p>
+                  </a:txBody>
+                  <a:tcPr marL="15871" marR="15871" marT="7935" marB="7935">
+                    <a:solidFill>
+                      <a:srgbClr val="FC2A35">
+                        <a:alpha val="50196"/>
+                      </a:srgbClr>
+                    </a:solidFill>
+                  </a:tcPr>
+                </a:tc>
+                <a:tc>
+                  <a:txBody>
+                    <a:bodyPr/>
+                    <a:lstStyle/>
+                    <a:p>
+                      <a:endParaRPr lang="nb-NO" sz="3200" dirty="0">
+                        <a:latin typeface="Aharoni" panose="02010803020104030203" pitchFamily="2" charset="-79"/>
+                        <a:cs typeface="Aharoni" panose="02010803020104030203" pitchFamily="2" charset="-79"/>
+                      </a:endParaRPr>
+                    </a:p>
+                  </a:txBody>
+                  <a:tcPr marL="15871" marR="15871" marT="7935" marB="7935">
+                    <a:solidFill>
+                      <a:srgbClr val="FC2A35">
+                        <a:alpha val="50196"/>
+                      </a:srgbClr>
+                    </a:solidFill>
+                  </a:tcPr>
+                </a:tc>
+                <a:extLst>
+                  <a:ext uri="{0D108BD9-81ED-4DB2-BD59-A6C34878D82A}">
+                    <a16:rowId xmlns:a16="http://schemas.microsoft.com/office/drawing/2014/main" val="3091322381"/>
+                  </a:ext>
+                </a:extLst>
+              </a:tr>
+              <a:tr h="762000">
+                <a:tc>
+                  <a:txBody>
+                    <a:bodyPr/>
+                    <a:lstStyle/>
+                    <a:p>
+                      <a:pPr algn="l"/>
+                      <a:endParaRPr lang="nb-NO" sz="3200" dirty="0">
+                        <a:latin typeface="Aharoni" panose="02010803020104030203" pitchFamily="2" charset="-79"/>
+                        <a:cs typeface="Aharoni" panose="02010803020104030203" pitchFamily="2" charset="-79"/>
+                      </a:endParaRPr>
+                    </a:p>
+                  </a:txBody>
+                  <a:tcPr marL="15871" marR="15871" marT="7935" marB="7935" anchor="ctr"/>
+                </a:tc>
+                <a:tc>
+                  <a:txBody>
+                    <a:bodyPr/>
+                    <a:lstStyle/>
+                    <a:p>
+                      <a:endParaRPr lang="nb-NO" sz="3200">
+                        <a:latin typeface="Aharoni" panose="02010803020104030203" pitchFamily="2" charset="-79"/>
+                        <a:cs typeface="Aharoni" panose="02010803020104030203" pitchFamily="2" charset="-79"/>
+                      </a:endParaRPr>
+                    </a:p>
+                  </a:txBody>
+                  <a:tcPr marL="15871" marR="15871" marT="7935" marB="7935"/>
+                </a:tc>
+                <a:tc>
+                  <a:txBody>
+                    <a:bodyPr/>
+                    <a:lstStyle/>
+                    <a:p>
+                      <a:endParaRPr lang="nb-NO" sz="3200">
+                        <a:latin typeface="Aharoni" panose="02010803020104030203" pitchFamily="2" charset="-79"/>
+                        <a:cs typeface="Aharoni" panose="02010803020104030203" pitchFamily="2" charset="-79"/>
+                      </a:endParaRPr>
+                    </a:p>
+                  </a:txBody>
+                  <a:tcPr marL="15871" marR="15871" marT="7935" marB="7935"/>
+                </a:tc>
+                <a:tc>
+                  <a:txBody>
+                    <a:bodyPr/>
+                    <a:lstStyle/>
+                    <a:p>
+                      <a:endParaRPr lang="nb-NO" sz="3200">
+                        <a:latin typeface="Aharoni" panose="02010803020104030203" pitchFamily="2" charset="-79"/>
+                        <a:cs typeface="Aharoni" panose="02010803020104030203" pitchFamily="2" charset="-79"/>
+                      </a:endParaRPr>
+                    </a:p>
+                  </a:txBody>
+                  <a:tcPr marL="15871" marR="15871" marT="7935" marB="7935"/>
+                </a:tc>
+                <a:extLst>
+                  <a:ext uri="{0D108BD9-81ED-4DB2-BD59-A6C34878D82A}">
+                    <a16:rowId xmlns:a16="http://schemas.microsoft.com/office/drawing/2014/main" val="213047754"/>
+                  </a:ext>
+                </a:extLst>
+              </a:tr>
+              <a:tr h="762000">
+                <a:tc>
+                  <a:txBody>
+                    <a:bodyPr/>
+                    <a:lstStyle/>
+                    <a:p>
+                      <a:pPr algn="l"/>
+                      <a:endParaRPr lang="nb-NO" sz="3200" dirty="0">
+                        <a:latin typeface="Aharoni" panose="02010803020104030203" pitchFamily="2" charset="-79"/>
+                        <a:cs typeface="Aharoni" panose="02010803020104030203" pitchFamily="2" charset="-79"/>
+                      </a:endParaRPr>
+                    </a:p>
+                  </a:txBody>
+                  <a:tcPr marL="15871" marR="15871" marT="7935" marB="7935" anchor="ctr">
+                    <a:solidFill>
+                      <a:srgbClr val="FC2A35">
+                        <a:alpha val="50196"/>
+                      </a:srgbClr>
+                    </a:solidFill>
+                  </a:tcPr>
+                </a:tc>
+                <a:tc>
+                  <a:txBody>
+                    <a:bodyPr/>
+                    <a:lstStyle/>
+                    <a:p>
+                      <a:endParaRPr lang="nb-NO" sz="3200" dirty="0">
+                        <a:latin typeface="Aharoni" panose="02010803020104030203" pitchFamily="2" charset="-79"/>
+                        <a:cs typeface="Aharoni" panose="02010803020104030203" pitchFamily="2" charset="-79"/>
+                      </a:endParaRPr>
+                    </a:p>
+                  </a:txBody>
+                  <a:tcPr marL="15871" marR="15871" marT="7935" marB="7935">
+                    <a:solidFill>
+                      <a:srgbClr val="FC2A35">
+                        <a:alpha val="50196"/>
+                      </a:srgbClr>
+                    </a:solidFill>
+                  </a:tcPr>
+                </a:tc>
+                <a:tc>
+                  <a:txBody>
+                    <a:bodyPr/>
+                    <a:lstStyle/>
+                    <a:p>
+                      <a:endParaRPr lang="nb-NO" sz="3200" dirty="0">
+                        <a:latin typeface="Aharoni" panose="02010803020104030203" pitchFamily="2" charset="-79"/>
+                        <a:cs typeface="Aharoni" panose="02010803020104030203" pitchFamily="2" charset="-79"/>
+                      </a:endParaRPr>
+                    </a:p>
+                  </a:txBody>
+                  <a:tcPr marL="15871" marR="15871" marT="7935" marB="7935">
+                    <a:solidFill>
+                      <a:srgbClr val="FC2A35">
+                        <a:alpha val="50196"/>
+                      </a:srgbClr>
+                    </a:solidFill>
+                  </a:tcPr>
+                </a:tc>
+                <a:tc>
+                  <a:txBody>
+                    <a:bodyPr/>
+                    <a:lstStyle/>
+                    <a:p>
+                      <a:endParaRPr lang="nb-NO" sz="3200" dirty="0">
+                        <a:latin typeface="Aharoni" panose="02010803020104030203" pitchFamily="2" charset="-79"/>
+                        <a:cs typeface="Aharoni" panose="02010803020104030203" pitchFamily="2" charset="-79"/>
+                      </a:endParaRPr>
+                    </a:p>
+                  </a:txBody>
+                  <a:tcPr marL="15871" marR="15871" marT="7935" marB="7935">
+                    <a:solidFill>
+                      <a:srgbClr val="FC2A35">
+                        <a:alpha val="50196"/>
+                      </a:srgbClr>
+                    </a:solidFill>
+                  </a:tcPr>
+                </a:tc>
+                <a:extLst>
+                  <a:ext uri="{0D108BD9-81ED-4DB2-BD59-A6C34878D82A}">
+                    <a16:rowId xmlns:a16="http://schemas.microsoft.com/office/drawing/2014/main" val="183245562"/>
+                  </a:ext>
+                </a:extLst>
+              </a:tr>
+              <a:tr h="762000">
+                <a:tc>
+                  <a:txBody>
+                    <a:bodyPr/>
+                    <a:lstStyle/>
+                    <a:p>
+                      <a:pPr algn="l"/>
+                      <a:endParaRPr lang="nb-NO" sz="3200" dirty="0">
+                        <a:latin typeface="Aharoni" panose="02010803020104030203" pitchFamily="2" charset="-79"/>
+                        <a:cs typeface="Aharoni" panose="02010803020104030203" pitchFamily="2" charset="-79"/>
+                      </a:endParaRPr>
+                    </a:p>
+                  </a:txBody>
+                  <a:tcPr marL="15871" marR="15871" marT="7935" marB="7935" anchor="ctr"/>
+                </a:tc>
+                <a:tc>
+                  <a:txBody>
+                    <a:bodyPr/>
+                    <a:lstStyle/>
+                    <a:p>
+                      <a:endParaRPr lang="nb-NO" sz="3200">
+                        <a:latin typeface="Aharoni" panose="02010803020104030203" pitchFamily="2" charset="-79"/>
+                        <a:cs typeface="Aharoni" panose="02010803020104030203" pitchFamily="2" charset="-79"/>
+                      </a:endParaRPr>
+                    </a:p>
+                  </a:txBody>
+                  <a:tcPr marL="15871" marR="15871" marT="7935" marB="7935"/>
+                </a:tc>
+                <a:tc>
+                  <a:txBody>
+                    <a:bodyPr/>
+                    <a:lstStyle/>
+                    <a:p>
+                      <a:endParaRPr lang="nb-NO" sz="3200">
+                        <a:latin typeface="Aharoni" panose="02010803020104030203" pitchFamily="2" charset="-79"/>
+                        <a:cs typeface="Aharoni" panose="02010803020104030203" pitchFamily="2" charset="-79"/>
+                      </a:endParaRPr>
+                    </a:p>
+                  </a:txBody>
+                  <a:tcPr marL="15871" marR="15871" marT="7935" marB="7935"/>
+                </a:tc>
+                <a:tc>
+                  <a:txBody>
+                    <a:bodyPr/>
+                    <a:lstStyle/>
+                    <a:p>
+                      <a:endParaRPr lang="nb-NO" sz="3200">
+                        <a:latin typeface="Aharoni" panose="02010803020104030203" pitchFamily="2" charset="-79"/>
+                        <a:cs typeface="Aharoni" panose="02010803020104030203" pitchFamily="2" charset="-79"/>
+                      </a:endParaRPr>
+                    </a:p>
+                  </a:txBody>
+                  <a:tcPr marL="15871" marR="15871" marT="7935" marB="7935"/>
+                </a:tc>
+                <a:extLst>
+                  <a:ext uri="{0D108BD9-81ED-4DB2-BD59-A6C34878D82A}">
+                    <a16:rowId xmlns:a16="http://schemas.microsoft.com/office/drawing/2014/main" val="1177545744"/>
+                  </a:ext>
+                </a:extLst>
+              </a:tr>
+              <a:tr h="762000">
+                <a:tc>
+                  <a:txBody>
+                    <a:bodyPr/>
+                    <a:lstStyle/>
+                    <a:p>
+                      <a:pPr algn="l"/>
+                      <a:endParaRPr lang="nb-NO" sz="3200" dirty="0">
+                        <a:latin typeface="Aharoni" panose="02010803020104030203" pitchFamily="2" charset="-79"/>
+                        <a:cs typeface="Aharoni" panose="02010803020104030203" pitchFamily="2" charset="-79"/>
+                      </a:endParaRPr>
+                    </a:p>
+                  </a:txBody>
+                  <a:tcPr marL="15871" marR="15871" marT="7935" marB="7935" anchor="ctr">
+                    <a:solidFill>
+                      <a:srgbClr val="FC2A35">
+                        <a:alpha val="50196"/>
+                      </a:srgbClr>
+                    </a:solidFill>
+                  </a:tcPr>
+                </a:tc>
+                <a:tc>
+                  <a:txBody>
+                    <a:bodyPr/>
+                    <a:lstStyle/>
+                    <a:p>
+                      <a:endParaRPr lang="nb-NO" sz="3200" dirty="0">
+                        <a:latin typeface="Aharoni" panose="02010803020104030203" pitchFamily="2" charset="-79"/>
+                        <a:cs typeface="Aharoni" panose="02010803020104030203" pitchFamily="2" charset="-79"/>
+                      </a:endParaRPr>
+                    </a:p>
+                  </a:txBody>
+                  <a:tcPr marL="15871" marR="15871" marT="7935" marB="7935">
+                    <a:solidFill>
+                      <a:srgbClr val="FC2A35">
+                        <a:alpha val="50196"/>
+                      </a:srgbClr>
+                    </a:solidFill>
+                  </a:tcPr>
+                </a:tc>
+                <a:tc>
+                  <a:txBody>
+                    <a:bodyPr/>
+                    <a:lstStyle/>
+                    <a:p>
+                      <a:endParaRPr lang="nb-NO" sz="3200" dirty="0">
+                        <a:latin typeface="Aharoni" panose="02010803020104030203" pitchFamily="2" charset="-79"/>
+                        <a:cs typeface="Aharoni" panose="02010803020104030203" pitchFamily="2" charset="-79"/>
+                      </a:endParaRPr>
+                    </a:p>
+                  </a:txBody>
+                  <a:tcPr marL="15871" marR="15871" marT="7935" marB="7935">
+                    <a:solidFill>
+                      <a:srgbClr val="FC2A35">
+                        <a:alpha val="50196"/>
+                      </a:srgbClr>
+                    </a:solidFill>
+                  </a:tcPr>
+                </a:tc>
+                <a:tc>
+                  <a:txBody>
+                    <a:bodyPr/>
+                    <a:lstStyle/>
+                    <a:p>
+                      <a:endParaRPr lang="nb-NO" sz="3200" dirty="0">
+                        <a:latin typeface="Aharoni" panose="02010803020104030203" pitchFamily="2" charset="-79"/>
+                        <a:cs typeface="Aharoni" panose="02010803020104030203" pitchFamily="2" charset="-79"/>
+                      </a:endParaRPr>
+                    </a:p>
+                  </a:txBody>
+                  <a:tcPr marL="15871" marR="15871" marT="7935" marB="7935">
+                    <a:solidFill>
+                      <a:srgbClr val="FC2A35">
+                        <a:alpha val="50196"/>
+                      </a:srgbClr>
+                    </a:solidFill>
+                  </a:tcPr>
+                </a:tc>
+                <a:extLst>
+                  <a:ext uri="{0D108BD9-81ED-4DB2-BD59-A6C34878D82A}">
+                    <a16:rowId xmlns:a16="http://schemas.microsoft.com/office/drawing/2014/main" val="3830881121"/>
+                  </a:ext>
+                </a:extLst>
+              </a:tr>
+            </a:tbl>
+          </a:graphicData>
+        </a:graphic>
+      </p:graphicFrame>
+      <p:sp>
+        <p:nvSpPr>
+          <p:cNvPr id="14" name="Rettvinklet trekant 13">
+            <a:extLst>
+              <a:ext uri="{FF2B5EF4-FFF2-40B4-BE49-F238E27FC236}">
+                <a16:creationId xmlns:a16="http://schemas.microsoft.com/office/drawing/2014/main" id="{3FD544B2-68FE-6ABC-0246-D9154BE52B74}"/>
+              </a:ext>
+            </a:extLst>
+          </p:cNvPr>
+          <p:cNvSpPr/>
+          <p:nvPr/>
+        </p:nvSpPr>
+        <p:spPr>
+          <a:xfrm flipH="1">
+            <a:off x="1217865" y="762000"/>
+            <a:ext cx="7062134" cy="762000"/>
+          </a:xfrm>
+          <a:prstGeom prst="rtTriangle">
+            <a:avLst/>
+          </a:prstGeom>
+          <a:solidFill>
+            <a:srgbClr val="E52B36"/>
+          </a:solidFill>
+          <a:ln>
+            <a:noFill/>
+          </a:ln>
+        </p:spPr>
+        <p:style>
+          <a:lnRef idx="2">
+            <a:schemeClr val="accent1">
+              <a:shade val="50000"/>
+            </a:schemeClr>
+          </a:lnRef>
+          <a:fillRef idx="1">
+            <a:schemeClr val="accent1"/>
+          </a:fillRef>
+          <a:effectRef idx="0">
+            <a:schemeClr val="accent1"/>
+          </a:effectRef>
+          <a:fontRef idx="minor">
+            <a:schemeClr val="lt1"/>
+          </a:fontRef>
+        </p:style>
+        <p:txBody>
+          <a:bodyPr rtlCol="0" anchor="ctr"/>
+          <a:lstStyle/>
+          <a:p>
+            <a:pPr algn="ctr"/>
+            <a:endParaRPr lang="nb-NO"/>
+          </a:p>
+        </p:txBody>
+      </p:sp>
+      <p:sp>
+        <p:nvSpPr>
+          <p:cNvPr id="6" name="TekstSylinder 5">
+            <a:extLst>
+              <a:ext uri="{FF2B5EF4-FFF2-40B4-BE49-F238E27FC236}">
+                <a16:creationId xmlns:a16="http://schemas.microsoft.com/office/drawing/2014/main" id="{D33D87C2-6508-0709-55B1-F464ADC7FF56}"/>
+              </a:ext>
+            </a:extLst>
+          </p:cNvPr>
+          <p:cNvSpPr txBox="1"/>
+          <p:nvPr/>
+        </p:nvSpPr>
+        <p:spPr>
+          <a:xfrm flipH="1">
+            <a:off x="2306171" y="762000"/>
+            <a:ext cx="5973829" cy="1097994"/>
+          </a:xfrm>
+          <a:prstGeom prst="rtTriangle">
+            <a:avLst/>
+          </a:prstGeom>
+          <a:solidFill>
+            <a:srgbClr val="01244C"/>
+          </a:solidFill>
+        </p:spPr>
+        <p:txBody>
+          <a:bodyPr wrap="square" rtlCol="0">
+            <a:spAutoFit/>
+          </a:bodyPr>
+          <a:lstStyle/>
+          <a:p>
+            <a:endParaRPr lang="nb-NO" dirty="0"/>
+          </a:p>
+        </p:txBody>
+      </p:sp>
+      <p:graphicFrame>
+        <p:nvGraphicFramePr>
+          <p:cNvPr id="16" name="Tabell 15">
+            <a:extLst>
+              <a:ext uri="{FF2B5EF4-FFF2-40B4-BE49-F238E27FC236}">
+                <a16:creationId xmlns:a16="http://schemas.microsoft.com/office/drawing/2014/main" id="{3DDEAB59-21C1-7234-DB0C-0D67F10BF874}"/>
+              </a:ext>
+            </a:extLst>
+          </p:cNvPr>
+          <p:cNvGraphicFramePr>
+            <a:graphicFrameLocks noGrp="1"/>
+          </p:cNvGraphicFramePr>
+          <p:nvPr>
+            <p:extLst>
+              <p:ext uri="{D42A27DB-BD31-4B8C-83A1-F6EECF244321}">
+                <p14:modId xmlns:p14="http://schemas.microsoft.com/office/powerpoint/2010/main" val="1663777481"/>
+              </p:ext>
+            </p:extLst>
+          </p:nvPr>
+        </p:nvGraphicFramePr>
+        <p:xfrm>
+          <a:off x="2" y="790352"/>
+          <a:ext cx="8130362" cy="762000"/>
+        </p:xfrm>
+        <a:graphic>
+          <a:graphicData uri="http://schemas.openxmlformats.org/drawingml/2006/table">
+            <a:tbl>
+              <a:tblPr firstRow="1" bandRow="1">
+                <a:tableStyleId>{B301B821-A1FF-4177-AEE7-76D212191A09}</a:tableStyleId>
+              </a:tblPr>
+              <a:tblGrid>
+                <a:gridCol w="3742658">
+                  <a:extLst>
+                    <a:ext uri="{9D8B030D-6E8A-4147-A177-3AD203B41FA5}">
+                      <a16:colId xmlns:a16="http://schemas.microsoft.com/office/drawing/2014/main" val="1933295454"/>
+                    </a:ext>
+                  </a:extLst>
+                </a:gridCol>
+                <a:gridCol w="2401670">
+                  <a:extLst>
+                    <a:ext uri="{9D8B030D-6E8A-4147-A177-3AD203B41FA5}">
+                      <a16:colId xmlns:a16="http://schemas.microsoft.com/office/drawing/2014/main" val="2917907625"/>
+                    </a:ext>
+                  </a:extLst>
+                </a:gridCol>
+                <a:gridCol w="1433140">
+                  <a:extLst>
+                    <a:ext uri="{9D8B030D-6E8A-4147-A177-3AD203B41FA5}">
+                      <a16:colId xmlns:a16="http://schemas.microsoft.com/office/drawing/2014/main" val="1914049901"/>
+                    </a:ext>
+                  </a:extLst>
+                </a:gridCol>
+                <a:gridCol w="552894">
+                  <a:extLst>
+                    <a:ext uri="{9D8B030D-6E8A-4147-A177-3AD203B41FA5}">
+                      <a16:colId xmlns:a16="http://schemas.microsoft.com/office/drawing/2014/main" val="93958210"/>
+                    </a:ext>
+                  </a:extLst>
+                </a:gridCol>
+              </a:tblGrid>
+              <a:tr h="762000">
+                <a:tc>
+                  <a:txBody>
+                    <a:bodyPr/>
+                    <a:lstStyle/>
+                    <a:p>
+                      <a:pPr algn="l"/>
+                      <a:r>
+                        <a:rPr lang="nb-NO" sz="3200" dirty="0">
+                          <a:latin typeface="Aharoni" panose="02010803020104030203" pitchFamily="2" charset="-79"/>
+                          <a:cs typeface="Aharoni" panose="02010803020104030203" pitchFamily="2" charset="-79"/>
+                        </a:rPr>
+                        <a:t>     Spiller</a:t>
+                      </a:r>
+                    </a:p>
+                  </a:txBody>
+                  <a:tcPr marL="15871" marR="15871" marT="7935" marB="7935" anchor="ctr">
+                    <a:lnL w="12700" cmpd="sng">
+                      <a:noFill/>
+                    </a:lnL>
+                    <a:lnR>
+                      <a:noFill/>
+                    </a:lnR>
+                    <a:lnT w="12700" cmpd="sng">
+                      <a:noFill/>
+                    </a:lnT>
+                    <a:lnB w="12700" cmpd="sng">
+                      <a:noFill/>
+                    </a:lnB>
+                    <a:lnTlToBr w="12700" cmpd="sng">
+                      <a:noFill/>
+                      <a:prstDash val="solid"/>
+                    </a:lnTlToBr>
+                    <a:lnBlToTr w="12700" cmpd="sng">
+                      <a:noFill/>
+                      <a:prstDash val="solid"/>
+                    </a:lnBlToTr>
+                    <a:noFill/>
+                  </a:tcPr>
+                </a:tc>
+                <a:tc>
+                  <a:txBody>
+                    <a:bodyPr/>
+                    <a:lstStyle/>
+                    <a:p>
+                      <a:pPr algn="l"/>
+                      <a:r>
+                        <a:rPr lang="nb-NO" sz="2400" dirty="0">
+                          <a:latin typeface="Aharoni" panose="02010803020104030203" pitchFamily="2" charset="-79"/>
+                          <a:cs typeface="Aharoni" panose="02010803020104030203" pitchFamily="2" charset="-79"/>
+                        </a:rPr>
+                        <a:t>Lag</a:t>
+                      </a:r>
+                    </a:p>
+                  </a:txBody>
+                  <a:tcPr marL="15871" marR="15871" marT="7935" marB="7935" anchor="ctr">
+                    <a:lnL>
+                      <a:noFill/>
+                    </a:lnL>
+                    <a:lnR>
+                      <a:noFill/>
+                    </a:lnR>
+                    <a:lnT w="12700" cmpd="sng">
+                      <a:noFill/>
+                    </a:lnT>
+                    <a:lnB w="12700" cmpd="sng">
+                      <a:noFill/>
+                    </a:lnB>
+                    <a:lnTlToBr w="12700" cmpd="sng">
+                      <a:noFill/>
+                      <a:prstDash val="solid"/>
+                    </a:lnTlToBr>
+                    <a:lnBlToTr w="12700" cmpd="sng">
+                      <a:noFill/>
+                      <a:prstDash val="solid"/>
+                    </a:lnBlToTr>
+                    <a:noFill/>
+                  </a:tcPr>
+                </a:tc>
+                <a:tc>
+                  <a:txBody>
+                    <a:bodyPr/>
+                    <a:lstStyle/>
+                    <a:p>
+                      <a:pPr algn="r"/>
+                      <a:r>
+                        <a:rPr lang="nb-NO" sz="2400" dirty="0">
+                          <a:latin typeface="Aharoni" panose="02010803020104030203" pitchFamily="2" charset="-79"/>
+                          <a:cs typeface="Aharoni" panose="02010803020104030203" pitchFamily="2" charset="-79"/>
+                        </a:rPr>
+                        <a:t>Avd.</a:t>
+                      </a:r>
+                    </a:p>
+                  </a:txBody>
+                  <a:tcPr marL="15871" marR="15871" marT="7935" marB="7935" anchor="ctr">
+                    <a:lnL>
+                      <a:noFill/>
+                    </a:lnL>
+                    <a:lnR>
+                      <a:noFill/>
+                    </a:lnR>
+                    <a:lnT w="12700" cmpd="sng">
+                      <a:noFill/>
+                    </a:lnT>
+                    <a:lnB w="12700" cmpd="sng">
+                      <a:noFill/>
+                    </a:lnB>
+                    <a:lnTlToBr w="12700" cmpd="sng">
+                      <a:noFill/>
+                      <a:prstDash val="solid"/>
+                    </a:lnTlToBr>
+                    <a:lnBlToTr w="12700" cmpd="sng">
+                      <a:noFill/>
+                      <a:prstDash val="solid"/>
+                    </a:lnBlToTr>
+                    <a:noFill/>
+                  </a:tcPr>
+                </a:tc>
+                <a:tc>
+                  <a:txBody>
+                    <a:bodyPr/>
+                    <a:lstStyle/>
+                    <a:p>
+                      <a:pPr algn="r"/>
+                      <a:r>
+                        <a:rPr lang="nb-NO" sz="3600" dirty="0">
+                          <a:latin typeface="Aharoni" panose="02010803020104030203" pitchFamily="2" charset="-79"/>
+                          <a:cs typeface="Aharoni" panose="02010803020104030203" pitchFamily="2" charset="-79"/>
+                        </a:rPr>
+                        <a:t>#</a:t>
+                      </a:r>
+                    </a:p>
+                  </a:txBody>
+                  <a:tcPr marL="15871" marR="15871" marT="7935" marB="7935" anchor="ctr">
+                    <a:lnL>
+                      <a:noFill/>
+                    </a:lnL>
+                    <a:lnR w="12700" cmpd="sng">
+                      <a:noFill/>
+                    </a:lnR>
+                    <a:lnT w="12700" cmpd="sng">
+                      <a:noFill/>
+                    </a:lnT>
+                    <a:lnB w="12700" cmpd="sng">
+                      <a:noFill/>
+                    </a:lnB>
+                    <a:lnTlToBr w="12700" cmpd="sng">
+                      <a:noFill/>
+                      <a:prstDash val="solid"/>
+                    </a:lnTlToBr>
+                    <a:lnBlToTr w="12700" cmpd="sng">
+                      <a:noFill/>
+                      <a:prstDash val="solid"/>
+                    </a:lnBlToTr>
+                    <a:noFill/>
+                  </a:tcPr>
+                </a:tc>
+                <a:extLst>
+                  <a:ext uri="{0D108BD9-81ED-4DB2-BD59-A6C34878D82A}">
+                    <a16:rowId xmlns:a16="http://schemas.microsoft.com/office/drawing/2014/main" val="2068353762"/>
+                  </a:ext>
+                </a:extLst>
+              </a:tr>
+            </a:tbl>
+          </a:graphicData>
+        </a:graphic>
+      </p:graphicFrame>
+      <p:graphicFrame>
+        <p:nvGraphicFramePr>
+          <p:cNvPr id="17" name="Tabell 16">
+            <a:extLst>
+              <a:ext uri="{FF2B5EF4-FFF2-40B4-BE49-F238E27FC236}">
+                <a16:creationId xmlns:a16="http://schemas.microsoft.com/office/drawing/2014/main" id="{F1A6B3FC-6B11-797D-AE5F-8FF320E3DE17}"/>
+              </a:ext>
+            </a:extLst>
+          </p:cNvPr>
+          <p:cNvGraphicFramePr>
+            <a:graphicFrameLocks noGrp="1"/>
+          </p:cNvGraphicFramePr>
+          <p:nvPr/>
+        </p:nvGraphicFramePr>
+        <p:xfrm>
+          <a:off x="-82270" y="1524000"/>
+          <a:ext cx="559641" cy="9144000"/>
+        </p:xfrm>
+        <a:graphic>
+          <a:graphicData uri="http://schemas.openxmlformats.org/drawingml/2006/table">
+            <a:tbl>
+              <a:tblPr firstRow="1" bandRow="1">
+                <a:tableStyleId>{B301B821-A1FF-4177-AEE7-76D212191A09}</a:tableStyleId>
+              </a:tblPr>
+              <a:tblGrid>
+                <a:gridCol w="559641">
+                  <a:extLst>
+                    <a:ext uri="{9D8B030D-6E8A-4147-A177-3AD203B41FA5}">
+                      <a16:colId xmlns:a16="http://schemas.microsoft.com/office/drawing/2014/main" val="2229486286"/>
+                    </a:ext>
+                  </a:extLst>
+                </a:gridCol>
+              </a:tblGrid>
+              <a:tr h="762000">
+                <a:tc>
+                  <a:txBody>
+                    <a:bodyPr/>
+                    <a:lstStyle/>
+                    <a:p>
+                      <a:pPr algn="r"/>
+                      <a:r>
+                        <a:rPr lang="nb-NO" sz="3200" dirty="0">
+                          <a:solidFill>
+                            <a:schemeClr val="tx1"/>
+                          </a:solidFill>
+                          <a:latin typeface="Aharoni" panose="02010803020104030203" pitchFamily="2" charset="-79"/>
+                          <a:cs typeface="Aharoni" panose="02010803020104030203" pitchFamily="2" charset="-79"/>
+                        </a:rPr>
+                        <a:t>1.</a:t>
+                      </a:r>
+                    </a:p>
+                  </a:txBody>
+                  <a:tcPr marL="15871" marR="15871" marT="7935" marB="7935" anchor="ctr">
+                    <a:lnL w="12700" cmpd="sng">
+                      <a:noFill/>
+                    </a:lnL>
+                    <a:lnR w="12700" cmpd="sng">
+                      <a:noFill/>
+                    </a:lnR>
+                    <a:lnT w="12700" cmpd="sng">
+                      <a:noFill/>
+                    </a:lnT>
+                    <a:lnB w="12700" cmpd="sng">
+                      <a:noFill/>
+                    </a:lnB>
+                    <a:lnTlToBr w="12700" cmpd="sng">
+                      <a:noFill/>
+                      <a:prstDash val="solid"/>
+                    </a:lnTlToBr>
+                    <a:lnBlToTr w="12700" cmpd="sng">
+                      <a:noFill/>
+                      <a:prstDash val="solid"/>
+                    </a:lnBlToTr>
+                    <a:noFill/>
+                  </a:tcPr>
+                </a:tc>
+                <a:extLst>
+                  <a:ext uri="{0D108BD9-81ED-4DB2-BD59-A6C34878D82A}">
+                    <a16:rowId xmlns:a16="http://schemas.microsoft.com/office/drawing/2014/main" val="140927727"/>
+                  </a:ext>
+                </a:extLst>
+              </a:tr>
+              <a:tr h="762000">
+                <a:tc>
+                  <a:txBody>
+                    <a:bodyPr/>
+                    <a:lstStyle/>
+                    <a:p>
+                      <a:pPr algn="r"/>
+                      <a:r>
+                        <a:rPr lang="nb-NO" sz="3200" dirty="0">
+                          <a:latin typeface="Aharoni" panose="02010803020104030203" pitchFamily="2" charset="-79"/>
+                          <a:cs typeface="Aharoni" panose="02010803020104030203" pitchFamily="2" charset="-79"/>
+                        </a:rPr>
+                        <a:t>2.</a:t>
+                      </a:r>
+                    </a:p>
+                  </a:txBody>
+                  <a:tcPr marL="15871" marR="15871" marT="7935" marB="7935" anchor="ctr">
+                    <a:lnL w="12700" cmpd="sng">
+                      <a:noFill/>
+                    </a:lnL>
+                    <a:lnR w="12700" cmpd="sng">
+                      <a:noFill/>
+                    </a:lnR>
+                    <a:lnT w="12700" cmpd="sng">
+                      <a:noFill/>
+                    </a:lnT>
+                    <a:lnB w="12700" cmpd="sng">
+                      <a:noFill/>
+                    </a:lnB>
+                    <a:lnTlToBr w="12700" cmpd="sng">
+                      <a:noFill/>
+                      <a:prstDash val="solid"/>
+                    </a:lnTlToBr>
+                    <a:lnBlToTr w="12700" cmpd="sng">
+                      <a:noFill/>
+                      <a:prstDash val="solid"/>
+                    </a:lnBlToTr>
+                    <a:noFill/>
+                  </a:tcPr>
+                </a:tc>
+                <a:extLst>
+                  <a:ext uri="{0D108BD9-81ED-4DB2-BD59-A6C34878D82A}">
+                    <a16:rowId xmlns:a16="http://schemas.microsoft.com/office/drawing/2014/main" val="3376803301"/>
+                  </a:ext>
+                </a:extLst>
+              </a:tr>
+              <a:tr h="762000">
+                <a:tc>
+                  <a:txBody>
+                    <a:bodyPr/>
+                    <a:lstStyle/>
+                    <a:p>
+                      <a:pPr algn="r"/>
+                      <a:r>
+                        <a:rPr lang="nb-NO" sz="3200" dirty="0">
+                          <a:latin typeface="Aharoni" panose="02010803020104030203" pitchFamily="2" charset="-79"/>
+                          <a:cs typeface="Aharoni" panose="02010803020104030203" pitchFamily="2" charset="-79"/>
+                        </a:rPr>
+                        <a:t>3.</a:t>
+                      </a:r>
+                    </a:p>
+                  </a:txBody>
+                  <a:tcPr marL="15871" marR="15871" marT="7935" marB="7935" anchor="ctr">
+                    <a:lnL w="12700" cmpd="sng">
+                      <a:noFill/>
+                    </a:lnL>
+                    <a:lnR w="12700" cmpd="sng">
+                      <a:noFill/>
+                    </a:lnR>
+                    <a:lnT w="12700" cmpd="sng">
+                      <a:noFill/>
+                    </a:lnT>
+                    <a:lnB w="12700" cmpd="sng">
+                      <a:noFill/>
+                    </a:lnB>
+                    <a:lnTlToBr w="12700" cmpd="sng">
+                      <a:noFill/>
+                      <a:prstDash val="solid"/>
+                    </a:lnTlToBr>
+                    <a:lnBlToTr w="12700" cmpd="sng">
+                      <a:noFill/>
+                      <a:prstDash val="solid"/>
+                    </a:lnBlToTr>
+                    <a:noFill/>
+                  </a:tcPr>
+                </a:tc>
+                <a:extLst>
+                  <a:ext uri="{0D108BD9-81ED-4DB2-BD59-A6C34878D82A}">
+                    <a16:rowId xmlns:a16="http://schemas.microsoft.com/office/drawing/2014/main" val="4249982195"/>
+                  </a:ext>
+                </a:extLst>
+              </a:tr>
+              <a:tr h="762000">
+                <a:tc>
+                  <a:txBody>
+                    <a:bodyPr/>
+                    <a:lstStyle/>
+                    <a:p>
+                      <a:pPr algn="r"/>
+                      <a:r>
+                        <a:rPr lang="nb-NO" sz="3200" dirty="0">
+                          <a:latin typeface="Aharoni" panose="02010803020104030203" pitchFamily="2" charset="-79"/>
+                          <a:cs typeface="Aharoni" panose="02010803020104030203" pitchFamily="2" charset="-79"/>
+                        </a:rPr>
+                        <a:t>4.</a:t>
+                      </a:r>
+                    </a:p>
+                  </a:txBody>
+                  <a:tcPr marL="15871" marR="15871" marT="7935" marB="7935" anchor="ctr">
+                    <a:lnL w="12700" cmpd="sng">
+                      <a:noFill/>
+                    </a:lnL>
+                    <a:lnR w="12700" cmpd="sng">
+                      <a:noFill/>
+                    </a:lnR>
+                    <a:lnT w="12700" cmpd="sng">
+                      <a:noFill/>
+                    </a:lnT>
+                    <a:lnB w="12700" cmpd="sng">
+                      <a:noFill/>
+                    </a:lnB>
+                    <a:lnTlToBr w="12700" cmpd="sng">
+                      <a:noFill/>
+                      <a:prstDash val="solid"/>
+                    </a:lnTlToBr>
+                    <a:lnBlToTr w="12700" cmpd="sng">
+                      <a:noFill/>
+                      <a:prstDash val="solid"/>
+                    </a:lnBlToTr>
+                    <a:noFill/>
+                  </a:tcPr>
+                </a:tc>
+                <a:extLst>
+                  <a:ext uri="{0D108BD9-81ED-4DB2-BD59-A6C34878D82A}">
+                    <a16:rowId xmlns:a16="http://schemas.microsoft.com/office/drawing/2014/main" val="4287581751"/>
+                  </a:ext>
+                </a:extLst>
+              </a:tr>
+              <a:tr h="762000">
+                <a:tc>
+                  <a:txBody>
+                    <a:bodyPr/>
+                    <a:lstStyle/>
+                    <a:p>
+                      <a:pPr algn="r"/>
+                      <a:r>
+                        <a:rPr lang="nb-NO" sz="3200" dirty="0">
+                          <a:latin typeface="Aharoni" panose="02010803020104030203" pitchFamily="2" charset="-79"/>
+                          <a:cs typeface="Aharoni" panose="02010803020104030203" pitchFamily="2" charset="-79"/>
+                        </a:rPr>
+                        <a:t>5.</a:t>
+                      </a:r>
+                    </a:p>
+                  </a:txBody>
+                  <a:tcPr marL="15871" marR="15871" marT="7935" marB="7935" anchor="ctr">
+                    <a:lnL w="12700" cmpd="sng">
+                      <a:noFill/>
+                    </a:lnL>
+                    <a:lnR w="12700" cmpd="sng">
+                      <a:noFill/>
+                    </a:lnR>
+                    <a:lnT w="12700" cmpd="sng">
+                      <a:noFill/>
+                    </a:lnT>
+                    <a:lnB w="12700" cmpd="sng">
+                      <a:noFill/>
+                    </a:lnB>
+                    <a:lnTlToBr w="12700" cmpd="sng">
+                      <a:noFill/>
+                      <a:prstDash val="solid"/>
+                    </a:lnTlToBr>
+                    <a:lnBlToTr w="12700" cmpd="sng">
+                      <a:noFill/>
+                      <a:prstDash val="solid"/>
+                    </a:lnBlToTr>
+                    <a:noFill/>
+                  </a:tcPr>
+                </a:tc>
+                <a:extLst>
+                  <a:ext uri="{0D108BD9-81ED-4DB2-BD59-A6C34878D82A}">
+                    <a16:rowId xmlns:a16="http://schemas.microsoft.com/office/drawing/2014/main" val="1271175667"/>
+                  </a:ext>
+                </a:extLst>
+              </a:tr>
+              <a:tr h="762000">
+                <a:tc>
+                  <a:txBody>
+                    <a:bodyPr/>
+                    <a:lstStyle/>
+                    <a:p>
+                      <a:pPr algn="r"/>
+                      <a:r>
+                        <a:rPr lang="nb-NO" sz="3200" dirty="0">
+                          <a:latin typeface="Aharoni" panose="02010803020104030203" pitchFamily="2" charset="-79"/>
+                          <a:cs typeface="Aharoni" panose="02010803020104030203" pitchFamily="2" charset="-79"/>
+                        </a:rPr>
+                        <a:t>6.</a:t>
+                      </a:r>
+                    </a:p>
+                  </a:txBody>
+                  <a:tcPr marL="15871" marR="15871" marT="7935" marB="7935" anchor="ctr">
+                    <a:lnL w="12700" cmpd="sng">
+                      <a:noFill/>
+                    </a:lnL>
+                    <a:lnR w="12700" cmpd="sng">
+                      <a:noFill/>
+                    </a:lnR>
+                    <a:lnT w="12700" cmpd="sng">
+                      <a:noFill/>
+                    </a:lnT>
+                    <a:lnB w="12700" cmpd="sng">
+                      <a:noFill/>
+                    </a:lnB>
+                    <a:lnTlToBr w="12700" cmpd="sng">
+                      <a:noFill/>
+                      <a:prstDash val="solid"/>
+                    </a:lnTlToBr>
+                    <a:lnBlToTr w="12700" cmpd="sng">
+                      <a:noFill/>
+                      <a:prstDash val="solid"/>
+                    </a:lnBlToTr>
+                    <a:noFill/>
+                  </a:tcPr>
+                </a:tc>
+                <a:extLst>
+                  <a:ext uri="{0D108BD9-81ED-4DB2-BD59-A6C34878D82A}">
+                    <a16:rowId xmlns:a16="http://schemas.microsoft.com/office/drawing/2014/main" val="1560763779"/>
+                  </a:ext>
+                </a:extLst>
+              </a:tr>
+              <a:tr h="762000">
+                <a:tc>
+                  <a:txBody>
+                    <a:bodyPr/>
+                    <a:lstStyle/>
+                    <a:p>
+                      <a:pPr algn="r"/>
+                      <a:r>
+                        <a:rPr lang="nb-NO" sz="3200" dirty="0">
+                          <a:latin typeface="Aharoni" panose="02010803020104030203" pitchFamily="2" charset="-79"/>
+                          <a:cs typeface="Aharoni" panose="02010803020104030203" pitchFamily="2" charset="-79"/>
+                        </a:rPr>
+                        <a:t>7.</a:t>
+                      </a:r>
+                    </a:p>
+                  </a:txBody>
+                  <a:tcPr marL="15871" marR="15871" marT="7935" marB="7935" anchor="ctr">
+                    <a:lnL w="12700" cmpd="sng">
+                      <a:noFill/>
+                    </a:lnL>
+                    <a:lnR w="12700" cmpd="sng">
+                      <a:noFill/>
+                    </a:lnR>
+                    <a:lnT w="12700" cmpd="sng">
+                      <a:noFill/>
+                    </a:lnT>
+                    <a:lnB w="12700" cmpd="sng">
+                      <a:noFill/>
+                    </a:lnB>
+                    <a:lnTlToBr w="12700" cmpd="sng">
+                      <a:noFill/>
+                      <a:prstDash val="solid"/>
+                    </a:lnTlToBr>
+                    <a:lnBlToTr w="12700" cmpd="sng">
+                      <a:noFill/>
+                      <a:prstDash val="solid"/>
+                    </a:lnBlToTr>
+                    <a:noFill/>
+                  </a:tcPr>
+                </a:tc>
+                <a:extLst>
+                  <a:ext uri="{0D108BD9-81ED-4DB2-BD59-A6C34878D82A}">
+                    <a16:rowId xmlns:a16="http://schemas.microsoft.com/office/drawing/2014/main" val="944182864"/>
+                  </a:ext>
+                </a:extLst>
+              </a:tr>
+              <a:tr h="762000">
+                <a:tc>
+                  <a:txBody>
+                    <a:bodyPr/>
+                    <a:lstStyle/>
+                    <a:p>
+                      <a:pPr algn="r"/>
+                      <a:r>
+                        <a:rPr lang="nb-NO" sz="3200" dirty="0">
+                          <a:latin typeface="Aharoni" panose="02010803020104030203" pitchFamily="2" charset="-79"/>
+                          <a:cs typeface="Aharoni" panose="02010803020104030203" pitchFamily="2" charset="-79"/>
+                        </a:rPr>
+                        <a:t>8.</a:t>
+                      </a:r>
+                    </a:p>
+                  </a:txBody>
+                  <a:tcPr marL="15871" marR="15871" marT="7935" marB="7935" anchor="ctr">
+                    <a:lnL w="12700" cmpd="sng">
+                      <a:noFill/>
+                    </a:lnL>
+                    <a:lnR w="12700" cmpd="sng">
+                      <a:noFill/>
+                    </a:lnR>
+                    <a:lnT w="12700" cmpd="sng">
+                      <a:noFill/>
+                    </a:lnT>
+                    <a:lnB w="12700" cmpd="sng">
+                      <a:noFill/>
+                    </a:lnB>
+                    <a:lnTlToBr w="12700" cmpd="sng">
+                      <a:noFill/>
+                      <a:prstDash val="solid"/>
+                    </a:lnTlToBr>
+                    <a:lnBlToTr w="12700" cmpd="sng">
+                      <a:noFill/>
+                      <a:prstDash val="solid"/>
+                    </a:lnBlToTr>
+                    <a:noFill/>
+                  </a:tcPr>
+                </a:tc>
+                <a:extLst>
+                  <a:ext uri="{0D108BD9-81ED-4DB2-BD59-A6C34878D82A}">
+                    <a16:rowId xmlns:a16="http://schemas.microsoft.com/office/drawing/2014/main" val="3320275175"/>
+                  </a:ext>
+                </a:extLst>
+              </a:tr>
+              <a:tr h="762000">
+                <a:tc>
+                  <a:txBody>
+                    <a:bodyPr/>
+                    <a:lstStyle/>
+                    <a:p>
+                      <a:pPr algn="r"/>
+                      <a:r>
+                        <a:rPr lang="nb-NO" sz="3200" dirty="0">
+                          <a:latin typeface="Aharoni" panose="02010803020104030203" pitchFamily="2" charset="-79"/>
+                          <a:cs typeface="Aharoni" panose="02010803020104030203" pitchFamily="2" charset="-79"/>
+                        </a:rPr>
+                        <a:t>9.</a:t>
+                      </a:r>
+                    </a:p>
+                  </a:txBody>
+                  <a:tcPr marL="15871" marR="15871" marT="7935" marB="7935" anchor="ctr">
+                    <a:lnL w="12700" cmpd="sng">
+                      <a:noFill/>
+                    </a:lnL>
+                    <a:lnR w="12700" cmpd="sng">
+                      <a:noFill/>
+                    </a:lnR>
+                    <a:lnT w="12700" cmpd="sng">
+                      <a:noFill/>
+                    </a:lnT>
+                    <a:lnB w="12700" cmpd="sng">
+                      <a:noFill/>
+                    </a:lnB>
+                    <a:lnTlToBr w="12700" cmpd="sng">
+                      <a:noFill/>
+                      <a:prstDash val="solid"/>
+                    </a:lnTlToBr>
+                    <a:lnBlToTr w="12700" cmpd="sng">
+                      <a:noFill/>
+                      <a:prstDash val="solid"/>
+                    </a:lnBlToTr>
+                    <a:noFill/>
+                  </a:tcPr>
+                </a:tc>
+                <a:extLst>
+                  <a:ext uri="{0D108BD9-81ED-4DB2-BD59-A6C34878D82A}">
+                    <a16:rowId xmlns:a16="http://schemas.microsoft.com/office/drawing/2014/main" val="408099105"/>
+                  </a:ext>
+                </a:extLst>
+              </a:tr>
+              <a:tr h="762000">
+                <a:tc>
+                  <a:txBody>
+                    <a:bodyPr/>
+                    <a:lstStyle/>
+                    <a:p>
+                      <a:pPr algn="r"/>
+                      <a:r>
+                        <a:rPr lang="nb-NO" sz="3200" dirty="0">
+                          <a:latin typeface="Aharoni" panose="02010803020104030203" pitchFamily="2" charset="-79"/>
+                          <a:cs typeface="Aharoni" panose="02010803020104030203" pitchFamily="2" charset="-79"/>
+                        </a:rPr>
+                        <a:t>10.</a:t>
+                      </a:r>
+                    </a:p>
+                  </a:txBody>
+                  <a:tcPr marL="15871" marR="15871" marT="7935" marB="7935" anchor="ctr">
+                    <a:lnL w="12700" cmpd="sng">
+                      <a:noFill/>
+                    </a:lnL>
+                    <a:lnR w="12700" cmpd="sng">
+                      <a:noFill/>
+                    </a:lnR>
+                    <a:lnT w="12700" cmpd="sng">
+                      <a:noFill/>
+                    </a:lnT>
+                    <a:lnB w="12700" cmpd="sng">
+                      <a:noFill/>
+                    </a:lnB>
+                    <a:lnTlToBr w="12700" cmpd="sng">
+                      <a:noFill/>
+                      <a:prstDash val="solid"/>
+                    </a:lnTlToBr>
+                    <a:lnBlToTr w="12700" cmpd="sng">
+                      <a:noFill/>
+                      <a:prstDash val="solid"/>
+                    </a:lnBlToTr>
+                    <a:noFill/>
+                  </a:tcPr>
+                </a:tc>
+                <a:extLst>
+                  <a:ext uri="{0D108BD9-81ED-4DB2-BD59-A6C34878D82A}">
+                    <a16:rowId xmlns:a16="http://schemas.microsoft.com/office/drawing/2014/main" val="4162608208"/>
+                  </a:ext>
+                </a:extLst>
+              </a:tr>
+              <a:tr h="762000">
+                <a:tc>
+                  <a:txBody>
+                    <a:bodyPr/>
+                    <a:lstStyle/>
+                    <a:p>
+                      <a:pPr algn="r"/>
+                      <a:r>
+                        <a:rPr lang="nb-NO" sz="3200" dirty="0">
+                          <a:latin typeface="Aharoni" panose="02010803020104030203" pitchFamily="2" charset="-79"/>
+                          <a:cs typeface="Aharoni" panose="02010803020104030203" pitchFamily="2" charset="-79"/>
+                        </a:rPr>
+                        <a:t>11.</a:t>
+                      </a:r>
+                    </a:p>
+                  </a:txBody>
+                  <a:tcPr marL="15871" marR="15871" marT="7935" marB="7935" anchor="ctr">
+                    <a:lnL w="12700" cmpd="sng">
+                      <a:noFill/>
+                    </a:lnL>
+                    <a:lnR w="12700" cmpd="sng">
+                      <a:noFill/>
+                    </a:lnR>
+                    <a:lnT w="12700" cmpd="sng">
+                      <a:noFill/>
+                    </a:lnT>
+                    <a:lnB w="12700" cmpd="sng">
+                      <a:noFill/>
+                    </a:lnB>
+                    <a:lnTlToBr w="12700" cmpd="sng">
+                      <a:noFill/>
+                      <a:prstDash val="solid"/>
+                    </a:lnTlToBr>
+                    <a:lnBlToTr w="12700" cmpd="sng">
+                      <a:noFill/>
+                      <a:prstDash val="solid"/>
+                    </a:lnBlToTr>
+                    <a:noFill/>
+                  </a:tcPr>
+                </a:tc>
+                <a:extLst>
+                  <a:ext uri="{0D108BD9-81ED-4DB2-BD59-A6C34878D82A}">
+                    <a16:rowId xmlns:a16="http://schemas.microsoft.com/office/drawing/2014/main" val="4054163496"/>
+                  </a:ext>
+                </a:extLst>
+              </a:tr>
+              <a:tr h="762000">
+                <a:tc>
+                  <a:txBody>
+                    <a:bodyPr/>
+                    <a:lstStyle/>
+                    <a:p>
+                      <a:pPr algn="r"/>
+                      <a:r>
+                        <a:rPr lang="nb-NO" sz="3200" dirty="0">
+                          <a:latin typeface="Aharoni" panose="02010803020104030203" pitchFamily="2" charset="-79"/>
+                          <a:cs typeface="Aharoni" panose="02010803020104030203" pitchFamily="2" charset="-79"/>
+                        </a:rPr>
+                        <a:t>12.</a:t>
+                      </a:r>
+                    </a:p>
+                  </a:txBody>
+                  <a:tcPr marL="15871" marR="15871" marT="7935" marB="7935" anchor="ctr">
+                    <a:lnL w="12700" cmpd="sng">
+                      <a:noFill/>
+                    </a:lnL>
+                    <a:lnR w="12700" cmpd="sng">
+                      <a:noFill/>
+                    </a:lnR>
+                    <a:lnT w="12700" cmpd="sng">
+                      <a:noFill/>
+                    </a:lnT>
+                    <a:lnB w="12700" cmpd="sng">
+                      <a:noFill/>
+                    </a:lnB>
+                    <a:lnTlToBr w="12700" cmpd="sng">
+                      <a:noFill/>
+                      <a:prstDash val="solid"/>
+                    </a:lnTlToBr>
+                    <a:lnBlToTr w="12700" cmpd="sng">
+                      <a:noFill/>
+                      <a:prstDash val="solid"/>
+                    </a:lnBlToTr>
+                    <a:noFill/>
+                  </a:tcPr>
+                </a:tc>
+                <a:extLst>
+                  <a:ext uri="{0D108BD9-81ED-4DB2-BD59-A6C34878D82A}">
+                    <a16:rowId xmlns:a16="http://schemas.microsoft.com/office/drawing/2014/main" val="3349622565"/>
+                  </a:ext>
+                </a:extLst>
+              </a:tr>
+            </a:tbl>
+          </a:graphicData>
+        </a:graphic>
+      </p:graphicFrame>
+    </p:spTree>
+    <p:extLst>
+      <p:ext uri="{BB962C8B-B14F-4D97-AF65-F5344CB8AC3E}">
+        <p14:creationId xmlns:p14="http://schemas.microsoft.com/office/powerpoint/2010/main" val="366954692"/>
+      </p:ext>
+    </p:extLst>
+  </p:cSld>
+  <p:clrMapOvr>
+    <a:masterClrMapping/>
+  </p:clrMapOvr>
+</p:sld>
+</file>
+
+<file path=ppt/slides/slide4.xml><?xml version="1.0" encoding="utf-8"?>
+<p:sld xmlns:a="http://schemas.openxmlformats.org/drawingml/2006/main" xmlns:r="http://schemas.openxmlformats.org/officeDocument/2006/relationships" xmlns:p="http://schemas.openxmlformats.org/presentationml/2006/main">
+  <p:cSld>
+    <p:spTree>
+      <p:nvGrpSpPr>
+        <p:cNvPr id="1" name=""/>
+        <p:cNvGrpSpPr/>
+        <p:nvPr/>
+      </p:nvGrpSpPr>
+      <p:grpSpPr>
+        <a:xfrm>
+          <a:off x="0" y="0"/>
+          <a:ext cx="0" cy="0"/>
+          <a:chOff x="0" y="0"/>
+          <a:chExt cx="0" cy="0"/>
+        </a:xfrm>
+      </p:grpSpPr>
+      <p:graphicFrame>
+        <p:nvGraphicFramePr>
+          <p:cNvPr id="4" name="Tabell 4">
+            <a:extLst>
+              <a:ext uri="{FF2B5EF4-FFF2-40B4-BE49-F238E27FC236}">
+                <a16:creationId xmlns:a16="http://schemas.microsoft.com/office/drawing/2014/main" id="{FD5A9D2F-9DE0-5BFB-1784-57A85165FC06}"/>
+              </a:ext>
+            </a:extLst>
+          </p:cNvPr>
+          <p:cNvGraphicFramePr>
+            <a:graphicFrameLocks noGrp="1"/>
+          </p:cNvGraphicFramePr>
+          <p:nvPr>
+            <p:extLst>
+              <p:ext uri="{D42A27DB-BD31-4B8C-83A1-F6EECF244321}">
                 <p14:modId xmlns:p14="http://schemas.microsoft.com/office/powerpoint/2010/main" val="2138408358"/>
               </p:ext>
             </p:extLst>
           </p:nvPr>
         </p:nvGraphicFramePr>
         <p:xfrm>
-          <a:off x="0" y="0"/>
+          <a:off x="0" y="762000"/>
           <a:ext cx="8280000" cy="5334000"/>
         </p:xfrm>
         <a:graphic>
@@ -9381,7 +13096,7 @@
         </p:nvSpPr>
         <p:spPr>
           <a:xfrm flipH="1">
-            <a:off x="1217865" y="0"/>
+            <a:off x="1217865" y="762000"/>
             <a:ext cx="7062134" cy="762000"/>
           </a:xfrm>
           <a:prstGeom prst="rtTriangle">
@@ -9433,8 +13148,8 @@
         </p:nvSpPr>
         <p:spPr>
           <a:xfrm flipH="1">
-            <a:off x="2306170" y="0"/>
-            <a:ext cx="5973829" cy="762000"/>
+            <a:off x="2306171" y="762000"/>
+            <a:ext cx="5973829" cy="1097994"/>
           </a:xfrm>
           <a:prstGeom prst="rtTriangle">
             <a:avLst/>
@@ -9468,7 +13183,7 @@
           <p:nvPr/>
         </p:nvGraphicFramePr>
         <p:xfrm>
-          <a:off x="400" y="0"/>
+          <a:off x="400" y="762000"/>
           <a:ext cx="8280000" cy="762000"/>
         </p:xfrm>
         <a:graphic>
@@ -9745,7 +13460,7 @@
           </p:nvPr>
         </p:nvGraphicFramePr>
         <p:xfrm>
-          <a:off x="-82270" y="762000"/>
+          <a:off x="-82270" y="1524000"/>
           <a:ext cx="559641" cy="4572000"/>
         </p:xfrm>
         <a:graphic>
@@ -10314,7 +14029,7 @@
   <a:extraClrSchemeLst/>
   <a:extLst>
     <a:ext uri="{05A4C25C-085E-4340-85A3-A5531E510DB2}">
-      <thm15:themeFamily xmlns:thm15="http://schemas.microsoft.com/office/thememl/2012/main" name="Office Theme" id="{62F939B6-93AF-4DB8-9C6B-D6C7DFDC589F}" vid="{4A3C46E8-61CC-4603-A589-7422A47A8E4A}"/>
+      <thm15:themeFamily xmlns:thm15="http://schemas.microsoft.com/office/thememl/2012/main" name="Office 2013 - 2022 Theme" id="{62F939B6-93AF-4DB8-9C6B-D6C7DFDC589F}" vid="{4A3C46E8-61CC-4603-A589-7422A47A8E4A}"/>
     </a:ext>
   </a:extLst>
 </a:theme>

</xml_diff>